<commit_message>
v5.1 & SQL Server review
</commit_message>
<xml_diff>
--- a/Documentation/CA PPM for Strategic Planning and Execution_EN_v5.pptx
+++ b/Documentation/CA PPM for Strategic Planning and Execution_EN_v5.pptx
@@ -9,10 +9,10 @@
     <p:sldMasterId id="2147483729" r:id="rId8"/>
   </p:sldMasterIdLst>
   <p:notesMasterIdLst>
-    <p:notesMasterId r:id="rId26"/>
+    <p:notesMasterId r:id="rId27"/>
   </p:notesMasterIdLst>
   <p:handoutMasterIdLst>
-    <p:handoutMasterId r:id="rId27"/>
+    <p:handoutMasterId r:id="rId28"/>
   </p:handoutMasterIdLst>
   <p:sldIdLst>
     <p:sldId id="313" r:id="rId9"/>
@@ -20,18 +20,19 @@
     <p:sldId id="315" r:id="rId11"/>
     <p:sldId id="317" r:id="rId12"/>
     <p:sldId id="362" r:id="rId13"/>
-    <p:sldId id="363" r:id="rId14"/>
-    <p:sldId id="364" r:id="rId15"/>
-    <p:sldId id="365" r:id="rId16"/>
-    <p:sldId id="366" r:id="rId17"/>
-    <p:sldId id="367" r:id="rId18"/>
-    <p:sldId id="368" r:id="rId19"/>
-    <p:sldId id="347" r:id="rId20"/>
-    <p:sldId id="343" r:id="rId21"/>
-    <p:sldId id="346" r:id="rId22"/>
-    <p:sldId id="345" r:id="rId23"/>
-    <p:sldId id="344" r:id="rId24"/>
-    <p:sldId id="305" r:id="rId25"/>
+    <p:sldId id="369" r:id="rId14"/>
+    <p:sldId id="363" r:id="rId15"/>
+    <p:sldId id="364" r:id="rId16"/>
+    <p:sldId id="365" r:id="rId17"/>
+    <p:sldId id="366" r:id="rId18"/>
+    <p:sldId id="367" r:id="rId19"/>
+    <p:sldId id="368" r:id="rId20"/>
+    <p:sldId id="347" r:id="rId21"/>
+    <p:sldId id="343" r:id="rId22"/>
+    <p:sldId id="346" r:id="rId23"/>
+    <p:sldId id="345" r:id="rId24"/>
+    <p:sldId id="344" r:id="rId25"/>
+    <p:sldId id="305" r:id="rId26"/>
   </p:sldIdLst>
   <p:sldSz cx="9144000" cy="5148263"/>
   <p:notesSz cx="6858000" cy="9144000"/>
@@ -2846,946 +2847,6 @@
       <dsp:cNvGrpSpPr/>
     </dsp:nvGrpSpPr>
     <dsp:grpSpPr/>
-    <dsp:sp modelId="{B5E4A2E9-5CC2-4120-B51F-4CE06975E6BC}">
-      <dsp:nvSpPr>
-        <dsp:cNvPr id="0" name=""/>
-        <dsp:cNvSpPr/>
-      </dsp:nvSpPr>
-      <dsp:spPr>
-        <a:xfrm>
-          <a:off x="1321536" y="2426585"/>
-          <a:ext cx="1556766" cy="1336304"/>
-        </a:xfrm>
-        <a:prstGeom prst="hexagon">
-          <a:avLst>
-            <a:gd name="adj" fmla="val 25000"/>
-            <a:gd name="vf" fmla="val 115470"/>
-          </a:avLst>
-        </a:prstGeom>
-        <a:solidFill>
-          <a:schemeClr val="accent3">
-            <a:hueOff val="0"/>
-            <a:satOff val="0"/>
-            <a:lumOff val="0"/>
-            <a:alphaOff val="0"/>
-          </a:schemeClr>
-        </a:solidFill>
-        <a:ln w="25400" cap="flat" cmpd="sng" algn="ctr">
-          <a:solidFill>
-            <a:schemeClr val="accent3">
-              <a:hueOff val="0"/>
-              <a:satOff val="0"/>
-              <a:lumOff val="0"/>
-              <a:alphaOff val="0"/>
-            </a:schemeClr>
-          </a:solidFill>
-          <a:prstDash val="solid"/>
-        </a:ln>
-        <a:effectLst/>
-      </dsp:spPr>
-      <dsp:style>
-        <a:lnRef idx="2">
-          <a:scrgbClr r="0" g="0" b="0"/>
-        </a:lnRef>
-        <a:fillRef idx="1">
-          <a:scrgbClr r="0" g="0" b="0"/>
-        </a:fillRef>
-        <a:effectRef idx="0">
-          <a:scrgbClr r="0" g="0" b="0"/>
-        </a:effectRef>
-        <a:fontRef idx="minor">
-          <a:schemeClr val="lt1"/>
-        </a:fontRef>
-      </dsp:style>
-      <dsp:txBody>
-        <a:bodyPr spcFirstLastPara="0" vert="horz" wrap="square" lIns="0" tIns="17780" rIns="0" bIns="17780" numCol="1" spcCol="1270" anchor="ctr" anchorCtr="0">
-          <a:noAutofit/>
-        </a:bodyPr>
-        <a:lstStyle/>
-        <a:p>
-          <a:pPr lvl="0" algn="ctr" defTabSz="622300">
-            <a:lnSpc>
-              <a:spcPct val="90000"/>
-            </a:lnSpc>
-            <a:spcBef>
-              <a:spcPct val="0"/>
-            </a:spcBef>
-            <a:spcAft>
-              <a:spcPct val="35000"/>
-            </a:spcAft>
-          </a:pPr>
-          <a:r>
-            <a:rPr lang="en-US" sz="1400" kern="1200" noProof="0" dirty="0" smtClean="0"/>
-            <a:t>2</a:t>
-          </a:r>
-          <a:br>
-            <a:rPr lang="en-US" sz="1400" kern="1200" noProof="0" dirty="0" smtClean="0"/>
-          </a:br>
-          <a:r>
-            <a:rPr lang="en-US" sz="1400" kern="1200" noProof="0" dirty="0" smtClean="0"/>
-            <a:t>Monitoring Plans</a:t>
-          </a:r>
-          <a:endParaRPr lang="en-US" sz="1400" kern="1200" noProof="0" dirty="0"/>
-        </a:p>
-      </dsp:txBody>
-      <dsp:txXfrm>
-        <a:off x="1562625" y="2633532"/>
-        <a:ext cx="1074588" cy="922410"/>
-      </dsp:txXfrm>
-    </dsp:sp>
-    <dsp:sp modelId="{55BF6E9D-6B70-4B26-844A-DA10BFD2A19C}">
-      <dsp:nvSpPr>
-        <dsp:cNvPr id="0" name=""/>
-        <dsp:cNvSpPr/>
-      </dsp:nvSpPr>
-      <dsp:spPr>
-        <a:xfrm>
-          <a:off x="1370228" y="3017086"/>
-          <a:ext cx="181737" cy="156713"/>
-        </a:xfrm>
-        <a:prstGeom prst="hexagon">
-          <a:avLst>
-            <a:gd name="adj" fmla="val 25000"/>
-            <a:gd name="vf" fmla="val 115470"/>
-          </a:avLst>
-        </a:prstGeom>
-        <a:solidFill>
-          <a:schemeClr val="lt1">
-            <a:hueOff val="0"/>
-            <a:satOff val="0"/>
-            <a:lumOff val="0"/>
-            <a:alphaOff val="0"/>
-          </a:schemeClr>
-        </a:solidFill>
-        <a:ln w="25400" cap="flat" cmpd="sng" algn="ctr">
-          <a:solidFill>
-            <a:schemeClr val="accent3">
-              <a:hueOff val="0"/>
-              <a:satOff val="0"/>
-              <a:lumOff val="0"/>
-              <a:alphaOff val="0"/>
-            </a:schemeClr>
-          </a:solidFill>
-          <a:prstDash val="solid"/>
-        </a:ln>
-        <a:effectLst/>
-      </dsp:spPr>
-      <dsp:style>
-        <a:lnRef idx="2">
-          <a:scrgbClr r="0" g="0" b="0"/>
-        </a:lnRef>
-        <a:fillRef idx="1">
-          <a:scrgbClr r="0" g="0" b="0"/>
-        </a:fillRef>
-        <a:effectRef idx="0">
-          <a:scrgbClr r="0" g="0" b="0"/>
-        </a:effectRef>
-        <a:fontRef idx="minor"/>
-      </dsp:style>
-    </dsp:sp>
-    <dsp:sp modelId="{98A2AAED-D59F-45A5-9CCC-681E7B2CFEDF}">
-      <dsp:nvSpPr>
-        <dsp:cNvPr id="0" name=""/>
-        <dsp:cNvSpPr/>
-      </dsp:nvSpPr>
-      <dsp:spPr>
-        <a:xfrm>
-          <a:off x="0" y="1700194"/>
-          <a:ext cx="1556766" cy="1336304"/>
-        </a:xfrm>
-        <a:prstGeom prst="hexagon">
-          <a:avLst>
-            <a:gd name="adj" fmla="val 25000"/>
-            <a:gd name="vf" fmla="val 115470"/>
-          </a:avLst>
-        </a:prstGeom>
-        <a:blipFill rotWithShape="1">
-          <a:blip xmlns:r="http://schemas.openxmlformats.org/officeDocument/2006/relationships" r:embed="rId1"/>
-          <a:stretch>
-            <a:fillRect/>
-          </a:stretch>
-        </a:blipFill>
-        <a:ln w="25400" cap="flat" cmpd="sng" algn="ctr">
-          <a:solidFill>
-            <a:schemeClr val="accent3">
-              <a:hueOff val="0"/>
-              <a:satOff val="0"/>
-              <a:lumOff val="0"/>
-              <a:alphaOff val="0"/>
-            </a:schemeClr>
-          </a:solidFill>
-          <a:prstDash val="solid"/>
-        </a:ln>
-        <a:effectLst/>
-      </dsp:spPr>
-      <dsp:style>
-        <a:lnRef idx="2">
-          <a:scrgbClr r="0" g="0" b="0"/>
-        </a:lnRef>
-        <a:fillRef idx="1">
-          <a:scrgbClr r="0" g="0" b="0"/>
-        </a:fillRef>
-        <a:effectRef idx="0">
-          <a:scrgbClr r="0" g="0" b="0"/>
-        </a:effectRef>
-        <a:fontRef idx="minor"/>
-      </dsp:style>
-    </dsp:sp>
-    <dsp:sp modelId="{F81CC63E-0F2A-4658-9755-F7B068B932A7}">
-      <dsp:nvSpPr>
-        <dsp:cNvPr id="0" name=""/>
-        <dsp:cNvSpPr/>
-      </dsp:nvSpPr>
-      <dsp:spPr>
-        <a:xfrm>
-          <a:off x="1054074" y="2851195"/>
-          <a:ext cx="181737" cy="156713"/>
-        </a:xfrm>
-        <a:prstGeom prst="hexagon">
-          <a:avLst>
-            <a:gd name="adj" fmla="val 25000"/>
-            <a:gd name="vf" fmla="val 115470"/>
-          </a:avLst>
-        </a:prstGeom>
-        <a:solidFill>
-          <a:schemeClr val="lt1">
-            <a:hueOff val="0"/>
-            <a:satOff val="0"/>
-            <a:lumOff val="0"/>
-            <a:alphaOff val="0"/>
-          </a:schemeClr>
-        </a:solidFill>
-        <a:ln w="25400" cap="flat" cmpd="sng" algn="ctr">
-          <a:solidFill>
-            <a:schemeClr val="accent3">
-              <a:hueOff val="-249292"/>
-              <a:satOff val="9"/>
-              <a:lumOff val="4314"/>
-              <a:alphaOff val="0"/>
-            </a:schemeClr>
-          </a:solidFill>
-          <a:prstDash val="solid"/>
-        </a:ln>
-        <a:effectLst/>
-      </dsp:spPr>
-      <dsp:style>
-        <a:lnRef idx="2">
-          <a:scrgbClr r="0" g="0" b="0"/>
-        </a:lnRef>
-        <a:fillRef idx="1">
-          <a:scrgbClr r="0" g="0" b="0"/>
-        </a:fillRef>
-        <a:effectRef idx="0">
-          <a:scrgbClr r="0" g="0" b="0"/>
-        </a:effectRef>
-        <a:fontRef idx="minor"/>
-      </dsp:style>
-    </dsp:sp>
-    <dsp:sp modelId="{4865F3E4-2BF3-4573-865D-246EBC09B859}">
-      <dsp:nvSpPr>
-        <dsp:cNvPr id="0" name=""/>
-        <dsp:cNvSpPr/>
-      </dsp:nvSpPr>
-      <dsp:spPr>
-        <a:xfrm>
-          <a:off x="2641701" y="1689958"/>
-          <a:ext cx="1556766" cy="1336304"/>
-        </a:xfrm>
-        <a:prstGeom prst="hexagon">
-          <a:avLst>
-            <a:gd name="adj" fmla="val 25000"/>
-            <a:gd name="vf" fmla="val 115470"/>
-          </a:avLst>
-        </a:prstGeom>
-        <a:solidFill>
-          <a:schemeClr val="accent3">
-            <a:hueOff val="-581680"/>
-            <a:satOff val="20"/>
-            <a:lumOff val="10065"/>
-            <a:alphaOff val="0"/>
-          </a:schemeClr>
-        </a:solidFill>
-        <a:ln w="25400" cap="flat" cmpd="sng" algn="ctr">
-          <a:solidFill>
-            <a:schemeClr val="accent3">
-              <a:hueOff val="-581680"/>
-              <a:satOff val="20"/>
-              <a:lumOff val="10065"/>
-              <a:alphaOff val="0"/>
-            </a:schemeClr>
-          </a:solidFill>
-          <a:prstDash val="solid"/>
-        </a:ln>
-        <a:effectLst/>
-      </dsp:spPr>
-      <dsp:style>
-        <a:lnRef idx="2">
-          <a:scrgbClr r="0" g="0" b="0"/>
-        </a:lnRef>
-        <a:fillRef idx="1">
-          <a:scrgbClr r="0" g="0" b="0"/>
-        </a:fillRef>
-        <a:effectRef idx="0">
-          <a:scrgbClr r="0" g="0" b="0"/>
-        </a:effectRef>
-        <a:fontRef idx="minor">
-          <a:schemeClr val="lt1"/>
-        </a:fontRef>
-      </dsp:style>
-      <dsp:txBody>
-        <a:bodyPr spcFirstLastPara="0" vert="horz" wrap="square" lIns="0" tIns="17780" rIns="0" bIns="17780" numCol="1" spcCol="1270" anchor="ctr" anchorCtr="0">
-          <a:noAutofit/>
-        </a:bodyPr>
-        <a:lstStyle/>
-        <a:p>
-          <a:pPr lvl="0" algn="ctr" defTabSz="622300">
-            <a:lnSpc>
-              <a:spcPct val="90000"/>
-            </a:lnSpc>
-            <a:spcBef>
-              <a:spcPct val="0"/>
-            </a:spcBef>
-            <a:spcAft>
-              <a:spcPct val="35000"/>
-            </a:spcAft>
-          </a:pPr>
-          <a:r>
-            <a:rPr lang="en-US" sz="1400" kern="1200" noProof="0" dirty="0" smtClean="0"/>
-            <a:t>3</a:t>
-          </a:r>
-          <a:br>
-            <a:rPr lang="en-US" sz="1400" kern="1200" noProof="0" dirty="0" smtClean="0"/>
-          </a:br>
-          <a:r>
-            <a:rPr lang="en-US" sz="1400" kern="1200" noProof="0" dirty="0" smtClean="0"/>
-            <a:t>Investments Evaluation</a:t>
-          </a:r>
-          <a:endParaRPr lang="en-US" sz="1400" kern="1200" noProof="0" dirty="0"/>
-        </a:p>
-      </dsp:txBody>
-      <dsp:txXfrm>
-        <a:off x="2882790" y="1896905"/>
-        <a:ext cx="1074588" cy="922410"/>
-      </dsp:txXfrm>
-    </dsp:sp>
-    <dsp:sp modelId="{C2FE54F3-8D10-4729-9B28-34CBAB13F171}">
-      <dsp:nvSpPr>
-        <dsp:cNvPr id="0" name=""/>
-        <dsp:cNvSpPr/>
-      </dsp:nvSpPr>
-      <dsp:spPr>
-        <a:xfrm>
-          <a:off x="3708120" y="2839547"/>
-          <a:ext cx="181737" cy="156713"/>
-        </a:xfrm>
-        <a:prstGeom prst="hexagon">
-          <a:avLst>
-            <a:gd name="adj" fmla="val 25000"/>
-            <a:gd name="vf" fmla="val 115470"/>
-          </a:avLst>
-        </a:prstGeom>
-        <a:solidFill>
-          <a:schemeClr val="lt1">
-            <a:hueOff val="0"/>
-            <a:satOff val="0"/>
-            <a:lumOff val="0"/>
-            <a:alphaOff val="0"/>
-          </a:schemeClr>
-        </a:solidFill>
-        <a:ln w="25400" cap="flat" cmpd="sng" algn="ctr">
-          <a:solidFill>
-            <a:schemeClr val="accent3">
-              <a:hueOff val="-498583"/>
-              <a:satOff val="17"/>
-              <a:lumOff val="8627"/>
-              <a:alphaOff val="0"/>
-            </a:schemeClr>
-          </a:solidFill>
-          <a:prstDash val="solid"/>
-        </a:ln>
-        <a:effectLst/>
-      </dsp:spPr>
-      <dsp:style>
-        <a:lnRef idx="2">
-          <a:scrgbClr r="0" g="0" b="0"/>
-        </a:lnRef>
-        <a:fillRef idx="1">
-          <a:scrgbClr r="0" g="0" b="0"/>
-        </a:fillRef>
-        <a:effectRef idx="0">
-          <a:scrgbClr r="0" g="0" b="0"/>
-        </a:effectRef>
-        <a:fontRef idx="minor"/>
-      </dsp:style>
-    </dsp:sp>
-    <dsp:sp modelId="{170501A5-BA12-4371-9113-53BC59394719}">
-      <dsp:nvSpPr>
-        <dsp:cNvPr id="0" name=""/>
-        <dsp:cNvSpPr/>
-      </dsp:nvSpPr>
-      <dsp:spPr>
-        <a:xfrm>
-          <a:off x="3968724" y="2424467"/>
-          <a:ext cx="1556766" cy="1336304"/>
-        </a:xfrm>
-        <a:prstGeom prst="hexagon">
-          <a:avLst>
-            <a:gd name="adj" fmla="val 25000"/>
-            <a:gd name="vf" fmla="val 115470"/>
-          </a:avLst>
-        </a:prstGeom>
-        <a:blipFill rotWithShape="1">
-          <a:blip xmlns:r="http://schemas.openxmlformats.org/officeDocument/2006/relationships" r:embed="rId2"/>
-          <a:stretch>
-            <a:fillRect/>
-          </a:stretch>
-        </a:blipFill>
-        <a:ln w="25400" cap="flat" cmpd="sng" algn="ctr">
-          <a:solidFill>
-            <a:schemeClr val="accent3">
-              <a:hueOff val="-581680"/>
-              <a:satOff val="20"/>
-              <a:lumOff val="10065"/>
-              <a:alphaOff val="0"/>
-            </a:schemeClr>
-          </a:solidFill>
-          <a:prstDash val="solid"/>
-        </a:ln>
-        <a:effectLst/>
-      </dsp:spPr>
-      <dsp:style>
-        <a:lnRef idx="2">
-          <a:scrgbClr r="0" g="0" b="0"/>
-        </a:lnRef>
-        <a:fillRef idx="1">
-          <a:scrgbClr r="0" g="0" b="0"/>
-        </a:fillRef>
-        <a:effectRef idx="0">
-          <a:scrgbClr r="0" g="0" b="0"/>
-        </a:effectRef>
-        <a:fontRef idx="minor"/>
-      </dsp:style>
-    </dsp:sp>
-    <dsp:sp modelId="{1DBBCE42-7C90-47BA-BCA7-A80C56CDE4BB}">
-      <dsp:nvSpPr>
-        <dsp:cNvPr id="0" name=""/>
-        <dsp:cNvSpPr/>
-      </dsp:nvSpPr>
-      <dsp:spPr>
-        <a:xfrm>
-          <a:off x="4004386" y="3023086"/>
-          <a:ext cx="181737" cy="156713"/>
-        </a:xfrm>
-        <a:prstGeom prst="hexagon">
-          <a:avLst>
-            <a:gd name="adj" fmla="val 25000"/>
-            <a:gd name="vf" fmla="val 115470"/>
-          </a:avLst>
-        </a:prstGeom>
-        <a:solidFill>
-          <a:schemeClr val="lt1">
-            <a:hueOff val="0"/>
-            <a:satOff val="0"/>
-            <a:lumOff val="0"/>
-            <a:alphaOff val="0"/>
-          </a:schemeClr>
-        </a:solidFill>
-        <a:ln w="25400" cap="flat" cmpd="sng" algn="ctr">
-          <a:solidFill>
-            <a:schemeClr val="accent3">
-              <a:hueOff val="-747875"/>
-              <a:satOff val="26"/>
-              <a:lumOff val="12941"/>
-              <a:alphaOff val="0"/>
-            </a:schemeClr>
-          </a:solidFill>
-          <a:prstDash val="solid"/>
-        </a:ln>
-        <a:effectLst/>
-      </dsp:spPr>
-      <dsp:style>
-        <a:lnRef idx="2">
-          <a:scrgbClr r="0" g="0" b="0"/>
-        </a:lnRef>
-        <a:fillRef idx="1">
-          <a:scrgbClr r="0" g="0" b="0"/>
-        </a:fillRef>
-        <a:effectRef idx="0">
-          <a:scrgbClr r="0" g="0" b="0"/>
-        </a:effectRef>
-        <a:fontRef idx="minor"/>
-      </dsp:style>
-    </dsp:sp>
-    <dsp:sp modelId="{8CF579C5-F3BA-40E8-92C5-7FFCB1570E22}">
-      <dsp:nvSpPr>
-        <dsp:cNvPr id="0" name=""/>
-        <dsp:cNvSpPr/>
-      </dsp:nvSpPr>
-      <dsp:spPr>
-        <a:xfrm>
-          <a:off x="1321536" y="969921"/>
-          <a:ext cx="1556766" cy="1336304"/>
-        </a:xfrm>
-        <a:prstGeom prst="hexagon">
-          <a:avLst>
-            <a:gd name="adj" fmla="val 25000"/>
-            <a:gd name="vf" fmla="val 115470"/>
-          </a:avLst>
-        </a:prstGeom>
-        <a:solidFill>
-          <a:schemeClr val="accent3">
-            <a:hueOff val="-1163361"/>
-            <a:satOff val="41"/>
-            <a:lumOff val="20130"/>
-            <a:alphaOff val="0"/>
-          </a:schemeClr>
-        </a:solidFill>
-        <a:ln w="25400" cap="flat" cmpd="sng" algn="ctr">
-          <a:solidFill>
-            <a:schemeClr val="accent3">
-              <a:hueOff val="-1163361"/>
-              <a:satOff val="41"/>
-              <a:lumOff val="20130"/>
-              <a:alphaOff val="0"/>
-            </a:schemeClr>
-          </a:solidFill>
-          <a:prstDash val="solid"/>
-        </a:ln>
-        <a:effectLst/>
-      </dsp:spPr>
-      <dsp:style>
-        <a:lnRef idx="2">
-          <a:scrgbClr r="0" g="0" b="0"/>
-        </a:lnRef>
-        <a:fillRef idx="1">
-          <a:scrgbClr r="0" g="0" b="0"/>
-        </a:fillRef>
-        <a:effectRef idx="0">
-          <a:scrgbClr r="0" g="0" b="0"/>
-        </a:effectRef>
-        <a:fontRef idx="minor">
-          <a:schemeClr val="lt1"/>
-        </a:fontRef>
-      </dsp:style>
-      <dsp:txBody>
-        <a:bodyPr spcFirstLastPara="0" vert="horz" wrap="square" lIns="0" tIns="17780" rIns="0" bIns="17780" numCol="1" spcCol="1270" anchor="ctr" anchorCtr="0">
-          <a:noAutofit/>
-        </a:bodyPr>
-        <a:lstStyle/>
-        <a:p>
-          <a:pPr lvl="0" algn="ctr" defTabSz="622300">
-            <a:lnSpc>
-              <a:spcPct val="90000"/>
-            </a:lnSpc>
-            <a:spcBef>
-              <a:spcPct val="0"/>
-            </a:spcBef>
-            <a:spcAft>
-              <a:spcPct val="35000"/>
-            </a:spcAft>
-          </a:pPr>
-          <a:r>
-            <a:rPr lang="en-US" sz="1400" kern="1200" noProof="0" dirty="0" smtClean="0"/>
-            <a:t>1</a:t>
-          </a:r>
-          <a:br>
-            <a:rPr lang="en-US" sz="1400" kern="1200" noProof="0" dirty="0" smtClean="0"/>
-          </a:br>
-          <a:r>
-            <a:rPr lang="en-US" sz="1400" kern="1200" noProof="0" dirty="0" smtClean="0"/>
-            <a:t>Creating Plans</a:t>
-          </a:r>
-          <a:endParaRPr lang="en-US" sz="1400" kern="1200" noProof="0" dirty="0"/>
-        </a:p>
-      </dsp:txBody>
-      <dsp:txXfrm>
-        <a:off x="1562625" y="1176868"/>
-        <a:ext cx="1074588" cy="922410"/>
-      </dsp:txXfrm>
-    </dsp:sp>
-    <dsp:sp modelId="{AA67886B-5FEE-46E0-9090-01D3AE885E51}">
-      <dsp:nvSpPr>
-        <dsp:cNvPr id="0" name=""/>
-        <dsp:cNvSpPr/>
-      </dsp:nvSpPr>
-      <dsp:spPr>
-        <a:xfrm>
-          <a:off x="2381097" y="997452"/>
-          <a:ext cx="181737" cy="156713"/>
-        </a:xfrm>
-        <a:prstGeom prst="hexagon">
-          <a:avLst>
-            <a:gd name="adj" fmla="val 25000"/>
-            <a:gd name="vf" fmla="val 115470"/>
-          </a:avLst>
-        </a:prstGeom>
-        <a:solidFill>
-          <a:schemeClr val="lt1">
-            <a:hueOff val="0"/>
-            <a:satOff val="0"/>
-            <a:lumOff val="0"/>
-            <a:alphaOff val="0"/>
-          </a:schemeClr>
-        </a:solidFill>
-        <a:ln w="25400" cap="flat" cmpd="sng" algn="ctr">
-          <a:solidFill>
-            <a:schemeClr val="accent3">
-              <a:hueOff val="-997166"/>
-              <a:satOff val="35"/>
-              <a:lumOff val="17254"/>
-              <a:alphaOff val="0"/>
-            </a:schemeClr>
-          </a:solidFill>
-          <a:prstDash val="solid"/>
-        </a:ln>
-        <a:effectLst/>
-      </dsp:spPr>
-      <dsp:style>
-        <a:lnRef idx="2">
-          <a:scrgbClr r="0" g="0" b="0"/>
-        </a:lnRef>
-        <a:fillRef idx="1">
-          <a:scrgbClr r="0" g="0" b="0"/>
-        </a:fillRef>
-        <a:effectRef idx="0">
-          <a:scrgbClr r="0" g="0" b="0"/>
-        </a:effectRef>
-        <a:fontRef idx="minor"/>
-      </dsp:style>
-    </dsp:sp>
-    <dsp:sp modelId="{FBEA44B1-C680-45F1-B168-243FA9AC2687}">
-      <dsp:nvSpPr>
-        <dsp:cNvPr id="0" name=""/>
-        <dsp:cNvSpPr/>
-      </dsp:nvSpPr>
-      <dsp:spPr>
-        <a:xfrm>
-          <a:off x="2641701" y="233295"/>
-          <a:ext cx="1556766" cy="1336304"/>
-        </a:xfrm>
-        <a:prstGeom prst="hexagon">
-          <a:avLst>
-            <a:gd name="adj" fmla="val 25000"/>
-            <a:gd name="vf" fmla="val 115470"/>
-          </a:avLst>
-        </a:prstGeom>
-        <a:blipFill rotWithShape="1">
-          <a:blip xmlns:r="http://schemas.openxmlformats.org/officeDocument/2006/relationships" r:embed="rId3"/>
-          <a:stretch>
-            <a:fillRect/>
-          </a:stretch>
-        </a:blipFill>
-        <a:ln w="25400" cap="flat" cmpd="sng" algn="ctr">
-          <a:solidFill>
-            <a:schemeClr val="accent3">
-              <a:hueOff val="-1163361"/>
-              <a:satOff val="41"/>
-              <a:lumOff val="20130"/>
-              <a:alphaOff val="0"/>
-            </a:schemeClr>
-          </a:solidFill>
-          <a:prstDash val="solid"/>
-        </a:ln>
-        <a:effectLst/>
-      </dsp:spPr>
-      <dsp:style>
-        <a:lnRef idx="2">
-          <a:scrgbClr r="0" g="0" b="0"/>
-        </a:lnRef>
-        <a:fillRef idx="1">
-          <a:scrgbClr r="0" g="0" b="0"/>
-        </a:fillRef>
-        <a:effectRef idx="0">
-          <a:scrgbClr r="0" g="0" b="0"/>
-        </a:effectRef>
-        <a:fontRef idx="minor"/>
-      </dsp:style>
-    </dsp:sp>
-    <dsp:sp modelId="{D868C442-8C21-4E36-9A15-4104C88F74E8}">
-      <dsp:nvSpPr>
-        <dsp:cNvPr id="0" name=""/>
-        <dsp:cNvSpPr/>
-      </dsp:nvSpPr>
-      <dsp:spPr>
-        <a:xfrm>
-          <a:off x="2677363" y="825561"/>
-          <a:ext cx="181737" cy="156713"/>
-        </a:xfrm>
-        <a:prstGeom prst="hexagon">
-          <a:avLst>
-            <a:gd name="adj" fmla="val 25000"/>
-            <a:gd name="vf" fmla="val 115470"/>
-          </a:avLst>
-        </a:prstGeom>
-        <a:solidFill>
-          <a:schemeClr val="lt1">
-            <a:hueOff val="0"/>
-            <a:satOff val="0"/>
-            <a:lumOff val="0"/>
-            <a:alphaOff val="0"/>
-          </a:schemeClr>
-        </a:solidFill>
-        <a:ln w="25400" cap="flat" cmpd="sng" algn="ctr">
-          <a:solidFill>
-            <a:schemeClr val="accent3">
-              <a:hueOff val="-1246458"/>
-              <a:satOff val="44"/>
-              <a:lumOff val="21568"/>
-              <a:alphaOff val="0"/>
-            </a:schemeClr>
-          </a:solidFill>
-          <a:prstDash val="solid"/>
-        </a:ln>
-        <a:effectLst/>
-      </dsp:spPr>
-      <dsp:style>
-        <a:lnRef idx="2">
-          <a:scrgbClr r="0" g="0" b="0"/>
-        </a:lnRef>
-        <a:fillRef idx="1">
-          <a:scrgbClr r="0" g="0" b="0"/>
-        </a:fillRef>
-        <a:effectRef idx="0">
-          <a:scrgbClr r="0" g="0" b="0"/>
-        </a:effectRef>
-        <a:fontRef idx="minor"/>
-      </dsp:style>
-    </dsp:sp>
-    <dsp:sp modelId="{47A71B95-6E98-419E-B6A1-6E4D58262FC1}">
-      <dsp:nvSpPr>
-        <dsp:cNvPr id="0" name=""/>
-        <dsp:cNvSpPr/>
-      </dsp:nvSpPr>
-      <dsp:spPr>
-        <a:xfrm>
-          <a:off x="3968724" y="967804"/>
-          <a:ext cx="1556766" cy="1336304"/>
-        </a:xfrm>
-        <a:prstGeom prst="hexagon">
-          <a:avLst>
-            <a:gd name="adj" fmla="val 25000"/>
-            <a:gd name="vf" fmla="val 115470"/>
-          </a:avLst>
-        </a:prstGeom>
-        <a:solidFill>
-          <a:schemeClr val="accent3">
-            <a:hueOff val="-1745041"/>
-            <a:satOff val="61"/>
-            <a:lumOff val="30195"/>
-            <a:alphaOff val="0"/>
-          </a:schemeClr>
-        </a:solidFill>
-        <a:ln w="25400" cap="flat" cmpd="sng" algn="ctr">
-          <a:solidFill>
-            <a:schemeClr val="accent3">
-              <a:hueOff val="-1745041"/>
-              <a:satOff val="61"/>
-              <a:lumOff val="30195"/>
-              <a:alphaOff val="0"/>
-            </a:schemeClr>
-          </a:solidFill>
-          <a:prstDash val="solid"/>
-        </a:ln>
-        <a:effectLst/>
-      </dsp:spPr>
-      <dsp:style>
-        <a:lnRef idx="2">
-          <a:scrgbClr r="0" g="0" b="0"/>
-        </a:lnRef>
-        <a:fillRef idx="1">
-          <a:scrgbClr r="0" g="0" b="0"/>
-        </a:fillRef>
-        <a:effectRef idx="0">
-          <a:scrgbClr r="0" g="0" b="0"/>
-        </a:effectRef>
-        <a:fontRef idx="minor">
-          <a:schemeClr val="lt1"/>
-        </a:fontRef>
-      </dsp:style>
-      <dsp:txBody>
-        <a:bodyPr spcFirstLastPara="0" vert="horz" wrap="square" lIns="0" tIns="17780" rIns="0" bIns="17780" numCol="1" spcCol="1270" anchor="ctr" anchorCtr="0">
-          <a:noAutofit/>
-        </a:bodyPr>
-        <a:lstStyle/>
-        <a:p>
-          <a:pPr lvl="0" algn="ctr" defTabSz="622300">
-            <a:lnSpc>
-              <a:spcPct val="90000"/>
-            </a:lnSpc>
-            <a:spcBef>
-              <a:spcPct val="0"/>
-            </a:spcBef>
-            <a:spcAft>
-              <a:spcPct val="35000"/>
-            </a:spcAft>
-          </a:pPr>
-          <a:r>
-            <a:rPr lang="en-US" sz="1400" kern="1200" noProof="0" dirty="0" smtClean="0"/>
-            <a:t>4</a:t>
-          </a:r>
-          <a:br>
-            <a:rPr lang="en-US" sz="1400" kern="1200" noProof="0" dirty="0" smtClean="0"/>
-          </a:br>
-          <a:r>
-            <a:rPr lang="en-US" sz="1400" kern="1200" noProof="0" dirty="0" smtClean="0"/>
-            <a:t>Top-Down Portfolios</a:t>
-          </a:r>
-          <a:endParaRPr lang="en-US" sz="1400" kern="1200" noProof="0" dirty="0"/>
-        </a:p>
-      </dsp:txBody>
-      <dsp:txXfrm>
-        <a:off x="4209813" y="1174751"/>
-        <a:ext cx="1074588" cy="922410"/>
-      </dsp:txXfrm>
-    </dsp:sp>
-    <dsp:sp modelId="{1B16F8AB-AD59-4ECA-8278-04E99ECD0661}">
-      <dsp:nvSpPr>
-        <dsp:cNvPr id="0" name=""/>
-        <dsp:cNvSpPr/>
-      </dsp:nvSpPr>
-      <dsp:spPr>
-        <a:xfrm>
-          <a:off x="5307406" y="1557599"/>
-          <a:ext cx="181737" cy="156713"/>
-        </a:xfrm>
-        <a:prstGeom prst="hexagon">
-          <a:avLst>
-            <a:gd name="adj" fmla="val 25000"/>
-            <a:gd name="vf" fmla="val 115470"/>
-          </a:avLst>
-        </a:prstGeom>
-        <a:solidFill>
-          <a:schemeClr val="lt1">
-            <a:hueOff val="0"/>
-            <a:satOff val="0"/>
-            <a:lumOff val="0"/>
-            <a:alphaOff val="0"/>
-          </a:schemeClr>
-        </a:solidFill>
-        <a:ln w="25400" cap="flat" cmpd="sng" algn="ctr">
-          <a:solidFill>
-            <a:schemeClr val="accent3">
-              <a:hueOff val="-1495749"/>
-              <a:satOff val="52"/>
-              <a:lumOff val="25881"/>
-              <a:alphaOff val="0"/>
-            </a:schemeClr>
-          </a:solidFill>
-          <a:prstDash val="solid"/>
-        </a:ln>
-        <a:effectLst/>
-      </dsp:spPr>
-      <dsp:style>
-        <a:lnRef idx="2">
-          <a:scrgbClr r="0" g="0" b="0"/>
-        </a:lnRef>
-        <a:fillRef idx="1">
-          <a:scrgbClr r="0" g="0" b="0"/>
-        </a:fillRef>
-        <a:effectRef idx="0">
-          <a:scrgbClr r="0" g="0" b="0"/>
-        </a:effectRef>
-        <a:fontRef idx="minor"/>
-      </dsp:style>
-    </dsp:sp>
-    <dsp:sp modelId="{4F982654-55B9-4DD6-8184-50EE9DAC6865}">
-      <dsp:nvSpPr>
-        <dsp:cNvPr id="0" name=""/>
-        <dsp:cNvSpPr/>
-      </dsp:nvSpPr>
-      <dsp:spPr>
-        <a:xfrm>
-          <a:off x="5301234" y="1702312"/>
-          <a:ext cx="1556766" cy="1336304"/>
-        </a:xfrm>
-        <a:prstGeom prst="hexagon">
-          <a:avLst>
-            <a:gd name="adj" fmla="val 25000"/>
-            <a:gd name="vf" fmla="val 115470"/>
-          </a:avLst>
-        </a:prstGeom>
-        <a:blipFill rotWithShape="1">
-          <a:blip xmlns:r="http://schemas.openxmlformats.org/officeDocument/2006/relationships" r:embed="rId4"/>
-          <a:stretch>
-            <a:fillRect/>
-          </a:stretch>
-        </a:blipFill>
-        <a:ln w="25400" cap="flat" cmpd="sng" algn="ctr">
-          <a:solidFill>
-            <a:schemeClr val="accent3">
-              <a:hueOff val="-1745041"/>
-              <a:satOff val="61"/>
-              <a:lumOff val="30195"/>
-              <a:alphaOff val="0"/>
-            </a:schemeClr>
-          </a:solidFill>
-          <a:prstDash val="solid"/>
-        </a:ln>
-        <a:effectLst/>
-      </dsp:spPr>
-      <dsp:style>
-        <a:lnRef idx="2">
-          <a:scrgbClr r="0" g="0" b="0"/>
-        </a:lnRef>
-        <a:fillRef idx="1">
-          <a:scrgbClr r="0" g="0" b="0"/>
-        </a:fillRef>
-        <a:effectRef idx="0">
-          <a:scrgbClr r="0" g="0" b="0"/>
-        </a:effectRef>
-        <a:fontRef idx="minor"/>
-      </dsp:style>
-    </dsp:sp>
-    <dsp:sp modelId="{FEC8334F-31FE-49FD-AEB2-FCF32AF35E17}">
-      <dsp:nvSpPr>
-        <dsp:cNvPr id="0" name=""/>
-        <dsp:cNvSpPr/>
-      </dsp:nvSpPr>
-      <dsp:spPr>
-        <a:xfrm>
-          <a:off x="5615330" y="1725960"/>
-          <a:ext cx="181737" cy="156713"/>
-        </a:xfrm>
-        <a:prstGeom prst="hexagon">
-          <a:avLst>
-            <a:gd name="adj" fmla="val 25000"/>
-            <a:gd name="vf" fmla="val 115470"/>
-          </a:avLst>
-        </a:prstGeom>
-        <a:solidFill>
-          <a:schemeClr val="lt1">
-            <a:hueOff val="0"/>
-            <a:satOff val="0"/>
-            <a:lumOff val="0"/>
-            <a:alphaOff val="0"/>
-          </a:schemeClr>
-        </a:solidFill>
-        <a:ln w="25400" cap="flat" cmpd="sng" algn="ctr">
-          <a:solidFill>
-            <a:schemeClr val="accent3">
-              <a:hueOff val="-1745041"/>
-              <a:satOff val="61"/>
-              <a:lumOff val="30195"/>
-              <a:alphaOff val="0"/>
-            </a:schemeClr>
-          </a:solidFill>
-          <a:prstDash val="solid"/>
-        </a:ln>
-        <a:effectLst/>
-      </dsp:spPr>
-      <dsp:style>
-        <a:lnRef idx="2">
-          <a:scrgbClr r="0" g="0" b="0"/>
-        </a:lnRef>
-        <a:fillRef idx="1">
-          <a:scrgbClr r="0" g="0" b="0"/>
-        </a:fillRef>
-        <a:effectRef idx="0">
-          <a:scrgbClr r="0" g="0" b="0"/>
-        </a:effectRef>
-        <a:fontRef idx="minor"/>
-      </dsp:style>
-    </dsp:sp>
   </dsp:spTree>
 </dsp:drawing>
 </file>
@@ -8761,16 +7822,111 @@
           </a:bodyPr>
           <a:lstStyle/>
           <a:p>
-            <a:endParaRPr lang="en-US" dirty="0" smtClean="0">
+            <a:pPr eaLnBrk="1" hangingPunct="1">
+              <a:spcBef>
+                <a:spcPct val="0"/>
+              </a:spcBef>
+            </a:pPr>
+            <a:r>
+              <a:rPr lang="en-US" noProof="0" dirty="0" smtClean="0">
+                <a:latin typeface="CA Sans" pitchFamily="50" charset="0"/>
+              </a:rPr>
+              <a:t>For easy-of-use and implementation we are presenting the new features in four big groups,</a:t>
+            </a:r>
+            <a:r>
+              <a:rPr lang="en-US" baseline="0" noProof="0" dirty="0" smtClean="0">
+                <a:latin typeface="CA Sans" pitchFamily="50" charset="0"/>
+              </a:rPr>
+              <a:t> and we present them in the order they would usually be implemented:</a:t>
+            </a:r>
+          </a:p>
+          <a:p>
+            <a:pPr marL="228600" indent="-228600" eaLnBrk="1" hangingPunct="1">
+              <a:spcBef>
+                <a:spcPct val="0"/>
+              </a:spcBef>
+              <a:buAutoNum type="arabicParenR"/>
+            </a:pPr>
+            <a:r>
+              <a:rPr lang="en-US" baseline="0" noProof="0" dirty="0" smtClean="0">
+                <a:latin typeface="CA Sans" pitchFamily="50" charset="0"/>
+              </a:rPr>
+              <a:t>Strategic Maps with Items and related Strategic Projects</a:t>
+            </a:r>
+          </a:p>
+          <a:p>
+            <a:pPr marL="228600" marR="0" indent="-228600" algn="l" defTabSz="914400" rtl="0" eaLnBrk="1" fontAlgn="auto" latinLnBrk="0" hangingPunct="1">
+              <a:lnSpc>
+                <a:spcPct val="100000"/>
+              </a:lnSpc>
+              <a:spcBef>
+                <a:spcPct val="0"/>
+              </a:spcBef>
+              <a:spcAft>
+                <a:spcPts val="0"/>
+              </a:spcAft>
+              <a:buClrTx/>
+              <a:buSzTx/>
+              <a:buFontTx/>
+              <a:buAutoNum type="arabicParenR"/>
+              <a:tabLst/>
+              <a:defRPr/>
+            </a:pPr>
+            <a:r>
+              <a:rPr lang="en-US" baseline="0" noProof="0" dirty="0" smtClean="0">
+                <a:latin typeface="CA Sans" pitchFamily="50" charset="0"/>
+              </a:rPr>
+              <a:t>Strategic Review and Monitoring</a:t>
+            </a:r>
+            <a:endParaRPr lang="en-US" noProof="0" dirty="0" smtClean="0">
               <a:latin typeface="CA Sans" pitchFamily="50" charset="0"/>
             </a:endParaRPr>
+          </a:p>
+          <a:p>
+            <a:pPr marL="228600" indent="-228600" eaLnBrk="1" hangingPunct="1">
+              <a:spcBef>
+                <a:spcPct val="0"/>
+              </a:spcBef>
+              <a:buAutoNum type="arabicParenR"/>
+            </a:pPr>
+            <a:r>
+              <a:rPr lang="en-US" baseline="0" noProof="0" dirty="0" smtClean="0">
+                <a:latin typeface="CA Sans" pitchFamily="50" charset="0"/>
+              </a:rPr>
+              <a:t>Investment Evaluation for Selection and Prioritization</a:t>
+            </a:r>
+          </a:p>
+          <a:p>
+            <a:pPr marL="228600" marR="0" indent="-228600" algn="l" defTabSz="914400" rtl="0" eaLnBrk="1" fontAlgn="auto" latinLnBrk="0" hangingPunct="1">
+              <a:lnSpc>
+                <a:spcPct val="100000"/>
+              </a:lnSpc>
+              <a:spcBef>
+                <a:spcPct val="0"/>
+              </a:spcBef>
+              <a:spcAft>
+                <a:spcPts val="0"/>
+              </a:spcAft>
+              <a:buClrTx/>
+              <a:buSzTx/>
+              <a:buFontTx/>
+              <a:buAutoNum type="arabicParenR"/>
+              <a:tabLst/>
+              <a:defRPr/>
+            </a:pPr>
+            <a:r>
+              <a:rPr lang="en-US" baseline="0" noProof="0" dirty="0" smtClean="0">
+                <a:latin typeface="CA Sans" pitchFamily="50" charset="0"/>
+              </a:rPr>
+              <a:t>Top-Down Portfolio Planning to distribute Funds and Headcount</a:t>
+            </a:r>
           </a:p>
         </p:txBody>
       </p:sp>
     </p:spTree>
     <p:extLst>
       <p:ext uri="{BB962C8B-B14F-4D97-AF65-F5344CB8AC3E}">
-        <p14:creationId xmlns:p14="http://schemas.microsoft.com/office/powerpoint/2010/main" val="532436232"/>
+        <p14:creationId xmlns:p14="http://schemas.microsoft.com/office/powerpoint/2010/main" val="2135870413"/>
       </p:ext>
     </p:extLst>
   </p:cSld>
@@ -8850,7 +8006,7 @@
     </p:spTree>
     <p:extLst>
       <p:ext uri="{BB962C8B-B14F-4D97-AF65-F5344CB8AC3E}">
-        <p14:creationId xmlns:p14="http://schemas.microsoft.com/office/powerpoint/2010/main" val="3148962104"/>
+        <p14:creationId xmlns:p14="http://schemas.microsoft.com/office/powerpoint/2010/main" val="532436232"/>
       </p:ext>
     </p:extLst>
   </p:cSld>
@@ -8930,6 +8086,86 @@
     </p:spTree>
     <p:extLst>
       <p:ext uri="{BB962C8B-B14F-4D97-AF65-F5344CB8AC3E}">
+        <p14:creationId xmlns:p14="http://schemas.microsoft.com/office/powerpoint/2010/main" val="3148962104"/>
+      </p:ext>
+    </p:extLst>
+  </p:cSld>
+  <p:clrMapOvr>
+    <a:masterClrMapping/>
+  </p:clrMapOvr>
+</p:notes>
+</file>
+
+<file path=ppt/notesSlides/notesSlide13.xml><?xml version="1.0" encoding="utf-8"?>
+<p:notes xmlns:a="http://schemas.openxmlformats.org/drawingml/2006/main" xmlns:r="http://schemas.openxmlformats.org/officeDocument/2006/relationships" xmlns:p="http://schemas.openxmlformats.org/presentationml/2006/main">
+  <p:cSld>
+    <p:spTree>
+      <p:nvGrpSpPr>
+        <p:cNvPr id="1" name=""/>
+        <p:cNvGrpSpPr/>
+        <p:nvPr/>
+      </p:nvGrpSpPr>
+      <p:grpSpPr>
+        <a:xfrm>
+          <a:off x="0" y="0"/>
+          <a:ext cx="0" cy="0"/>
+          <a:chOff x="0" y="0"/>
+          <a:chExt cx="0" cy="0"/>
+        </a:xfrm>
+      </p:grpSpPr>
+      <p:sp>
+        <p:nvSpPr>
+          <p:cNvPr id="23554" name="Rectangle 2"/>
+          <p:cNvSpPr>
+            <a:spLocks noGrp="1" noRot="1" noChangeAspect="1" noChangeArrowheads="1" noTextEdit="1"/>
+          </p:cNvSpPr>
+          <p:nvPr>
+            <p:ph type="sldImg"/>
+          </p:nvPr>
+        </p:nvSpPr>
+        <p:spPr bwMode="auto">
+          <a:noFill/>
+          <a:ln cap="flat">
+            <a:solidFill>
+              <a:srgbClr val="000000"/>
+            </a:solidFill>
+            <a:miter lim="800000"/>
+            <a:headEnd/>
+            <a:tailEnd/>
+          </a:ln>
+        </p:spPr>
+      </p:sp>
+      <p:sp>
+        <p:nvSpPr>
+          <p:cNvPr id="23555" name="Rectangle 3"/>
+          <p:cNvSpPr>
+            <a:spLocks noGrp="1" noChangeArrowheads="1"/>
+          </p:cNvSpPr>
+          <p:nvPr>
+            <p:ph type="body" idx="1"/>
+          </p:nvPr>
+        </p:nvSpPr>
+        <p:spPr>
+          <a:noFill/>
+        </p:spPr>
+        <p:txBody>
+          <a:bodyPr wrap="square" numCol="1" anchor="t" anchorCtr="0" compatLnSpc="1">
+            <a:prstTxWarp prst="textNoShape">
+              <a:avLst/>
+            </a:prstTxWarp>
+            <a:normAutofit/>
+          </a:bodyPr>
+          <a:lstStyle/>
+          <a:p>
+            <a:endParaRPr lang="en-US" dirty="0" smtClean="0">
+              <a:latin typeface="CA Sans" pitchFamily="50" charset="0"/>
+            </a:endParaRPr>
+          </a:p>
+        </p:txBody>
+      </p:sp>
+    </p:spTree>
+    <p:extLst>
+      <p:ext uri="{BB962C8B-B14F-4D97-AF65-F5344CB8AC3E}">
         <p14:creationId xmlns:p14="http://schemas.microsoft.com/office/powerpoint/2010/main" val="3390284380"/>
       </p:ext>
     </p:extLst>
@@ -8940,7 +8176,7 @@
 </p:notes>
 </file>
 
-<file path=ppt/notesSlides/notesSlide13.xml><?xml version="1.0" encoding="utf-8"?>
+<file path=ppt/notesSlides/notesSlide14.xml><?xml version="1.0" encoding="utf-8"?>
 <p:notes xmlns:a="http://schemas.openxmlformats.org/drawingml/2006/main" xmlns:r="http://schemas.openxmlformats.org/officeDocument/2006/relationships" xmlns:p="http://schemas.openxmlformats.org/presentationml/2006/main">
   <p:cSld>
     <p:spTree>
@@ -9282,7 +8518,7 @@
       </p:grpSpPr>
       <p:sp>
         <p:nvSpPr>
-          <p:cNvPr id="23554" name="Rectangle 2"/>
+          <p:cNvPr id="22530" name="Rectangle 2"/>
           <p:cNvSpPr>
             <a:spLocks noGrp="1" noRot="1" noChangeAspect="1" noChangeArrowheads="1" noTextEdit="1"/>
           </p:cNvSpPr>
@@ -9304,7 +8540,7 @@
       </p:sp>
       <p:sp>
         <p:nvSpPr>
-          <p:cNvPr id="23555" name="Rectangle 3"/>
+          <p:cNvPr id="22531" name="Rectangle 3"/>
           <p:cNvSpPr>
             <a:spLocks noGrp="1" noChangeArrowheads="1"/>
           </p:cNvSpPr>
@@ -9324,6 +8560,47 @@
           </a:bodyPr>
           <a:lstStyle/>
           <a:p>
+            <a:pPr eaLnBrk="1" hangingPunct="1">
+              <a:spcBef>
+                <a:spcPct val="0"/>
+              </a:spcBef>
+            </a:pPr>
+            <a:r>
+              <a:rPr lang="en-US" dirty="0" smtClean="0">
+                <a:latin typeface="CA Sans" pitchFamily="50" charset="0"/>
+              </a:rPr>
+              <a:t>Now you are going</a:t>
+            </a:r>
+            <a:r>
+              <a:rPr lang="en-US" baseline="0" dirty="0" smtClean="0">
+                <a:latin typeface="CA Sans" pitchFamily="50" charset="0"/>
+              </a:rPr>
+              <a:t> to see an idea of some features that could be implemented </a:t>
+            </a:r>
+            <a:r>
+              <a:rPr lang="en-US" dirty="0" smtClean="0">
+                <a:latin typeface="CA Sans" pitchFamily="50" charset="0"/>
+              </a:rPr>
+              <a:t>to expand the PPM “core” features</a:t>
+            </a:r>
+            <a:r>
+              <a:rPr lang="en-US" baseline="0" dirty="0" smtClean="0">
+                <a:latin typeface="CA Sans" pitchFamily="50" charset="0"/>
+              </a:rPr>
+              <a:t> </a:t>
+            </a:r>
+            <a:r>
+              <a:rPr lang="en-US" dirty="0" smtClean="0">
+                <a:latin typeface="CA Sans" pitchFamily="50" charset="0"/>
+              </a:rPr>
+              <a:t>and allow the Strategic Planning and Monitoring process to </a:t>
+            </a:r>
+            <a:r>
+              <a:rPr lang="en-US" baseline="0" dirty="0" smtClean="0">
+                <a:latin typeface="CA Sans" pitchFamily="50" charset="0"/>
+              </a:rPr>
+              <a:t>walk alongside the PPM processes. These features are not an integral part of CA PPM but can be implemented with very little effort by our CA Services and our CA Qualified Partners teams. </a:t>
+            </a:r>
             <a:endParaRPr lang="en-US" dirty="0" smtClean="0">
               <a:latin typeface="CA Sans" pitchFamily="50" charset="0"/>
             </a:endParaRPr>
@@ -9333,7 +8610,7 @@
     </p:spTree>
     <p:extLst>
       <p:ext uri="{BB962C8B-B14F-4D97-AF65-F5344CB8AC3E}">
-        <p14:creationId xmlns:p14="http://schemas.microsoft.com/office/powerpoint/2010/main" val="2923688000"/>
+        <p14:creationId xmlns:p14="http://schemas.microsoft.com/office/powerpoint/2010/main" val="3865369980"/>
       </p:ext>
     </p:extLst>
   </p:cSld>
@@ -9413,7 +8690,7 @@
     </p:spTree>
     <p:extLst>
       <p:ext uri="{BB962C8B-B14F-4D97-AF65-F5344CB8AC3E}">
-        <p14:creationId xmlns:p14="http://schemas.microsoft.com/office/powerpoint/2010/main" val="163128468"/>
+        <p14:creationId xmlns:p14="http://schemas.microsoft.com/office/powerpoint/2010/main" val="2923688000"/>
       </p:ext>
     </p:extLst>
   </p:cSld>
@@ -9493,7 +8770,7 @@
     </p:spTree>
     <p:extLst>
       <p:ext uri="{BB962C8B-B14F-4D97-AF65-F5344CB8AC3E}">
-        <p14:creationId xmlns:p14="http://schemas.microsoft.com/office/powerpoint/2010/main" val="1647992949"/>
+        <p14:creationId xmlns:p14="http://schemas.microsoft.com/office/powerpoint/2010/main" val="163128468"/>
       </p:ext>
     </p:extLst>
   </p:cSld>
@@ -9573,7 +8850,7 @@
     </p:spTree>
     <p:extLst>
       <p:ext uri="{BB962C8B-B14F-4D97-AF65-F5344CB8AC3E}">
-        <p14:creationId xmlns:p14="http://schemas.microsoft.com/office/powerpoint/2010/main" val="2994131320"/>
+        <p14:creationId xmlns:p14="http://schemas.microsoft.com/office/powerpoint/2010/main" val="1647992949"/>
       </p:ext>
     </p:extLst>
   </p:cSld>
@@ -9653,7 +8930,7 @@
     </p:spTree>
     <p:extLst>
       <p:ext uri="{BB962C8B-B14F-4D97-AF65-F5344CB8AC3E}">
-        <p14:creationId xmlns:p14="http://schemas.microsoft.com/office/powerpoint/2010/main" val="3105218244"/>
+        <p14:creationId xmlns:p14="http://schemas.microsoft.com/office/powerpoint/2010/main" val="2994131320"/>
       </p:ext>
     </p:extLst>
   </p:cSld>
@@ -9724,111 +9001,16 @@
           </a:bodyPr>
           <a:lstStyle/>
           <a:p>
-            <a:pPr eaLnBrk="1" hangingPunct="1">
-              <a:spcBef>
-                <a:spcPct val="0"/>
-              </a:spcBef>
-            </a:pPr>
-            <a:r>
-              <a:rPr lang="en-US" noProof="0" dirty="0" smtClean="0">
-                <a:latin typeface="CA Sans" pitchFamily="50" charset="0"/>
-              </a:rPr>
-              <a:t>For easy-of-use and implementation we are presenting the new features in four big groups,</a:t>
-            </a:r>
-            <a:r>
-              <a:rPr lang="en-US" baseline="0" noProof="0" dirty="0" smtClean="0">
-                <a:latin typeface="CA Sans" pitchFamily="50" charset="0"/>
-              </a:rPr>
-              <a:t> and we present them in the order they would usually be implemented:</a:t>
-            </a:r>
-          </a:p>
-          <a:p>
-            <a:pPr marL="228600" indent="-228600" eaLnBrk="1" hangingPunct="1">
-              <a:spcBef>
-                <a:spcPct val="0"/>
-              </a:spcBef>
-              <a:buAutoNum type="arabicParenR"/>
-            </a:pPr>
-            <a:r>
-              <a:rPr lang="en-US" baseline="0" noProof="0" dirty="0" smtClean="0">
-                <a:latin typeface="CA Sans" pitchFamily="50" charset="0"/>
-              </a:rPr>
-              <a:t>Strategic Maps with Items and related Strategic Projects</a:t>
-            </a:r>
-          </a:p>
-          <a:p>
-            <a:pPr marL="228600" marR="0" indent="-228600" algn="l" defTabSz="914400" rtl="0" eaLnBrk="1" fontAlgn="auto" latinLnBrk="0" hangingPunct="1">
-              <a:lnSpc>
-                <a:spcPct val="100000"/>
-              </a:lnSpc>
-              <a:spcBef>
-                <a:spcPct val="0"/>
-              </a:spcBef>
-              <a:spcAft>
-                <a:spcPts val="0"/>
-              </a:spcAft>
-              <a:buClrTx/>
-              <a:buSzTx/>
-              <a:buFontTx/>
-              <a:buAutoNum type="arabicParenR"/>
-              <a:tabLst/>
-              <a:defRPr/>
-            </a:pPr>
-            <a:r>
-              <a:rPr lang="en-US" baseline="0" noProof="0" dirty="0" smtClean="0">
-                <a:latin typeface="CA Sans" pitchFamily="50" charset="0"/>
-              </a:rPr>
-              <a:t>Strategic Review and Monitoring</a:t>
-            </a:r>
-            <a:endParaRPr lang="en-US" noProof="0" dirty="0" smtClean="0">
+            <a:endParaRPr lang="en-US" dirty="0" smtClean="0">
               <a:latin typeface="CA Sans" pitchFamily="50" charset="0"/>
             </a:endParaRPr>
-          </a:p>
-          <a:p>
-            <a:pPr marL="228600" indent="-228600" eaLnBrk="1" hangingPunct="1">
-              <a:spcBef>
-                <a:spcPct val="0"/>
-              </a:spcBef>
-              <a:buAutoNum type="arabicParenR"/>
-            </a:pPr>
-            <a:r>
-              <a:rPr lang="en-US" baseline="0" noProof="0" dirty="0" smtClean="0">
-                <a:latin typeface="CA Sans" pitchFamily="50" charset="0"/>
-              </a:rPr>
-              <a:t>Investment Evaluation for Selection and Prioritization</a:t>
-            </a:r>
-          </a:p>
-          <a:p>
-            <a:pPr marL="228600" marR="0" indent="-228600" algn="l" defTabSz="914400" rtl="0" eaLnBrk="1" fontAlgn="auto" latinLnBrk="0" hangingPunct="1">
-              <a:lnSpc>
-                <a:spcPct val="100000"/>
-              </a:lnSpc>
-              <a:spcBef>
-                <a:spcPct val="0"/>
-              </a:spcBef>
-              <a:spcAft>
-                <a:spcPts val="0"/>
-              </a:spcAft>
-              <a:buClrTx/>
-              <a:buSzTx/>
-              <a:buFontTx/>
-              <a:buAutoNum type="arabicParenR"/>
-              <a:tabLst/>
-              <a:defRPr/>
-            </a:pPr>
-            <a:r>
-              <a:rPr lang="en-US" baseline="0" noProof="0" dirty="0" smtClean="0">
-                <a:latin typeface="CA Sans" pitchFamily="50" charset="0"/>
-              </a:rPr>
-              <a:t>Top-Down Portfolio Planning to distribute Funds and Headcount</a:t>
-            </a:r>
           </a:p>
         </p:txBody>
       </p:sp>
     </p:spTree>
     <p:extLst>
       <p:ext uri="{BB962C8B-B14F-4D97-AF65-F5344CB8AC3E}">
-        <p14:creationId xmlns:p14="http://schemas.microsoft.com/office/powerpoint/2010/main" val="2135870413"/>
+        <p14:creationId xmlns:p14="http://schemas.microsoft.com/office/powerpoint/2010/main" val="3105218244"/>
       </p:ext>
     </p:extLst>
   </p:cSld>
@@ -18861,6 +18043,455 @@
           </a:p>
         </p:txBody>
       </p:sp>
+      <p:pic>
+        <p:nvPicPr>
+          <p:cNvPr id="5" name="Content Placeholder 4"/>
+          <p:cNvPicPr>
+            <a:picLocks noGrp="1" noChangeAspect="1"/>
+          </p:cNvPicPr>
+          <p:nvPr>
+            <p:ph sz="half" idx="1"/>
+          </p:nvPr>
+        </p:nvPicPr>
+        <p:blipFill>
+          <a:blip r:embed="rId3"/>
+          <a:stretch>
+            <a:fillRect/>
+          </a:stretch>
+        </p:blipFill>
+        <p:spPr>
+          <a:xfrm>
+            <a:off x="379080" y="858045"/>
+            <a:ext cx="4038600" cy="2507976"/>
+          </a:xfrm>
+          <a:prstGeom prst="rect">
+            <a:avLst/>
+          </a:prstGeom>
+        </p:spPr>
+      </p:pic>
+      <p:sp>
+        <p:nvSpPr>
+          <p:cNvPr id="3" name="Text Placeholder 2"/>
+          <p:cNvSpPr>
+            <a:spLocks noGrp="1"/>
+          </p:cNvSpPr>
+          <p:nvPr>
+            <p:ph sz="half" idx="2"/>
+          </p:nvPr>
+        </p:nvSpPr>
+        <p:spPr/>
+        <p:txBody>
+          <a:bodyPr/>
+          <a:lstStyle/>
+          <a:p>
+            <a:pPr>
+              <a:lnSpc>
+                <a:spcPts val="1800"/>
+              </a:lnSpc>
+              <a:spcAft>
+                <a:spcPts val="300"/>
+              </a:spcAft>
+            </a:pPr>
+            <a:r>
+              <a:rPr lang="en-US" sz="1600" dirty="0" smtClean="0"/>
+              <a:t>Create </a:t>
+            </a:r>
+            <a:r>
+              <a:rPr lang="en-US" sz="1600" dirty="0">
+                <a:solidFill>
+                  <a:srgbClr val="53BBD4"/>
+                </a:solidFill>
+              </a:rPr>
+              <a:t>Strategic</a:t>
+            </a:r>
+            <a:r>
+              <a:rPr lang="en-US" sz="1600" dirty="0" smtClean="0"/>
+              <a:t> </a:t>
+            </a:r>
+            <a:r>
+              <a:rPr lang="en-US" sz="1600" dirty="0" smtClean="0">
+                <a:solidFill>
+                  <a:srgbClr val="53BBD4"/>
+                </a:solidFill>
+              </a:rPr>
+              <a:t>Indicators </a:t>
+            </a:r>
+            <a:r>
+              <a:rPr lang="en-US" sz="1600" dirty="0" smtClean="0"/>
+              <a:t>that will monitor the results of your strategies;</a:t>
+            </a:r>
+          </a:p>
+          <a:p>
+            <a:pPr>
+              <a:lnSpc>
+                <a:spcPts val="1800"/>
+              </a:lnSpc>
+              <a:spcAft>
+                <a:spcPts val="300"/>
+              </a:spcAft>
+            </a:pPr>
+            <a:r>
+              <a:rPr lang="pt-BR" sz="1600" dirty="0" smtClean="0"/>
+              <a:t>Set </a:t>
+            </a:r>
+            <a:r>
+              <a:rPr lang="pt-BR" sz="1600" dirty="0" err="1">
+                <a:solidFill>
+                  <a:srgbClr val="53BBD4"/>
+                </a:solidFill>
+              </a:rPr>
+              <a:t>Targets</a:t>
+            </a:r>
+            <a:r>
+              <a:rPr lang="pt-BR" sz="1600" dirty="0" smtClean="0"/>
+              <a:t> </a:t>
+            </a:r>
+            <a:r>
+              <a:rPr lang="pt-BR" sz="1600" dirty="0" err="1" smtClean="0"/>
+              <a:t>and</a:t>
+            </a:r>
+            <a:r>
+              <a:rPr lang="pt-BR" sz="1600" dirty="0" smtClean="0"/>
+              <a:t> </a:t>
+            </a:r>
+            <a:r>
+              <a:rPr lang="pt-BR" sz="1600" dirty="0" err="1" smtClean="0"/>
+              <a:t>collect</a:t>
+            </a:r>
+            <a:r>
+              <a:rPr lang="pt-BR" sz="1600" dirty="0" smtClean="0"/>
+              <a:t> </a:t>
+            </a:r>
+            <a:r>
+              <a:rPr lang="pt-BR" sz="1600" dirty="0" err="1" smtClean="0">
+                <a:solidFill>
+                  <a:srgbClr val="53BBD4"/>
+                </a:solidFill>
+              </a:rPr>
+              <a:t>Measurements</a:t>
+            </a:r>
+            <a:r>
+              <a:rPr lang="pt-BR" sz="1600" dirty="0" smtClean="0">
+                <a:solidFill>
+                  <a:srgbClr val="53BBD4"/>
+                </a:solidFill>
+              </a:rPr>
+              <a:t>;</a:t>
+            </a:r>
+            <a:endParaRPr lang="pt-BR" sz="1600" dirty="0">
+              <a:solidFill>
+                <a:srgbClr val="53BBD4"/>
+              </a:solidFill>
+            </a:endParaRPr>
+          </a:p>
+          <a:p>
+            <a:pPr>
+              <a:lnSpc>
+                <a:spcPts val="1800"/>
+              </a:lnSpc>
+              <a:spcAft>
+                <a:spcPts val="300"/>
+              </a:spcAft>
+            </a:pPr>
+            <a:r>
+              <a:rPr lang="pt-BR" sz="1600" dirty="0" err="1" smtClean="0"/>
+              <a:t>Calculate</a:t>
+            </a:r>
+            <a:r>
+              <a:rPr lang="pt-BR" sz="1600" dirty="0" smtClean="0"/>
+              <a:t> </a:t>
+            </a:r>
+            <a:r>
+              <a:rPr lang="pt-BR" sz="1600" dirty="0" err="1" smtClean="0"/>
+              <a:t>the</a:t>
+            </a:r>
+            <a:r>
+              <a:rPr lang="pt-BR" sz="1600" dirty="0" smtClean="0"/>
+              <a:t> </a:t>
+            </a:r>
+            <a:r>
+              <a:rPr lang="pt-BR" sz="1600" dirty="0" err="1" smtClean="0"/>
+              <a:t>resulting</a:t>
+            </a:r>
+            <a:r>
+              <a:rPr lang="pt-BR" sz="1600" dirty="0" smtClean="0"/>
+              <a:t> </a:t>
+            </a:r>
+            <a:r>
+              <a:rPr lang="pt-BR" sz="1600" dirty="0">
+                <a:solidFill>
+                  <a:srgbClr val="53BBD4"/>
+                </a:solidFill>
+              </a:rPr>
+              <a:t>Status</a:t>
+            </a:r>
+            <a:r>
+              <a:rPr lang="pt-BR" sz="1600" dirty="0" smtClean="0"/>
+              <a:t> </a:t>
+            </a:r>
+            <a:r>
+              <a:rPr lang="pt-BR" sz="1600" dirty="0" err="1" smtClean="0"/>
+              <a:t>and</a:t>
+            </a:r>
+            <a:r>
+              <a:rPr lang="pt-BR" sz="1600" dirty="0" smtClean="0"/>
+              <a:t> </a:t>
+            </a:r>
+            <a:r>
+              <a:rPr lang="pt-BR" sz="1600" dirty="0" err="1" smtClean="0"/>
+              <a:t>update</a:t>
+            </a:r>
+            <a:r>
+              <a:rPr lang="pt-BR" sz="1600" dirty="0" smtClean="0"/>
+              <a:t> </a:t>
+            </a:r>
+            <a:r>
+              <a:rPr lang="pt-BR" sz="1600" dirty="0" err="1" smtClean="0"/>
+              <a:t>Strategic</a:t>
+            </a:r>
+            <a:r>
+              <a:rPr lang="pt-BR" sz="1600" dirty="0" smtClean="0"/>
+              <a:t> Plans </a:t>
+            </a:r>
+            <a:r>
+              <a:rPr lang="pt-BR" sz="1600" dirty="0" err="1" smtClean="0"/>
+              <a:t>automatically</a:t>
+            </a:r>
+            <a:r>
+              <a:rPr lang="pt-BR" sz="1600" dirty="0" smtClean="0"/>
+              <a:t>;</a:t>
+            </a:r>
+          </a:p>
+          <a:p>
+            <a:pPr>
+              <a:lnSpc>
+                <a:spcPts val="1800"/>
+              </a:lnSpc>
+              <a:spcAft>
+                <a:spcPts val="300"/>
+              </a:spcAft>
+            </a:pPr>
+            <a:r>
+              <a:rPr lang="pt-BR" sz="1600" dirty="0" err="1" smtClean="0"/>
+              <a:t>Indicate</a:t>
+            </a:r>
+            <a:r>
+              <a:rPr lang="pt-BR" sz="1600" dirty="0" smtClean="0"/>
+              <a:t> Cause-</a:t>
+            </a:r>
+            <a:r>
+              <a:rPr lang="pt-BR" sz="1600" dirty="0" err="1" smtClean="0"/>
+              <a:t>Consequence</a:t>
+            </a:r>
+            <a:r>
+              <a:rPr lang="pt-BR" sz="1600" dirty="0" smtClean="0"/>
+              <a:t> </a:t>
+            </a:r>
+            <a:r>
+              <a:rPr lang="pt-BR" sz="1600" dirty="0" err="1" smtClean="0"/>
+              <a:t>relationships</a:t>
+            </a:r>
+            <a:r>
+              <a:rPr lang="pt-BR" sz="1600" dirty="0" smtClean="0"/>
+              <a:t> </a:t>
+            </a:r>
+            <a:r>
+              <a:rPr lang="pt-BR" sz="1600" dirty="0" err="1" smtClean="0"/>
+              <a:t>using</a:t>
+            </a:r>
+            <a:r>
+              <a:rPr lang="pt-BR" sz="1600" dirty="0" smtClean="0"/>
+              <a:t> </a:t>
+            </a:r>
+            <a:r>
+              <a:rPr lang="pt-BR" sz="1600" dirty="0" err="1">
+                <a:solidFill>
+                  <a:srgbClr val="53BBD4"/>
+                </a:solidFill>
+              </a:rPr>
+              <a:t>Indicator</a:t>
+            </a:r>
+            <a:r>
+              <a:rPr lang="pt-BR" sz="1600" dirty="0">
+                <a:solidFill>
+                  <a:srgbClr val="53BBD4"/>
+                </a:solidFill>
+              </a:rPr>
+              <a:t> </a:t>
+            </a:r>
+            <a:r>
+              <a:rPr lang="pt-BR" sz="1600" dirty="0" err="1">
+                <a:solidFill>
+                  <a:srgbClr val="53BBD4"/>
+                </a:solidFill>
+              </a:rPr>
+              <a:t>Hierarchies</a:t>
+            </a:r>
+            <a:r>
+              <a:rPr lang="pt-BR" sz="1600" dirty="0">
+                <a:solidFill>
+                  <a:srgbClr val="53BBD4"/>
+                </a:solidFill>
+              </a:rPr>
+              <a:t> </a:t>
+            </a:r>
+            <a:r>
+              <a:rPr lang="pt-BR" sz="1600" dirty="0" err="1" smtClean="0"/>
+              <a:t>and</a:t>
+            </a:r>
+            <a:r>
+              <a:rPr lang="pt-BR" sz="1600" dirty="0" smtClean="0"/>
+              <a:t> </a:t>
+            </a:r>
+            <a:r>
+              <a:rPr lang="pt-BR" sz="1600" dirty="0" err="1" smtClean="0"/>
+              <a:t>review</a:t>
+            </a:r>
+            <a:r>
+              <a:rPr lang="pt-BR" sz="1600" dirty="0" smtClean="0"/>
+              <a:t>  </a:t>
+            </a:r>
+            <a:r>
+              <a:rPr lang="pt-BR" sz="1600" dirty="0" err="1" smtClean="0"/>
+              <a:t>them</a:t>
+            </a:r>
+            <a:r>
+              <a:rPr lang="pt-BR" sz="1600" dirty="0" smtClean="0"/>
+              <a:t> </a:t>
+            </a:r>
+            <a:r>
+              <a:rPr lang="pt-BR" sz="1600" dirty="0" err="1" smtClean="0"/>
+              <a:t>graphically</a:t>
+            </a:r>
+            <a:r>
+              <a:rPr lang="pt-BR" sz="1600" dirty="0" smtClean="0"/>
+              <a:t>.</a:t>
+            </a:r>
+            <a:endParaRPr lang="en-US" sz="1600" dirty="0" smtClean="0"/>
+          </a:p>
+        </p:txBody>
+      </p:sp>
+      <p:pic>
+        <p:nvPicPr>
+          <p:cNvPr id="7" name="Picture 6"/>
+          <p:cNvPicPr>
+            <a:picLocks noChangeAspect="1"/>
+          </p:cNvPicPr>
+          <p:nvPr/>
+        </p:nvPicPr>
+        <p:blipFill>
+          <a:blip r:embed="rId4"/>
+          <a:stretch>
+            <a:fillRect/>
+          </a:stretch>
+        </p:blipFill>
+        <p:spPr>
+          <a:xfrm>
+            <a:off x="665094" y="2986471"/>
+            <a:ext cx="3466571" cy="2161792"/>
+          </a:xfrm>
+          <a:prstGeom prst="rect">
+            <a:avLst/>
+          </a:prstGeom>
+        </p:spPr>
+      </p:pic>
+      <p:pic>
+        <p:nvPicPr>
+          <p:cNvPr id="8" name="Picture 7"/>
+          <p:cNvPicPr>
+            <a:picLocks noChangeAspect="1"/>
+          </p:cNvPicPr>
+          <p:nvPr/>
+        </p:nvPicPr>
+        <p:blipFill>
+          <a:blip r:embed="rId5"/>
+          <a:stretch>
+            <a:fillRect/>
+          </a:stretch>
+        </p:blipFill>
+        <p:spPr>
+          <a:xfrm>
+            <a:off x="3553264" y="3483117"/>
+            <a:ext cx="3927915" cy="1439507"/>
+          </a:xfrm>
+          <a:prstGeom prst="rect">
+            <a:avLst/>
+          </a:prstGeom>
+        </p:spPr>
+      </p:pic>
+    </p:spTree>
+    <p:extLst>
+      <p:ext uri="{BB962C8B-B14F-4D97-AF65-F5344CB8AC3E}">
+        <p14:creationId xmlns:p14="http://schemas.microsoft.com/office/powerpoint/2010/main" val="2458384153"/>
+      </p:ext>
+    </p:extLst>
+  </p:cSld>
+  <p:clrMapOvr>
+    <a:masterClrMapping/>
+  </p:clrMapOvr>
+  <mc:AlternateContent xmlns:mc="http://schemas.openxmlformats.org/markup-compatibility/2006" xmlns:p14="http://schemas.microsoft.com/office/powerpoint/2010/main">
+    <mc:Choice Requires="p14">
+      <p:transition spd="slow" p14:dur="2000"/>
+    </mc:Choice>
+    <mc:Fallback xmlns="">
+      <p:transition spd="slow"/>
+    </mc:Fallback>
+  </mc:AlternateContent>
+  <p:timing>
+    <p:tnLst>
+      <p:par>
+        <p:cTn id="1" dur="indefinite" restart="never" nodeType="tmRoot"/>
+      </p:par>
+    </p:tnLst>
+  </p:timing>
+</p:sld>
+</file>
+
+<file path=ppt/slides/slide11.xml><?xml version="1.0" encoding="utf-8"?>
+<p:sld xmlns:a="http://schemas.openxmlformats.org/drawingml/2006/main" xmlns:r="http://schemas.openxmlformats.org/officeDocument/2006/relationships" xmlns:p="http://schemas.openxmlformats.org/presentationml/2006/main">
+  <p:cSld>
+    <p:spTree>
+      <p:nvGrpSpPr>
+        <p:cNvPr id="1" name=""/>
+        <p:cNvGrpSpPr/>
+        <p:nvPr/>
+      </p:nvGrpSpPr>
+      <p:grpSpPr>
+        <a:xfrm>
+          <a:off x="0" y="0"/>
+          <a:ext cx="0" cy="0"/>
+          <a:chOff x="0" y="0"/>
+          <a:chExt cx="0" cy="0"/>
+        </a:xfrm>
+      </p:grpSpPr>
+      <p:sp>
+        <p:nvSpPr>
+          <p:cNvPr id="2" name="Title 1"/>
+          <p:cNvSpPr>
+            <a:spLocks noGrp="1"/>
+          </p:cNvSpPr>
+          <p:nvPr>
+            <p:ph type="title"/>
+          </p:nvPr>
+        </p:nvSpPr>
+        <p:spPr/>
+        <p:txBody>
+          <a:bodyPr vert="horz" lIns="91440" tIns="45720" rIns="91440" bIns="45720" rtlCol="0" anchor="t">
+            <a:noAutofit/>
+          </a:bodyPr>
+          <a:lstStyle/>
+          <a:p>
+            <a:r>
+              <a:rPr lang="en-US" sz="2400" dirty="0" smtClean="0"/>
+              <a:t>CA PPM for Strategic Planning and Execution</a:t>
+            </a:r>
+            <a:br>
+              <a:rPr lang="en-US" sz="2400" dirty="0" smtClean="0"/>
+            </a:br>
+            <a:endParaRPr lang="en-US" sz="2400" dirty="0"/>
+          </a:p>
+        </p:txBody>
+      </p:sp>
       <p:sp>
         <p:nvSpPr>
           <p:cNvPr id="15364" name="Content Placeholder 12"/>
@@ -19103,7 +18734,7 @@
 </p:sld>
 </file>
 
-<file path=ppt/slides/slide11.xml><?xml version="1.0" encoding="utf-8"?>
+<file path=ppt/slides/slide12.xml><?xml version="1.0" encoding="utf-8"?>
 <p:sld xmlns:a="http://schemas.openxmlformats.org/drawingml/2006/main" xmlns:r="http://schemas.openxmlformats.org/officeDocument/2006/relationships" xmlns:p="http://schemas.openxmlformats.org/presentationml/2006/main">
   <p:cSld>
     <p:spTree>
@@ -19242,7 +18873,7 @@
 </p:sld>
 </file>
 
-<file path=ppt/slides/slide12.xml><?xml version="1.0" encoding="utf-8"?>
+<file path=ppt/slides/slide13.xml><?xml version="1.0" encoding="utf-8"?>
 <p:sld xmlns:a="http://schemas.openxmlformats.org/drawingml/2006/main" xmlns:r="http://schemas.openxmlformats.org/officeDocument/2006/relationships" xmlns:p="http://schemas.openxmlformats.org/presentationml/2006/main">
   <p:cSld>
     <p:spTree>
@@ -19373,7 +19004,7 @@
 </p:sld>
 </file>
 
-<file path=ppt/slides/slide13.xml><?xml version="1.0" encoding="utf-8"?>
+<file path=ppt/slides/slide14.xml><?xml version="1.0" encoding="utf-8"?>
 <p:sld xmlns:a="http://schemas.openxmlformats.org/drawingml/2006/main" xmlns:r="http://schemas.openxmlformats.org/officeDocument/2006/relationships" xmlns:p="http://schemas.openxmlformats.org/presentationml/2006/main">
   <p:cSld>
     <p:spTree>
@@ -19951,11 +19582,7 @@
                     <a:p>
                       <a:r>
                         <a:rPr lang="en-US" sz="1400" dirty="0" smtClean="0"/>
-                        <a:t>The standard CA PPM Project Health-Check KPIs</a:t>
-                      </a:r>
-                      <a:r>
-                        <a:rPr lang="en-US" sz="1400" dirty="0" smtClean="0"/>
-                        <a:t>* are in use.</a:t>
+                        <a:t>The standard CA PPM Project Health-Check KPIs* are in use.</a:t>
                       </a:r>
                       <a:endParaRPr lang="en-US" sz="1400" dirty="0"/>
                     </a:p>
@@ -20314,708 +19941,6 @@
     <p:extLst>
       <p:ext uri="{BB962C8B-B14F-4D97-AF65-F5344CB8AC3E}">
         <p14:creationId xmlns:p14="http://schemas.microsoft.com/office/powerpoint/2010/main" val="3246522307"/>
-      </p:ext>
-    </p:extLst>
-  </p:cSld>
-  <p:clrMapOvr>
-    <a:masterClrMapping/>
-  </p:clrMapOvr>
-  <mc:AlternateContent xmlns:mc="http://schemas.openxmlformats.org/markup-compatibility/2006" xmlns:p14="http://schemas.microsoft.com/office/powerpoint/2010/main">
-    <mc:Choice Requires="p14">
-      <p:transition spd="slow" p14:dur="2000"/>
-    </mc:Choice>
-    <mc:Fallback xmlns="">
-      <p:transition spd="slow"/>
-    </mc:Fallback>
-  </mc:AlternateContent>
-  <p:timing>
-    <p:tnLst>
-      <p:par>
-        <p:cTn id="1" dur="indefinite" restart="never" nodeType="tmRoot"/>
-      </p:par>
-    </p:tnLst>
-  </p:timing>
-</p:sld>
-</file>
-
-<file path=ppt/slides/slide14.xml><?xml version="1.0" encoding="utf-8"?>
-<p:sld xmlns:a="http://schemas.openxmlformats.org/drawingml/2006/main" xmlns:r="http://schemas.openxmlformats.org/officeDocument/2006/relationships" xmlns:p="http://schemas.openxmlformats.org/presentationml/2006/main">
-  <p:cSld>
-    <p:spTree>
-      <p:nvGrpSpPr>
-        <p:cNvPr id="1" name=""/>
-        <p:cNvGrpSpPr/>
-        <p:nvPr/>
-      </p:nvGrpSpPr>
-      <p:grpSpPr>
-        <a:xfrm>
-          <a:off x="0" y="0"/>
-          <a:ext cx="0" cy="0"/>
-          <a:chOff x="0" y="0"/>
-          <a:chExt cx="0" cy="0"/>
-        </a:xfrm>
-      </p:grpSpPr>
-      <p:sp>
-        <p:nvSpPr>
-          <p:cNvPr id="2" name="Title 1"/>
-          <p:cNvSpPr>
-            <a:spLocks noGrp="1"/>
-          </p:cNvSpPr>
-          <p:nvPr>
-            <p:ph type="title"/>
-          </p:nvPr>
-        </p:nvSpPr>
-        <p:spPr/>
-        <p:txBody>
-          <a:bodyPr/>
-          <a:lstStyle/>
-          <a:p>
-            <a:r>
-              <a:rPr lang="en-US" sz="2400" dirty="0" smtClean="0"/>
-              <a:t>CA PPM for Strategic Planning and Execution</a:t>
-            </a:r>
-            <a:br>
-              <a:rPr lang="en-US" sz="2400" dirty="0" smtClean="0"/>
-            </a:br>
-            <a:endParaRPr lang="en-US" sz="2400" dirty="0"/>
-          </a:p>
-        </p:txBody>
-      </p:sp>
-      <p:sp>
-        <p:nvSpPr>
-          <p:cNvPr id="15364" name="Content Placeholder 12"/>
-          <p:cNvSpPr>
-            <a:spLocks noGrp="1"/>
-          </p:cNvSpPr>
-          <p:nvPr>
-            <p:ph type="body" sz="quarter" idx="10"/>
-          </p:nvPr>
-        </p:nvSpPr>
-        <p:spPr/>
-        <p:txBody>
-          <a:bodyPr/>
-          <a:lstStyle/>
-          <a:p>
-            <a:pPr marL="0" indent="0">
-              <a:lnSpc>
-                <a:spcPts val="1800"/>
-              </a:lnSpc>
-              <a:spcAft>
-                <a:spcPts val="300"/>
-              </a:spcAft>
-              <a:buNone/>
-            </a:pPr>
-            <a:endParaRPr lang="en-US" sz="2000" dirty="0"/>
-          </a:p>
-        </p:txBody>
-      </p:sp>
-      <p:sp>
-        <p:nvSpPr>
-          <p:cNvPr id="3" name="Content Placeholder 2"/>
-          <p:cNvSpPr>
-            <a:spLocks noGrp="1"/>
-          </p:cNvSpPr>
-          <p:nvPr>
-            <p:ph sz="quarter" idx="11"/>
-          </p:nvPr>
-        </p:nvSpPr>
-        <p:spPr/>
-        <p:txBody>
-          <a:bodyPr/>
-          <a:lstStyle/>
-          <a:p>
-            <a:r>
-              <a:rPr lang="en-US" sz="1600" b="1" dirty="0" smtClean="0">
-                <a:solidFill>
-                  <a:schemeClr val="tx2"/>
-                </a:solidFill>
-              </a:rPr>
-              <a:t>Group 2: Monitoring Plans with Strategic Review </a:t>
-            </a:r>
-            <a:endParaRPr lang="en-US" sz="1600" b="1" dirty="0">
-              <a:solidFill>
-                <a:schemeClr val="tx2"/>
-              </a:solidFill>
-            </a:endParaRPr>
-          </a:p>
-        </p:txBody>
-      </p:sp>
-      <p:graphicFrame>
-        <p:nvGraphicFramePr>
-          <p:cNvPr id="6" name="Table 5"/>
-          <p:cNvGraphicFramePr>
-            <a:graphicFrameLocks noGrp="1"/>
-          </p:cNvGraphicFramePr>
-          <p:nvPr>
-            <p:extLst>
-              <p:ext uri="{D42A27DB-BD31-4B8C-83A1-F6EECF244321}">
-                <p14:modId xmlns:p14="http://schemas.microsoft.com/office/powerpoint/2010/main" val="1684289976"/>
-              </p:ext>
-            </p:extLst>
-          </p:nvPr>
-        </p:nvGraphicFramePr>
-        <p:xfrm>
-          <a:off x="453176" y="1002605"/>
-          <a:ext cx="8428833" cy="3388826"/>
-        </p:xfrm>
-        <a:graphic>
-          <a:graphicData uri="http://schemas.openxmlformats.org/drawingml/2006/table">
-            <a:tbl>
-              <a:tblPr firstRow="1" bandRow="1">
-                <a:tableStyleId>{5C22544A-7EE6-4342-B048-85BDC9FD1C3A}</a:tableStyleId>
-              </a:tblPr>
-              <a:tblGrid>
-                <a:gridCol w="3038488"/>
-                <a:gridCol w="5390345"/>
-              </a:tblGrid>
-              <a:tr h="529442">
-                <a:tc>
-                  <a:txBody>
-                    <a:bodyPr/>
-                    <a:lstStyle/>
-                    <a:p>
-                      <a:r>
-                        <a:rPr lang="pt-BR" dirty="0" err="1" smtClean="0"/>
-                        <a:t>Deliverable</a:t>
-                      </a:r>
-                      <a:endParaRPr lang="en-US" dirty="0"/>
-                    </a:p>
-                  </a:txBody>
-                  <a:tcPr/>
-                </a:tc>
-                <a:tc>
-                  <a:txBody>
-                    <a:bodyPr/>
-                    <a:lstStyle/>
-                    <a:p>
-                      <a:r>
-                        <a:rPr lang="pt-BR" dirty="0" err="1" smtClean="0"/>
-                        <a:t>Implementation</a:t>
-                      </a:r>
-                      <a:r>
-                        <a:rPr lang="pt-BR" dirty="0" smtClean="0"/>
-                        <a:t> </a:t>
-                      </a:r>
-                      <a:r>
-                        <a:rPr lang="pt-BR" dirty="0" err="1" smtClean="0"/>
-                        <a:t>Assumption</a:t>
-                      </a:r>
-                      <a:r>
-                        <a:rPr lang="pt-BR" dirty="0" smtClean="0"/>
-                        <a:t> (</a:t>
-                      </a:r>
-                      <a:r>
-                        <a:rPr lang="pt-BR" dirty="0" err="1" smtClean="0"/>
-                        <a:t>Pre-Requisites</a:t>
-                      </a:r>
-                      <a:r>
-                        <a:rPr lang="pt-BR" dirty="0" smtClean="0"/>
-                        <a:t>)</a:t>
-                      </a:r>
-                      <a:endParaRPr lang="en-US" dirty="0"/>
-                    </a:p>
-                  </a:txBody>
-                  <a:tcPr/>
-                </a:tc>
-              </a:tr>
-              <a:tr h="739768">
-                <a:tc>
-                  <a:txBody>
-                    <a:bodyPr/>
-                    <a:lstStyle/>
-                    <a:p>
-                      <a:r>
-                        <a:rPr lang="en-US" sz="1800" kern="1200" dirty="0" smtClean="0">
-                          <a:solidFill>
-                            <a:srgbClr val="53BBD4"/>
-                          </a:solidFill>
-                          <a:latin typeface="+mn-lt"/>
-                          <a:ea typeface="+mn-ea"/>
-                          <a:cs typeface="+mn-cs"/>
-                        </a:rPr>
-                        <a:t>Indicator Hierarchy</a:t>
-                      </a:r>
-                      <a:endParaRPr lang="en-US" dirty="0">
-                        <a:solidFill>
-                          <a:schemeClr val="tx1"/>
-                        </a:solidFill>
-                      </a:endParaRPr>
-                    </a:p>
-                  </a:txBody>
-                  <a:tcPr/>
-                </a:tc>
-                <a:tc>
-                  <a:txBody>
-                    <a:bodyPr/>
-                    <a:lstStyle/>
-                    <a:p>
-                      <a:r>
-                        <a:rPr lang="pt-BR" sz="1400" dirty="0" smtClean="0"/>
-                        <a:t>The</a:t>
-                      </a:r>
-                      <a:r>
-                        <a:rPr lang="pt-BR" sz="1400" baseline="0" dirty="0" smtClean="0"/>
-                        <a:t> Global </a:t>
-                      </a:r>
-                      <a:r>
-                        <a:rPr lang="pt-BR" sz="1400" baseline="0" dirty="0" err="1" smtClean="0"/>
-                        <a:t>indicators</a:t>
-                      </a:r>
-                      <a:r>
-                        <a:rPr lang="pt-BR" sz="1400" baseline="0" dirty="0" smtClean="0"/>
-                        <a:t> </a:t>
-                      </a:r>
-                      <a:r>
-                        <a:rPr lang="pt-BR" sz="1400" baseline="0" dirty="0" err="1" smtClean="0"/>
-                        <a:t>used</a:t>
-                      </a:r>
-                      <a:r>
-                        <a:rPr lang="pt-BR" sz="1400" baseline="0" dirty="0" smtClean="0"/>
-                        <a:t> </a:t>
-                      </a:r>
-                      <a:r>
-                        <a:rPr lang="pt-BR" sz="1400" baseline="0" dirty="0" err="1" smtClean="0"/>
-                        <a:t>to</a:t>
-                      </a:r>
-                      <a:r>
-                        <a:rPr lang="pt-BR" sz="1400" baseline="0" dirty="0" smtClean="0"/>
-                        <a:t> </a:t>
-                      </a:r>
-                      <a:r>
-                        <a:rPr lang="pt-BR" sz="1400" baseline="0" dirty="0" err="1" smtClean="0"/>
-                        <a:t>measure</a:t>
-                      </a:r>
-                      <a:r>
-                        <a:rPr lang="pt-BR" sz="1400" baseline="0" dirty="0" smtClean="0"/>
-                        <a:t> </a:t>
-                      </a:r>
-                      <a:r>
-                        <a:rPr lang="pt-BR" sz="1400" baseline="0" dirty="0" err="1" smtClean="0"/>
-                        <a:t>the</a:t>
-                      </a:r>
-                      <a:r>
-                        <a:rPr lang="pt-BR" sz="1400" baseline="0" dirty="0" smtClean="0"/>
-                        <a:t> </a:t>
-                      </a:r>
-                      <a:r>
-                        <a:rPr lang="pt-BR" sz="1400" baseline="0" dirty="0" err="1" smtClean="0"/>
-                        <a:t>Strategic</a:t>
-                      </a:r>
-                      <a:r>
-                        <a:rPr lang="pt-BR" sz="1400" baseline="0" dirty="0" smtClean="0"/>
-                        <a:t> </a:t>
-                      </a:r>
-                      <a:r>
-                        <a:rPr lang="pt-BR" sz="1400" baseline="0" dirty="0" err="1" smtClean="0"/>
-                        <a:t>Plan</a:t>
-                      </a:r>
-                      <a:r>
-                        <a:rPr lang="pt-BR" sz="1400" baseline="0" dirty="0" smtClean="0"/>
-                        <a:t> </a:t>
-                      </a:r>
-                      <a:r>
-                        <a:rPr lang="pt-BR" sz="1400" baseline="0" dirty="0" err="1" smtClean="0"/>
-                        <a:t>results</a:t>
-                      </a:r>
-                      <a:r>
-                        <a:rPr lang="pt-BR" sz="1400" baseline="0" dirty="0" smtClean="0"/>
-                        <a:t> </a:t>
-                      </a:r>
-                      <a:r>
-                        <a:rPr lang="pt-BR" sz="1400" baseline="0" dirty="0" err="1" smtClean="0"/>
-                        <a:t>is</a:t>
-                      </a:r>
-                      <a:r>
-                        <a:rPr lang="pt-BR" sz="1400" baseline="0" dirty="0" smtClean="0"/>
-                        <a:t> </a:t>
-                      </a:r>
-                      <a:r>
-                        <a:rPr lang="pt-BR" sz="1400" baseline="0" dirty="0" err="1" smtClean="0"/>
-                        <a:t>already</a:t>
-                      </a:r>
-                      <a:r>
-                        <a:rPr lang="pt-BR" sz="1400" baseline="0" dirty="0" smtClean="0"/>
-                        <a:t> </a:t>
-                      </a:r>
-                      <a:r>
-                        <a:rPr lang="pt-BR" sz="1400" baseline="0" dirty="0" err="1" smtClean="0"/>
-                        <a:t>identified</a:t>
-                      </a:r>
-                      <a:r>
-                        <a:rPr lang="pt-BR" sz="1400" baseline="0" dirty="0" smtClean="0"/>
-                        <a:t>.</a:t>
-                      </a:r>
-                      <a:endParaRPr lang="en-US" sz="1400" dirty="0"/>
-                    </a:p>
-                  </a:txBody>
-                  <a:tcPr/>
-                </a:tc>
-              </a:tr>
-              <a:tr h="739768">
-                <a:tc>
-                  <a:txBody>
-                    <a:bodyPr/>
-                    <a:lstStyle/>
-                    <a:p>
-                      <a:r>
-                        <a:rPr lang="en-US" sz="1800" dirty="0" smtClean="0"/>
-                        <a:t>Multi-level </a:t>
-                      </a:r>
-                      <a:r>
-                        <a:rPr lang="en-US" sz="1800" dirty="0" smtClean="0">
-                          <a:solidFill>
-                            <a:srgbClr val="53BBD4"/>
-                          </a:solidFill>
-                        </a:rPr>
-                        <a:t>Strategic Plans </a:t>
-                      </a:r>
-                      <a:r>
-                        <a:rPr lang="en-US" sz="1800" dirty="0" smtClean="0">
-                          <a:solidFill>
-                            <a:schemeClr val="tx1"/>
-                          </a:solidFill>
-                        </a:rPr>
-                        <a:t>with current Status</a:t>
-                      </a:r>
-                      <a:endParaRPr lang="en-US" dirty="0">
-                        <a:solidFill>
-                          <a:schemeClr val="tx1"/>
-                        </a:solidFill>
-                      </a:endParaRPr>
-                    </a:p>
-                  </a:txBody>
-                  <a:tcPr/>
-                </a:tc>
-                <a:tc>
-                  <a:txBody>
-                    <a:bodyPr/>
-                    <a:lstStyle/>
-                    <a:p>
-                      <a:r>
-                        <a:rPr lang="pt-BR" sz="1400" dirty="0" err="1" smtClean="0"/>
-                        <a:t>Indicator</a:t>
-                      </a:r>
-                      <a:r>
-                        <a:rPr lang="pt-BR" sz="1400" dirty="0" smtClean="0"/>
-                        <a:t> </a:t>
-                      </a:r>
-                      <a:r>
-                        <a:rPr lang="pt-BR" sz="1400" dirty="0" err="1" smtClean="0"/>
-                        <a:t>Targets</a:t>
-                      </a:r>
-                      <a:r>
-                        <a:rPr lang="pt-BR" sz="1400" dirty="0" smtClean="0"/>
-                        <a:t> are </a:t>
-                      </a:r>
-                      <a:r>
-                        <a:rPr lang="pt-BR" sz="1400" dirty="0" err="1" smtClean="0"/>
-                        <a:t>defined</a:t>
-                      </a:r>
-                      <a:r>
-                        <a:rPr lang="pt-BR" sz="1400" dirty="0" smtClean="0"/>
-                        <a:t> </a:t>
-                      </a:r>
-                      <a:r>
-                        <a:rPr lang="pt-BR" sz="1400" dirty="0" err="1" smtClean="0"/>
-                        <a:t>and</a:t>
-                      </a:r>
-                      <a:r>
-                        <a:rPr lang="pt-BR" sz="1400" dirty="0" smtClean="0"/>
-                        <a:t> </a:t>
-                      </a:r>
-                      <a:r>
-                        <a:rPr lang="pt-BR" sz="1400" dirty="0" err="1" smtClean="0"/>
-                        <a:t>Indicator</a:t>
-                      </a:r>
-                      <a:r>
-                        <a:rPr lang="pt-BR" sz="1400" dirty="0" smtClean="0"/>
-                        <a:t> </a:t>
-                      </a:r>
-                      <a:r>
-                        <a:rPr lang="pt-BR" sz="1400" dirty="0" err="1" smtClean="0"/>
-                        <a:t>Measurements</a:t>
-                      </a:r>
-                      <a:r>
-                        <a:rPr lang="pt-BR" sz="1400" dirty="0" smtClean="0"/>
-                        <a:t> are </a:t>
-                      </a:r>
-                      <a:r>
-                        <a:rPr lang="pt-BR" sz="1400" dirty="0" err="1" smtClean="0"/>
-                        <a:t>being</a:t>
-                      </a:r>
-                      <a:r>
-                        <a:rPr lang="pt-BR" sz="1400" dirty="0" smtClean="0"/>
-                        <a:t> </a:t>
-                      </a:r>
-                      <a:r>
-                        <a:rPr lang="pt-BR" sz="1400" dirty="0" err="1" smtClean="0"/>
-                        <a:t>collected</a:t>
-                      </a:r>
-                      <a:endParaRPr lang="en-US" sz="1400" dirty="0"/>
-                    </a:p>
-                  </a:txBody>
-                  <a:tcPr/>
-                </a:tc>
-              </a:tr>
-              <a:tr h="529442">
-                <a:tc>
-                  <a:txBody>
-                    <a:bodyPr/>
-                    <a:lstStyle/>
-                    <a:p>
-                      <a:r>
-                        <a:rPr lang="en-US" sz="1800" dirty="0" smtClean="0">
-                          <a:solidFill>
-                            <a:srgbClr val="53BBD4"/>
-                          </a:solidFill>
-                        </a:rPr>
-                        <a:t>Graphical </a:t>
-                      </a:r>
-                      <a:r>
-                        <a:rPr lang="en-US" sz="1800" dirty="0" smtClean="0"/>
-                        <a:t>Strategic Map with current</a:t>
-                      </a:r>
-                      <a:r>
-                        <a:rPr lang="en-US" sz="1800" baseline="0" dirty="0" smtClean="0"/>
-                        <a:t> Status</a:t>
-                      </a:r>
-                      <a:endParaRPr lang="en-US" dirty="0"/>
-                    </a:p>
-                  </a:txBody>
-                  <a:tcPr/>
-                </a:tc>
-                <a:tc>
-                  <a:txBody>
-                    <a:bodyPr/>
-                    <a:lstStyle/>
-                    <a:p>
-                      <a:pPr marL="0" marR="0" indent="0" algn="l" defTabSz="457200" rtl="0" eaLnBrk="1" fontAlgn="auto" latinLnBrk="0" hangingPunct="1">
-                        <a:lnSpc>
-                          <a:spcPct val="100000"/>
-                        </a:lnSpc>
-                        <a:spcBef>
-                          <a:spcPts val="0"/>
-                        </a:spcBef>
-                        <a:spcAft>
-                          <a:spcPts val="0"/>
-                        </a:spcAft>
-                        <a:buClrTx/>
-                        <a:buSzTx/>
-                        <a:buFontTx/>
-                        <a:buNone/>
-                        <a:tabLst/>
-                        <a:defRPr/>
-                      </a:pPr>
-                      <a:r>
-                        <a:rPr lang="pt-BR" sz="1400" dirty="0" err="1" smtClean="0"/>
-                        <a:t>Indicator</a:t>
-                      </a:r>
-                      <a:r>
-                        <a:rPr lang="pt-BR" sz="1400" dirty="0" smtClean="0"/>
-                        <a:t> </a:t>
-                      </a:r>
-                      <a:r>
-                        <a:rPr lang="pt-BR" sz="1400" dirty="0" err="1" smtClean="0"/>
-                        <a:t>Targets</a:t>
-                      </a:r>
-                      <a:r>
-                        <a:rPr lang="pt-BR" sz="1400" dirty="0" smtClean="0"/>
-                        <a:t> are </a:t>
-                      </a:r>
-                      <a:r>
-                        <a:rPr lang="pt-BR" sz="1400" dirty="0" err="1" smtClean="0"/>
-                        <a:t>defined</a:t>
-                      </a:r>
-                      <a:r>
-                        <a:rPr lang="pt-BR" sz="1400" dirty="0" smtClean="0"/>
-                        <a:t> </a:t>
-                      </a:r>
-                      <a:r>
-                        <a:rPr lang="pt-BR" sz="1400" dirty="0" err="1" smtClean="0"/>
-                        <a:t>and</a:t>
-                      </a:r>
-                      <a:r>
-                        <a:rPr lang="pt-BR" sz="1400" dirty="0" smtClean="0"/>
-                        <a:t> </a:t>
-                      </a:r>
-                      <a:r>
-                        <a:rPr lang="pt-BR" sz="1400" dirty="0" err="1" smtClean="0"/>
-                        <a:t>Indicator</a:t>
-                      </a:r>
-                      <a:r>
-                        <a:rPr lang="pt-BR" sz="1400" dirty="0" smtClean="0"/>
-                        <a:t> </a:t>
-                      </a:r>
-                      <a:r>
-                        <a:rPr lang="pt-BR" sz="1400" dirty="0" err="1" smtClean="0"/>
-                        <a:t>Measurements</a:t>
-                      </a:r>
-                      <a:r>
-                        <a:rPr lang="pt-BR" sz="1400" dirty="0" smtClean="0"/>
-                        <a:t> are </a:t>
-                      </a:r>
-                      <a:r>
-                        <a:rPr lang="pt-BR" sz="1400" dirty="0" err="1" smtClean="0"/>
-                        <a:t>being</a:t>
-                      </a:r>
-                      <a:r>
-                        <a:rPr lang="pt-BR" sz="1400" dirty="0" smtClean="0"/>
-                        <a:t> </a:t>
-                      </a:r>
-                      <a:r>
-                        <a:rPr lang="pt-BR" sz="1400" dirty="0" err="1" smtClean="0"/>
-                        <a:t>collected</a:t>
-                      </a:r>
-                      <a:endParaRPr lang="en-US" sz="1400" dirty="0" smtClean="0"/>
-                    </a:p>
-                  </a:txBody>
-                  <a:tcPr/>
-                </a:tc>
-              </a:tr>
-              <a:tr h="739768">
-                <a:tc>
-                  <a:txBody>
-                    <a:bodyPr/>
-                    <a:lstStyle/>
-                    <a:p>
-                      <a:r>
-                        <a:rPr lang="pt-BR" dirty="0" err="1" smtClean="0"/>
-                        <a:t>Results</a:t>
-                      </a:r>
-                      <a:r>
-                        <a:rPr lang="pt-BR" dirty="0" smtClean="0"/>
-                        <a:t> </a:t>
-                      </a:r>
-                      <a:r>
-                        <a:rPr lang="pt-BR" sz="1800" kern="1200" dirty="0" smtClean="0">
-                          <a:solidFill>
-                            <a:srgbClr val="53BBD4"/>
-                          </a:solidFill>
-                          <a:latin typeface="+mn-lt"/>
-                          <a:ea typeface="+mn-ea"/>
-                          <a:cs typeface="+mn-cs"/>
-                        </a:rPr>
-                        <a:t>Trend </a:t>
-                      </a:r>
-                      <a:r>
-                        <a:rPr lang="pt-BR" sz="1800" kern="1200" dirty="0" err="1" smtClean="0">
-                          <a:solidFill>
-                            <a:srgbClr val="53BBD4"/>
-                          </a:solidFill>
-                          <a:latin typeface="+mn-lt"/>
-                          <a:ea typeface="+mn-ea"/>
-                          <a:cs typeface="+mn-cs"/>
-                        </a:rPr>
-                        <a:t>Analysis</a:t>
-                      </a:r>
-                      <a:endParaRPr lang="en-US" sz="1800" kern="1200" dirty="0">
-                        <a:solidFill>
-                          <a:srgbClr val="53BBD4"/>
-                        </a:solidFill>
-                        <a:latin typeface="+mn-lt"/>
-                        <a:ea typeface="+mn-ea"/>
-                        <a:cs typeface="+mn-cs"/>
-                      </a:endParaRPr>
-                    </a:p>
-                  </a:txBody>
-                  <a:tcPr/>
-                </a:tc>
-                <a:tc>
-                  <a:txBody>
-                    <a:bodyPr/>
-                    <a:lstStyle/>
-                    <a:p>
-                      <a:pPr marL="0" marR="0" indent="0" algn="l" defTabSz="457200" rtl="0" eaLnBrk="1" fontAlgn="auto" latinLnBrk="0" hangingPunct="1">
-                        <a:lnSpc>
-                          <a:spcPct val="100000"/>
-                        </a:lnSpc>
-                        <a:spcBef>
-                          <a:spcPts val="0"/>
-                        </a:spcBef>
-                        <a:spcAft>
-                          <a:spcPts val="0"/>
-                        </a:spcAft>
-                        <a:buClrTx/>
-                        <a:buSzTx/>
-                        <a:buFontTx/>
-                        <a:buNone/>
-                        <a:tabLst/>
-                        <a:defRPr/>
-                      </a:pPr>
-                      <a:r>
-                        <a:rPr lang="pt-BR" sz="1400" dirty="0" err="1" smtClean="0"/>
-                        <a:t>Indicator</a:t>
-                      </a:r>
-                      <a:r>
-                        <a:rPr lang="pt-BR" sz="1400" dirty="0" smtClean="0"/>
-                        <a:t> </a:t>
-                      </a:r>
-                      <a:r>
-                        <a:rPr lang="pt-BR" sz="1400" dirty="0" err="1" smtClean="0"/>
-                        <a:t>Targets</a:t>
-                      </a:r>
-                      <a:r>
-                        <a:rPr lang="pt-BR" sz="1400" dirty="0" smtClean="0"/>
-                        <a:t> are </a:t>
-                      </a:r>
-                      <a:r>
-                        <a:rPr lang="pt-BR" sz="1400" dirty="0" err="1" smtClean="0"/>
-                        <a:t>defined</a:t>
-                      </a:r>
-                      <a:r>
-                        <a:rPr lang="pt-BR" sz="1400" dirty="0" smtClean="0"/>
-                        <a:t> </a:t>
-                      </a:r>
-                      <a:r>
-                        <a:rPr lang="pt-BR" sz="1400" dirty="0" err="1" smtClean="0"/>
-                        <a:t>and</a:t>
-                      </a:r>
-                      <a:r>
-                        <a:rPr lang="pt-BR" sz="1400" dirty="0" smtClean="0"/>
-                        <a:t> </a:t>
-                      </a:r>
-                      <a:r>
-                        <a:rPr lang="pt-BR" sz="1400" dirty="0" err="1" smtClean="0"/>
-                        <a:t>Indicator</a:t>
-                      </a:r>
-                      <a:r>
-                        <a:rPr lang="pt-BR" sz="1400" dirty="0" smtClean="0"/>
-                        <a:t> </a:t>
-                      </a:r>
-                      <a:r>
-                        <a:rPr lang="pt-BR" sz="1400" dirty="0" err="1" smtClean="0"/>
-                        <a:t>Measurements</a:t>
-                      </a:r>
-                      <a:r>
-                        <a:rPr lang="pt-BR" sz="1400" dirty="0" smtClean="0"/>
-                        <a:t> are </a:t>
-                      </a:r>
-                      <a:r>
-                        <a:rPr lang="pt-BR" sz="1400" dirty="0" err="1" smtClean="0"/>
-                        <a:t>being</a:t>
-                      </a:r>
-                      <a:r>
-                        <a:rPr lang="pt-BR" sz="1400" dirty="0" smtClean="0"/>
-                        <a:t> </a:t>
-                      </a:r>
-                      <a:r>
-                        <a:rPr lang="pt-BR" sz="1400" dirty="0" err="1" smtClean="0"/>
-                        <a:t>collected</a:t>
-                      </a:r>
-                      <a:endParaRPr lang="en-US" sz="1400" dirty="0" smtClean="0"/>
-                    </a:p>
-                  </a:txBody>
-                  <a:tcPr/>
-                </a:tc>
-              </a:tr>
-            </a:tbl>
-          </a:graphicData>
-        </a:graphic>
-      </p:graphicFrame>
-    </p:spTree>
-    <p:extLst>
-      <p:ext uri="{BB962C8B-B14F-4D97-AF65-F5344CB8AC3E}">
-        <p14:creationId xmlns:p14="http://schemas.microsoft.com/office/powerpoint/2010/main" val="4207088819"/>
       </p:ext>
     </p:extLst>
   </p:cSld>
@@ -21069,9 +19994,7 @@
         </p:nvSpPr>
         <p:spPr/>
         <p:txBody>
-          <a:bodyPr vert="horz" lIns="91440" tIns="45720" rIns="91440" bIns="45720" rtlCol="0" anchor="t">
-            <a:noAutofit/>
-          </a:bodyPr>
+          <a:bodyPr/>
           <a:lstStyle/>
           <a:p>
             <a:r>
@@ -21109,7 +20032,7 @@
               </a:spcAft>
               <a:buNone/>
             </a:pPr>
-            <a:endParaRPr lang="en-US" sz="1600" dirty="0" smtClean="0"/>
+            <a:endParaRPr lang="en-US" sz="2000" dirty="0"/>
           </a:p>
         </p:txBody>
       </p:sp>
@@ -21125,23 +20048,16 @@
         </p:nvSpPr>
         <p:spPr/>
         <p:txBody>
-          <a:bodyPr vert="horz" lIns="91440" tIns="45720" rIns="91440" bIns="45720" rtlCol="0" anchor="t">
-            <a:noAutofit/>
-          </a:bodyPr>
+          <a:bodyPr/>
           <a:lstStyle/>
           <a:p>
-            <a:pPr marL="175186" indent="-175186">
-              <a:spcBef>
-                <a:spcPts val="450"/>
-              </a:spcBef>
-            </a:pPr>
             <a:r>
               <a:rPr lang="en-US" sz="1600" b="1" dirty="0" smtClean="0">
                 <a:solidFill>
                   <a:schemeClr val="tx2"/>
                 </a:solidFill>
               </a:rPr>
-              <a:t>Group 3: Investment Evaluation for Selection</a:t>
+              <a:t>Group 2: Monitoring Plans with Strategic Review </a:t>
             </a:r>
             <a:endParaRPr lang="en-US" sz="1600" b="1" dirty="0">
               <a:solidFill>
@@ -21153,21 +20069,21 @@
       </p:sp>
       <p:graphicFrame>
         <p:nvGraphicFramePr>
-          <p:cNvPr id="7" name="Table 6"/>
+          <p:cNvPr id="6" name="Table 5"/>
           <p:cNvGraphicFramePr>
             <a:graphicFrameLocks noGrp="1"/>
           </p:cNvGraphicFramePr>
           <p:nvPr>
             <p:extLst>
               <p:ext uri="{D42A27DB-BD31-4B8C-83A1-F6EECF244321}">
-                <p14:modId xmlns:p14="http://schemas.microsoft.com/office/powerpoint/2010/main" val="671364009"/>
+                <p14:modId xmlns:p14="http://schemas.microsoft.com/office/powerpoint/2010/main" val="1684289976"/>
               </p:ext>
             </p:extLst>
           </p:nvPr>
         </p:nvGraphicFramePr>
         <p:xfrm>
           <a:off x="453176" y="1002605"/>
-          <a:ext cx="8428833" cy="3278188"/>
+          <a:ext cx="8428833" cy="3388826"/>
         </p:xfrm>
         <a:graphic>
           <a:graphicData uri="http://schemas.openxmlformats.org/drawingml/2006/table">
@@ -21244,18 +20160,7 @@
                           <a:ea typeface="+mn-ea"/>
                           <a:cs typeface="+mn-cs"/>
                         </a:rPr>
-                        <a:t>Investments Evaluation </a:t>
-                      </a:r>
-                      <a:r>
-                        <a:rPr lang="en-US" sz="1800" kern="1200" dirty="0" smtClean="0">
-                          <a:solidFill>
-                            <a:schemeClr val="tx1"/>
-                          </a:solidFill>
-                          <a:latin typeface="+mn-lt"/>
-                          <a:ea typeface="+mn-ea"/>
-                          <a:cs typeface="+mn-cs"/>
-                        </a:rPr>
-                        <a:t>(Alignment Assessment)</a:t>
+                        <a:t>Indicator Hierarchy</a:t>
                       </a:r>
                       <a:endParaRPr lang="en-US" dirty="0">
                         <a:solidFill>
@@ -21273,27 +20178,15 @@
                     <a:p>
                       <a:r>
                         <a:rPr lang="pt-BR" sz="1400" dirty="0" smtClean="0"/>
-                        <a:t>The </a:t>
-                      </a:r>
-                      <a:r>
-                        <a:rPr lang="pt-BR" sz="1400" dirty="0" err="1" smtClean="0"/>
-                        <a:t>Strategic</a:t>
-                      </a:r>
-                      <a:r>
-                        <a:rPr lang="pt-BR" sz="1400" dirty="0" smtClean="0"/>
-                        <a:t> </a:t>
-                      </a:r>
-                      <a:r>
-                        <a:rPr lang="pt-BR" sz="1400" dirty="0" err="1" smtClean="0"/>
-                        <a:t>Plan</a:t>
+                        <a:t>The</a:t>
                       </a:r>
                       <a:r>
                         <a:rPr lang="pt-BR" sz="1400" baseline="0" dirty="0" smtClean="0"/>
-                        <a:t> defines </a:t>
+                        <a:t> Global </a:t>
                       </a:r>
                       <a:r>
                         <a:rPr lang="pt-BR" sz="1400" baseline="0" dirty="0" err="1" smtClean="0"/>
-                        <a:t>metrics</a:t>
+                        <a:t>indicators</a:t>
                       </a:r>
                       <a:r>
                         <a:rPr lang="pt-BR" sz="1400" baseline="0" dirty="0" smtClean="0"/>
@@ -21301,7 +20194,7 @@
                       </a:r>
                       <a:r>
                         <a:rPr lang="pt-BR" sz="1400" baseline="0" dirty="0" err="1" smtClean="0"/>
-                        <a:t>to</a:t>
+                        <a:t>used</a:t>
                       </a:r>
                       <a:r>
                         <a:rPr lang="pt-BR" sz="1400" baseline="0" dirty="0" smtClean="0"/>
@@ -21309,7 +20202,7 @@
                       </a:r>
                       <a:r>
                         <a:rPr lang="pt-BR" sz="1400" baseline="0" dirty="0" err="1" smtClean="0"/>
-                        <a:t>align</a:t>
+                        <a:t>to</a:t>
                       </a:r>
                       <a:r>
                         <a:rPr lang="pt-BR" sz="1400" baseline="0" dirty="0" smtClean="0"/>
@@ -21317,7 +20210,7 @@
                       </a:r>
                       <a:r>
                         <a:rPr lang="pt-BR" sz="1400" baseline="0" dirty="0" err="1" smtClean="0"/>
-                        <a:t>the</a:t>
+                        <a:t>measure</a:t>
                       </a:r>
                       <a:r>
                         <a:rPr lang="pt-BR" sz="1400" baseline="0" dirty="0" smtClean="0"/>
@@ -21325,7 +20218,7 @@
                       </a:r>
                       <a:r>
                         <a:rPr lang="pt-BR" sz="1400" baseline="0" dirty="0" err="1" smtClean="0"/>
-                        <a:t>Strategic</a:t>
+                        <a:t>the</a:t>
                       </a:r>
                       <a:r>
                         <a:rPr lang="pt-BR" sz="1400" baseline="0" dirty="0" smtClean="0"/>
@@ -21333,7 +20226,7 @@
                       </a:r>
                       <a:r>
                         <a:rPr lang="pt-BR" sz="1400" baseline="0" dirty="0" err="1" smtClean="0"/>
-                        <a:t>Goals</a:t>
+                        <a:t>Strategic</a:t>
                       </a:r>
                       <a:r>
                         <a:rPr lang="pt-BR" sz="1400" baseline="0" dirty="0" smtClean="0"/>
@@ -21341,7 +20234,7 @@
                       </a:r>
                       <a:r>
                         <a:rPr lang="pt-BR" sz="1400" baseline="0" dirty="0" err="1" smtClean="0"/>
-                        <a:t>to</a:t>
+                        <a:t>Plan</a:t>
                       </a:r>
                       <a:r>
                         <a:rPr lang="pt-BR" sz="1400" baseline="0" dirty="0" smtClean="0"/>
@@ -21349,7 +20242,7 @@
                       </a:r>
                       <a:r>
                         <a:rPr lang="pt-BR" sz="1400" baseline="0" dirty="0" err="1" smtClean="0"/>
-                        <a:t>the</a:t>
+                        <a:t>results</a:t>
                       </a:r>
                       <a:r>
                         <a:rPr lang="pt-BR" sz="1400" baseline="0" dirty="0" smtClean="0"/>
@@ -21357,7 +20250,7 @@
                       </a:r>
                       <a:r>
                         <a:rPr lang="pt-BR" sz="1400" baseline="0" dirty="0" err="1" smtClean="0"/>
-                        <a:t>Strategic</a:t>
+                        <a:t>is</a:t>
                       </a:r>
                       <a:r>
                         <a:rPr lang="pt-BR" sz="1400" baseline="0" dirty="0" smtClean="0"/>
@@ -21365,7 +20258,19 @@
                       </a:r>
                       <a:r>
                         <a:rPr lang="pt-BR" sz="1400" baseline="0" dirty="0" err="1" smtClean="0"/>
-                        <a:t>Investments</a:t>
+                        <a:t>already</a:t>
+                      </a:r>
+                      <a:r>
+                        <a:rPr lang="pt-BR" sz="1400" baseline="0" dirty="0" smtClean="0"/>
+                        <a:t> </a:t>
+                      </a:r>
+                      <a:r>
+                        <a:rPr lang="pt-BR" sz="1400" baseline="0" dirty="0" err="1" smtClean="0"/>
+                        <a:t>identified</a:t>
+                      </a:r>
+                      <a:r>
+                        <a:rPr lang="pt-BR" sz="1400" baseline="0" dirty="0" smtClean="0"/>
+                        <a:t>.</a:t>
                       </a:r>
                       <a:endParaRPr lang="en-US" sz="1400" dirty="0"/>
                     </a:p>
@@ -21379,6 +20284,26 @@
                     <a:bodyPr/>
                     <a:lstStyle/>
                     <a:p>
+                      <a:r>
+                        <a:rPr lang="en-US" sz="1800" dirty="0" smtClean="0"/>
+                        <a:t>Multi-level </a:t>
+                      </a:r>
+                      <a:r>
+                        <a:rPr lang="en-US" sz="1800" dirty="0" smtClean="0">
+                          <a:solidFill>
+                            <a:srgbClr val="53BBD4"/>
+                          </a:solidFill>
+                        </a:rPr>
+                        <a:t>Strategic Plans </a:t>
+                      </a:r>
+                      <a:r>
+                        <a:rPr lang="en-US" sz="1800" dirty="0" smtClean="0">
+                          <a:solidFill>
+                            <a:schemeClr val="tx1"/>
+                          </a:solidFill>
+                        </a:rPr>
+                        <a:t>with current Status</a:t>
+                      </a:r>
                       <a:endParaRPr lang="en-US" dirty="0">
                         <a:solidFill>
                           <a:schemeClr val="tx1"/>
@@ -21394,12 +20319,8 @@
                     <a:lstStyle/>
                     <a:p>
                       <a:r>
-                        <a:rPr lang="pt-BR" sz="1400" dirty="0" smtClean="0"/>
-                        <a:t>The </a:t>
-                      </a:r>
-                      <a:r>
                         <a:rPr lang="pt-BR" sz="1400" dirty="0" err="1" smtClean="0"/>
-                        <a:t>Strategic</a:t>
+                        <a:t>Indicator</a:t>
                       </a:r>
                       <a:r>
                         <a:rPr lang="pt-BR" sz="1400" dirty="0" smtClean="0"/>
@@ -21407,7 +20328,15 @@
                       </a:r>
                       <a:r>
                         <a:rPr lang="pt-BR" sz="1400" dirty="0" err="1" smtClean="0"/>
-                        <a:t>Investments</a:t>
+                        <a:t>Targets</a:t>
+                      </a:r>
+                      <a:r>
+                        <a:rPr lang="pt-BR" sz="1400" dirty="0" smtClean="0"/>
+                        <a:t> are </a:t>
+                      </a:r>
+                      <a:r>
+                        <a:rPr lang="pt-BR" sz="1400" dirty="0" err="1" smtClean="0"/>
+                        <a:t>defined</a:t>
                       </a:r>
                       <a:r>
                         <a:rPr lang="pt-BR" sz="1400" dirty="0" smtClean="0"/>
@@ -21415,15 +20344,7 @@
                       </a:r>
                       <a:r>
                         <a:rPr lang="pt-BR" sz="1400" dirty="0" err="1" smtClean="0"/>
-                        <a:t>have</a:t>
-                      </a:r>
-                      <a:r>
-                        <a:rPr lang="pt-BR" sz="1400" dirty="0" smtClean="0"/>
-                        <a:t> Business Cases </a:t>
-                      </a:r>
-                      <a:r>
-                        <a:rPr lang="pt-BR" sz="1400" dirty="0" err="1" smtClean="0"/>
-                        <a:t>assessing</a:t>
+                        <a:t>and</a:t>
                       </a:r>
                       <a:r>
                         <a:rPr lang="pt-BR" sz="1400" dirty="0" smtClean="0"/>
@@ -21431,7 +20352,7 @@
                       </a:r>
                       <a:r>
                         <a:rPr lang="pt-BR" sz="1400" dirty="0" err="1" smtClean="0"/>
-                        <a:t>them</a:t>
+                        <a:t>Indicator</a:t>
                       </a:r>
                       <a:r>
                         <a:rPr lang="pt-BR" sz="1400" dirty="0" smtClean="0"/>
@@ -21439,7 +20360,15 @@
                       </a:r>
                       <a:r>
                         <a:rPr lang="pt-BR" sz="1400" dirty="0" err="1" smtClean="0"/>
-                        <a:t>against</a:t>
+                        <a:t>Measurements</a:t>
+                      </a:r>
+                      <a:r>
+                        <a:rPr lang="pt-BR" sz="1400" dirty="0" smtClean="0"/>
+                        <a:t> are </a:t>
+                      </a:r>
+                      <a:r>
+                        <a:rPr lang="pt-BR" sz="1400" dirty="0" err="1" smtClean="0"/>
+                        <a:t>being</a:t>
                       </a:r>
                       <a:r>
                         <a:rPr lang="pt-BR" sz="1400" dirty="0" smtClean="0"/>
@@ -21447,43 +20376,7 @@
                       </a:r>
                       <a:r>
                         <a:rPr lang="pt-BR" sz="1400" dirty="0" err="1" smtClean="0"/>
-                        <a:t>the</a:t>
-                      </a:r>
-                      <a:r>
-                        <a:rPr lang="pt-BR" sz="1400" dirty="0" smtClean="0"/>
-                        <a:t> </a:t>
-                      </a:r>
-                      <a:r>
-                        <a:rPr lang="pt-BR" sz="1400" dirty="0" err="1" smtClean="0"/>
-                        <a:t>Metrics</a:t>
-                      </a:r>
-                      <a:r>
-                        <a:rPr lang="pt-BR" sz="1400" dirty="0" smtClean="0"/>
-                        <a:t> </a:t>
-                      </a:r>
-                      <a:r>
-                        <a:rPr lang="pt-BR" sz="1400" dirty="0" err="1" smtClean="0"/>
-                        <a:t>of</a:t>
-                      </a:r>
-                      <a:r>
-                        <a:rPr lang="pt-BR" sz="1400" dirty="0" smtClean="0"/>
-                        <a:t> </a:t>
-                      </a:r>
-                      <a:r>
-                        <a:rPr lang="pt-BR" sz="1400" dirty="0" err="1" smtClean="0"/>
-                        <a:t>the</a:t>
-                      </a:r>
-                      <a:r>
-                        <a:rPr lang="pt-BR" sz="1400" dirty="0" smtClean="0"/>
-                        <a:t> </a:t>
-                      </a:r>
-                      <a:r>
-                        <a:rPr lang="pt-BR" sz="1400" dirty="0" err="1" smtClean="0"/>
-                        <a:t>Strategic</a:t>
-                      </a:r>
-                      <a:r>
-                        <a:rPr lang="pt-BR" sz="1400" dirty="0" smtClean="0"/>
-                        <a:t> Plans</a:t>
+                        <a:t>collected</a:t>
                       </a:r>
                       <a:endParaRPr lang="en-US" sz="1400" dirty="0"/>
                     </a:p>
@@ -21497,6 +20390,22 @@
                     <a:bodyPr/>
                     <a:lstStyle/>
                     <a:p>
+                      <a:r>
+                        <a:rPr lang="en-US" sz="1800" dirty="0" smtClean="0">
+                          <a:solidFill>
+                            <a:srgbClr val="53BBD4"/>
+                          </a:solidFill>
+                        </a:rPr>
+                        <a:t>Graphical </a:t>
+                      </a:r>
+                      <a:r>
+                        <a:rPr lang="en-US" sz="1800" dirty="0" smtClean="0"/>
+                        <a:t>Strategic Map with current</a:t>
+                      </a:r>
+                      <a:r>
+                        <a:rPr lang="en-US" sz="1800" baseline="0" dirty="0" smtClean="0"/>
+                        <a:t> Status</a:t>
+                      </a:r>
                       <a:endParaRPr lang="en-US" dirty="0"/>
                     </a:p>
                   </a:txBody>
@@ -21525,12 +20434,8 @@
                         <a:defRPr/>
                       </a:pPr>
                       <a:r>
-                        <a:rPr lang="pt-BR" sz="1400" dirty="0" smtClean="0"/>
-                        <a:t>A Portfolio Management </a:t>
-                      </a:r>
-                      <a:r>
                         <a:rPr lang="pt-BR" sz="1400" dirty="0" err="1" smtClean="0"/>
-                        <a:t>Process</a:t>
+                        <a:t>Indicator</a:t>
                       </a:r>
                       <a:r>
                         <a:rPr lang="pt-BR" sz="1400" dirty="0" smtClean="0"/>
@@ -21538,71 +20443,55 @@
                       </a:r>
                       <a:r>
                         <a:rPr lang="pt-BR" sz="1400" dirty="0" err="1" smtClean="0"/>
-                        <a:t>is</a:t>
+                        <a:t>Targets</a:t>
                       </a:r>
                       <a:r>
                         <a:rPr lang="pt-BR" sz="1400" dirty="0" smtClean="0"/>
-                        <a:t> in </a:t>
+                        <a:t> are </a:t>
                       </a:r>
                       <a:r>
                         <a:rPr lang="pt-BR" sz="1400" dirty="0" err="1" smtClean="0"/>
-                        <a:t>place</a:t>
+                        <a:t>defined</a:t>
                       </a:r>
                       <a:r>
                         <a:rPr lang="pt-BR" sz="1400" dirty="0" smtClean="0"/>
-                        <a:t>,</a:t>
-                      </a:r>
-                      <a:r>
-                        <a:rPr lang="pt-BR" sz="1400" baseline="0" dirty="0" smtClean="0"/>
                         <a:t> </a:t>
                       </a:r>
                       <a:r>
-                        <a:rPr lang="pt-BR" sz="1400" baseline="0" dirty="0" err="1" smtClean="0"/>
-                        <a:t>using</a:t>
-                      </a:r>
-                      <a:r>
-                        <a:rPr lang="pt-BR" sz="1400" baseline="0" dirty="0" smtClean="0"/>
+                        <a:rPr lang="pt-BR" sz="1400" dirty="0" err="1" smtClean="0"/>
+                        <a:t>and</a:t>
+                      </a:r>
+                      <a:r>
+                        <a:rPr lang="pt-BR" sz="1400" dirty="0" smtClean="0"/>
                         <a:t> </a:t>
                       </a:r>
                       <a:r>
-                        <a:rPr lang="pt-BR" sz="1400" baseline="0" dirty="0" err="1" smtClean="0"/>
-                        <a:t>the</a:t>
-                      </a:r>
-                      <a:r>
-                        <a:rPr lang="pt-BR" sz="1400" baseline="0" dirty="0" smtClean="0"/>
+                        <a:rPr lang="pt-BR" sz="1400" dirty="0" err="1" smtClean="0"/>
+                        <a:t>Indicator</a:t>
+                      </a:r>
+                      <a:r>
+                        <a:rPr lang="pt-BR" sz="1400" dirty="0" smtClean="0"/>
                         <a:t> </a:t>
                       </a:r>
                       <a:r>
-                        <a:rPr lang="pt-BR" sz="1400" baseline="0" dirty="0" err="1" smtClean="0"/>
-                        <a:t>Strategic</a:t>
-                      </a:r>
-                      <a:r>
-                        <a:rPr lang="pt-BR" sz="1400" baseline="0" dirty="0" smtClean="0"/>
+                        <a:rPr lang="pt-BR" sz="1400" dirty="0" err="1" smtClean="0"/>
+                        <a:t>Measurements</a:t>
+                      </a:r>
+                      <a:r>
+                        <a:rPr lang="pt-BR" sz="1400" dirty="0" smtClean="0"/>
+                        <a:t> are </a:t>
+                      </a:r>
+                      <a:r>
+                        <a:rPr lang="pt-BR" sz="1400" dirty="0" err="1" smtClean="0"/>
+                        <a:t>being</a:t>
+                      </a:r>
+                      <a:r>
+                        <a:rPr lang="pt-BR" sz="1400" dirty="0" smtClean="0"/>
                         <a:t> </a:t>
                       </a:r>
                       <a:r>
-                        <a:rPr lang="pt-BR" sz="1400" baseline="0" dirty="0" err="1" smtClean="0"/>
-                        <a:t>Alignment</a:t>
-                      </a:r>
-                      <a:r>
-                        <a:rPr lang="pt-BR" sz="1400" baseline="0" dirty="0" smtClean="0"/>
-                        <a:t> as a </a:t>
-                      </a:r>
-                      <a:r>
-                        <a:rPr lang="pt-BR" sz="1400" baseline="0" dirty="0" err="1" smtClean="0"/>
-                        <a:t>decision-making</a:t>
-                      </a:r>
-                      <a:r>
-                        <a:rPr lang="pt-BR" sz="1400" baseline="0" dirty="0" smtClean="0"/>
-                        <a:t> </a:t>
-                      </a:r>
-                      <a:r>
-                        <a:rPr lang="pt-BR" sz="1400" baseline="0" dirty="0" err="1" smtClean="0"/>
-                        <a:t>variable</a:t>
-                      </a:r>
-                      <a:r>
-                        <a:rPr lang="pt-BR" sz="1400" baseline="0" dirty="0" smtClean="0"/>
-                        <a:t>.</a:t>
+                        <a:rPr lang="pt-BR" sz="1400" dirty="0" err="1" smtClean="0"/>
+                        <a:t>collected</a:t>
                       </a:r>
                       <a:endParaRPr lang="en-US" sz="1400" dirty="0" smtClean="0"/>
                     </a:p>
@@ -21616,6 +20505,36 @@
                     <a:bodyPr/>
                     <a:lstStyle/>
                     <a:p>
+                      <a:r>
+                        <a:rPr lang="pt-BR" dirty="0" err="1" smtClean="0"/>
+                        <a:t>Results</a:t>
+                      </a:r>
+                      <a:r>
+                        <a:rPr lang="pt-BR" dirty="0" smtClean="0"/>
+                        <a:t> </a:t>
+                      </a:r>
+                      <a:r>
+                        <a:rPr lang="pt-BR" sz="1800" kern="1200" dirty="0" smtClean="0">
+                          <a:solidFill>
+                            <a:srgbClr val="53BBD4"/>
+                          </a:solidFill>
+                          <a:latin typeface="+mn-lt"/>
+                          <a:ea typeface="+mn-ea"/>
+                          <a:cs typeface="+mn-cs"/>
+                        </a:rPr>
+                        <a:t>Trend </a:t>
+                      </a:r>
+                      <a:r>
+                        <a:rPr lang="pt-BR" sz="1800" kern="1200" dirty="0" err="1" smtClean="0">
+                          <a:solidFill>
+                            <a:srgbClr val="53BBD4"/>
+                          </a:solidFill>
+                          <a:latin typeface="+mn-lt"/>
+                          <a:ea typeface="+mn-ea"/>
+                          <a:cs typeface="+mn-cs"/>
+                        </a:rPr>
+                        <a:t>Analysis</a:t>
+                      </a:r>
                       <a:endParaRPr lang="en-US" sz="1800" kern="1200" dirty="0">
                         <a:solidFill>
                           <a:srgbClr val="53BBD4"/>
@@ -21652,7 +20571,7 @@
                       </a:pPr>
                       <a:r>
                         <a:rPr lang="pt-BR" sz="1400" dirty="0" err="1" smtClean="0"/>
-                        <a:t>There</a:t>
+                        <a:t>Indicator</a:t>
                       </a:r>
                       <a:r>
                         <a:rPr lang="pt-BR" sz="1400" dirty="0" smtClean="0"/>
@@ -21660,15 +20579,15 @@
                       </a:r>
                       <a:r>
                         <a:rPr lang="pt-BR" sz="1400" dirty="0" err="1" smtClean="0"/>
-                        <a:t>is</a:t>
+                        <a:t>Targets</a:t>
                       </a:r>
                       <a:r>
                         <a:rPr lang="pt-BR" sz="1400" dirty="0" smtClean="0"/>
-                        <a:t> a </a:t>
+                        <a:t> are </a:t>
                       </a:r>
                       <a:r>
                         <a:rPr lang="pt-BR" sz="1400" dirty="0" err="1" smtClean="0"/>
-                        <a:t>process</a:t>
+                        <a:t>defined</a:t>
                       </a:r>
                       <a:r>
                         <a:rPr lang="pt-BR" sz="1400" dirty="0" smtClean="0"/>
@@ -21676,7 +20595,7 @@
                       </a:r>
                       <a:r>
                         <a:rPr lang="pt-BR" sz="1400" dirty="0" err="1" smtClean="0"/>
-                        <a:t>to</a:t>
+                        <a:t>and</a:t>
                       </a:r>
                       <a:r>
                         <a:rPr lang="pt-BR" sz="1400" dirty="0" smtClean="0"/>
@@ -21684,43 +20603,31 @@
                       </a:r>
                       <a:r>
                         <a:rPr lang="pt-BR" sz="1400" dirty="0" err="1" smtClean="0"/>
-                        <a:t>assess</a:t>
-                      </a:r>
-                      <a:r>
-                        <a:rPr lang="pt-BR" sz="1400" baseline="0" dirty="0" smtClean="0"/>
+                        <a:t>Indicator</a:t>
+                      </a:r>
+                      <a:r>
+                        <a:rPr lang="pt-BR" sz="1400" dirty="0" smtClean="0"/>
                         <a:t> </a:t>
                       </a:r>
                       <a:r>
-                        <a:rPr lang="pt-BR" sz="1400" baseline="0" dirty="0" err="1" smtClean="0"/>
-                        <a:t>and</a:t>
-                      </a:r>
-                      <a:r>
-                        <a:rPr lang="pt-BR" sz="1400" baseline="0" dirty="0" smtClean="0"/>
+                        <a:rPr lang="pt-BR" sz="1400" dirty="0" err="1" smtClean="0"/>
+                        <a:t>Measurements</a:t>
+                      </a:r>
+                      <a:r>
+                        <a:rPr lang="pt-BR" sz="1400" dirty="0" smtClean="0"/>
+                        <a:t> are </a:t>
+                      </a:r>
+                      <a:r>
+                        <a:rPr lang="pt-BR" sz="1400" dirty="0" err="1" smtClean="0"/>
+                        <a:t>being</a:t>
+                      </a:r>
+                      <a:r>
+                        <a:rPr lang="pt-BR" sz="1400" dirty="0" smtClean="0"/>
                         <a:t> </a:t>
                       </a:r>
                       <a:r>
-                        <a:rPr lang="pt-BR" sz="1400" baseline="0" dirty="0" err="1" smtClean="0"/>
-                        <a:t>re-assess</a:t>
-                      </a:r>
-                      <a:r>
-                        <a:rPr lang="pt-BR" sz="1400" baseline="0" dirty="0" smtClean="0"/>
-                        <a:t> </a:t>
-                      </a:r>
-                      <a:r>
-                        <a:rPr lang="pt-BR" sz="1400" baseline="0" dirty="0" err="1" smtClean="0"/>
-                        <a:t>investments</a:t>
-                      </a:r>
-                      <a:r>
-                        <a:rPr lang="pt-BR" sz="1400" baseline="0" dirty="0" smtClean="0"/>
-                        <a:t> </a:t>
-                      </a:r>
-                      <a:r>
-                        <a:rPr lang="pt-BR" sz="1400" baseline="0" dirty="0" err="1" smtClean="0"/>
-                        <a:t>periodically</a:t>
-                      </a:r>
-                      <a:r>
-                        <a:rPr lang="pt-BR" sz="1400" baseline="0" dirty="0" smtClean="0"/>
-                        <a:t>.</a:t>
+                        <a:rPr lang="pt-BR" sz="1400" dirty="0" err="1" smtClean="0"/>
+                        <a:t>collected</a:t>
                       </a:r>
                       <a:endParaRPr lang="en-US" sz="1400" dirty="0" smtClean="0"/>
                     </a:p>
@@ -21735,7 +20642,7 @@
     </p:spTree>
     <p:extLst>
       <p:ext uri="{BB962C8B-B14F-4D97-AF65-F5344CB8AC3E}">
-        <p14:creationId xmlns:p14="http://schemas.microsoft.com/office/powerpoint/2010/main" val="1325803302"/>
+        <p14:creationId xmlns:p14="http://schemas.microsoft.com/office/powerpoint/2010/main" val="4207088819"/>
       </p:ext>
     </p:extLst>
   </p:cSld>
@@ -21817,6 +20724,726 @@
         </p:nvSpPr>
         <p:spPr/>
         <p:txBody>
+          <a:bodyPr/>
+          <a:lstStyle/>
+          <a:p>
+            <a:pPr marL="0" indent="0">
+              <a:lnSpc>
+                <a:spcPts val="1800"/>
+              </a:lnSpc>
+              <a:spcAft>
+                <a:spcPts val="300"/>
+              </a:spcAft>
+              <a:buNone/>
+            </a:pPr>
+            <a:endParaRPr lang="en-US" sz="1600" dirty="0" smtClean="0"/>
+          </a:p>
+        </p:txBody>
+      </p:sp>
+      <p:sp>
+        <p:nvSpPr>
+          <p:cNvPr id="3" name="Content Placeholder 2"/>
+          <p:cNvSpPr>
+            <a:spLocks noGrp="1"/>
+          </p:cNvSpPr>
+          <p:nvPr>
+            <p:ph sz="quarter" idx="11"/>
+          </p:nvPr>
+        </p:nvSpPr>
+        <p:spPr/>
+        <p:txBody>
+          <a:bodyPr vert="horz" lIns="91440" tIns="45720" rIns="91440" bIns="45720" rtlCol="0" anchor="t">
+            <a:noAutofit/>
+          </a:bodyPr>
+          <a:lstStyle/>
+          <a:p>
+            <a:pPr marL="175186" indent="-175186">
+              <a:spcBef>
+                <a:spcPts val="450"/>
+              </a:spcBef>
+            </a:pPr>
+            <a:r>
+              <a:rPr lang="en-US" sz="1600" b="1" dirty="0" smtClean="0">
+                <a:solidFill>
+                  <a:schemeClr val="tx2"/>
+                </a:solidFill>
+              </a:rPr>
+              <a:t>Group 3: Investment Evaluation for Selection</a:t>
+            </a:r>
+            <a:endParaRPr lang="en-US" sz="1600" b="1" dirty="0">
+              <a:solidFill>
+                <a:schemeClr val="tx2"/>
+              </a:solidFill>
+            </a:endParaRPr>
+          </a:p>
+        </p:txBody>
+      </p:sp>
+      <p:graphicFrame>
+        <p:nvGraphicFramePr>
+          <p:cNvPr id="7" name="Table 6"/>
+          <p:cNvGraphicFramePr>
+            <a:graphicFrameLocks noGrp="1"/>
+          </p:cNvGraphicFramePr>
+          <p:nvPr>
+            <p:extLst>
+              <p:ext uri="{D42A27DB-BD31-4B8C-83A1-F6EECF244321}">
+                <p14:modId xmlns:p14="http://schemas.microsoft.com/office/powerpoint/2010/main" val="671364009"/>
+              </p:ext>
+            </p:extLst>
+          </p:nvPr>
+        </p:nvGraphicFramePr>
+        <p:xfrm>
+          <a:off x="453176" y="1002605"/>
+          <a:ext cx="8428833" cy="3278188"/>
+        </p:xfrm>
+        <a:graphic>
+          <a:graphicData uri="http://schemas.openxmlformats.org/drawingml/2006/table">
+            <a:tbl>
+              <a:tblPr firstRow="1" bandRow="1">
+                <a:tableStyleId>{5C22544A-7EE6-4342-B048-85BDC9FD1C3A}</a:tableStyleId>
+              </a:tblPr>
+              <a:tblGrid>
+                <a:gridCol w="3038488"/>
+                <a:gridCol w="5390345"/>
+              </a:tblGrid>
+              <a:tr h="529442">
+                <a:tc>
+                  <a:txBody>
+                    <a:bodyPr/>
+                    <a:lstStyle/>
+                    <a:p>
+                      <a:r>
+                        <a:rPr lang="pt-BR" dirty="0" err="1" smtClean="0"/>
+                        <a:t>Deliverable</a:t>
+                      </a:r>
+                      <a:endParaRPr lang="en-US" dirty="0"/>
+                    </a:p>
+                  </a:txBody>
+                  <a:tcPr/>
+                </a:tc>
+                <a:tc>
+                  <a:txBody>
+                    <a:bodyPr/>
+                    <a:lstStyle/>
+                    <a:p>
+                      <a:r>
+                        <a:rPr lang="pt-BR" dirty="0" err="1" smtClean="0"/>
+                        <a:t>Implementation</a:t>
+                      </a:r>
+                      <a:r>
+                        <a:rPr lang="pt-BR" dirty="0" smtClean="0"/>
+                        <a:t> </a:t>
+                      </a:r>
+                      <a:r>
+                        <a:rPr lang="pt-BR" dirty="0" err="1" smtClean="0"/>
+                        <a:t>Assumption</a:t>
+                      </a:r>
+                      <a:r>
+                        <a:rPr lang="pt-BR" dirty="0" smtClean="0"/>
+                        <a:t> (</a:t>
+                      </a:r>
+                      <a:r>
+                        <a:rPr lang="pt-BR" dirty="0" err="1" smtClean="0"/>
+                        <a:t>Pre-Requisites</a:t>
+                      </a:r>
+                      <a:r>
+                        <a:rPr lang="pt-BR" dirty="0" smtClean="0"/>
+                        <a:t>)</a:t>
+                      </a:r>
+                      <a:endParaRPr lang="en-US" dirty="0"/>
+                    </a:p>
+                  </a:txBody>
+                  <a:tcPr/>
+                </a:tc>
+              </a:tr>
+              <a:tr h="739768">
+                <a:tc>
+                  <a:txBody>
+                    <a:bodyPr/>
+                    <a:lstStyle/>
+                    <a:p>
+                      <a:r>
+                        <a:rPr lang="en-US" sz="1800" kern="1200" dirty="0" smtClean="0">
+                          <a:solidFill>
+                            <a:srgbClr val="53BBD4"/>
+                          </a:solidFill>
+                          <a:latin typeface="+mn-lt"/>
+                          <a:ea typeface="+mn-ea"/>
+                          <a:cs typeface="+mn-cs"/>
+                        </a:rPr>
+                        <a:t>Investments Evaluation </a:t>
+                      </a:r>
+                      <a:r>
+                        <a:rPr lang="en-US" sz="1800" kern="1200" dirty="0" smtClean="0">
+                          <a:solidFill>
+                            <a:schemeClr val="tx1"/>
+                          </a:solidFill>
+                          <a:latin typeface="+mn-lt"/>
+                          <a:ea typeface="+mn-ea"/>
+                          <a:cs typeface="+mn-cs"/>
+                        </a:rPr>
+                        <a:t>(Alignment Assessment)</a:t>
+                      </a:r>
+                      <a:endParaRPr lang="en-US" dirty="0">
+                        <a:solidFill>
+                          <a:schemeClr val="tx1"/>
+                        </a:solidFill>
+                      </a:endParaRPr>
+                    </a:p>
+                  </a:txBody>
+                  <a:tcPr/>
+                </a:tc>
+                <a:tc>
+                  <a:txBody>
+                    <a:bodyPr/>
+                    <a:lstStyle/>
+                    <a:p>
+                      <a:r>
+                        <a:rPr lang="pt-BR" sz="1400" dirty="0" smtClean="0"/>
+                        <a:t>The </a:t>
+                      </a:r>
+                      <a:r>
+                        <a:rPr lang="pt-BR" sz="1400" dirty="0" err="1" smtClean="0"/>
+                        <a:t>Strategic</a:t>
+                      </a:r>
+                      <a:r>
+                        <a:rPr lang="pt-BR" sz="1400" dirty="0" smtClean="0"/>
+                        <a:t> </a:t>
+                      </a:r>
+                      <a:r>
+                        <a:rPr lang="pt-BR" sz="1400" dirty="0" err="1" smtClean="0"/>
+                        <a:t>Plan</a:t>
+                      </a:r>
+                      <a:r>
+                        <a:rPr lang="pt-BR" sz="1400" baseline="0" dirty="0" smtClean="0"/>
+                        <a:t> defines </a:t>
+                      </a:r>
+                      <a:r>
+                        <a:rPr lang="pt-BR" sz="1400" baseline="0" dirty="0" err="1" smtClean="0"/>
+                        <a:t>metrics</a:t>
+                      </a:r>
+                      <a:r>
+                        <a:rPr lang="pt-BR" sz="1400" baseline="0" dirty="0" smtClean="0"/>
+                        <a:t> </a:t>
+                      </a:r>
+                      <a:r>
+                        <a:rPr lang="pt-BR" sz="1400" baseline="0" dirty="0" err="1" smtClean="0"/>
+                        <a:t>to</a:t>
+                      </a:r>
+                      <a:r>
+                        <a:rPr lang="pt-BR" sz="1400" baseline="0" dirty="0" smtClean="0"/>
+                        <a:t> </a:t>
+                      </a:r>
+                      <a:r>
+                        <a:rPr lang="pt-BR" sz="1400" baseline="0" dirty="0" err="1" smtClean="0"/>
+                        <a:t>align</a:t>
+                      </a:r>
+                      <a:r>
+                        <a:rPr lang="pt-BR" sz="1400" baseline="0" dirty="0" smtClean="0"/>
+                        <a:t> </a:t>
+                      </a:r>
+                      <a:r>
+                        <a:rPr lang="pt-BR" sz="1400" baseline="0" dirty="0" err="1" smtClean="0"/>
+                        <a:t>the</a:t>
+                      </a:r>
+                      <a:r>
+                        <a:rPr lang="pt-BR" sz="1400" baseline="0" dirty="0" smtClean="0"/>
+                        <a:t> </a:t>
+                      </a:r>
+                      <a:r>
+                        <a:rPr lang="pt-BR" sz="1400" baseline="0" dirty="0" err="1" smtClean="0"/>
+                        <a:t>Strategic</a:t>
+                      </a:r>
+                      <a:r>
+                        <a:rPr lang="pt-BR" sz="1400" baseline="0" dirty="0" smtClean="0"/>
+                        <a:t> </a:t>
+                      </a:r>
+                      <a:r>
+                        <a:rPr lang="pt-BR" sz="1400" baseline="0" dirty="0" err="1" smtClean="0"/>
+                        <a:t>Goals</a:t>
+                      </a:r>
+                      <a:r>
+                        <a:rPr lang="pt-BR" sz="1400" baseline="0" dirty="0" smtClean="0"/>
+                        <a:t> </a:t>
+                      </a:r>
+                      <a:r>
+                        <a:rPr lang="pt-BR" sz="1400" baseline="0" dirty="0" err="1" smtClean="0"/>
+                        <a:t>to</a:t>
+                      </a:r>
+                      <a:r>
+                        <a:rPr lang="pt-BR" sz="1400" baseline="0" dirty="0" smtClean="0"/>
+                        <a:t> </a:t>
+                      </a:r>
+                      <a:r>
+                        <a:rPr lang="pt-BR" sz="1400" baseline="0" dirty="0" err="1" smtClean="0"/>
+                        <a:t>the</a:t>
+                      </a:r>
+                      <a:r>
+                        <a:rPr lang="pt-BR" sz="1400" baseline="0" dirty="0" smtClean="0"/>
+                        <a:t> </a:t>
+                      </a:r>
+                      <a:r>
+                        <a:rPr lang="pt-BR" sz="1400" baseline="0" dirty="0" err="1" smtClean="0"/>
+                        <a:t>Strategic</a:t>
+                      </a:r>
+                      <a:r>
+                        <a:rPr lang="pt-BR" sz="1400" baseline="0" dirty="0" smtClean="0"/>
+                        <a:t> </a:t>
+                      </a:r>
+                      <a:r>
+                        <a:rPr lang="pt-BR" sz="1400" baseline="0" dirty="0" err="1" smtClean="0"/>
+                        <a:t>Investments</a:t>
+                      </a:r>
+                      <a:endParaRPr lang="en-US" sz="1400" dirty="0"/>
+                    </a:p>
+                  </a:txBody>
+                  <a:tcPr/>
+                </a:tc>
+              </a:tr>
+              <a:tr h="739768">
+                <a:tc>
+                  <a:txBody>
+                    <a:bodyPr/>
+                    <a:lstStyle/>
+                    <a:p>
+                      <a:endParaRPr lang="en-US" dirty="0">
+                        <a:solidFill>
+                          <a:schemeClr val="tx1"/>
+                        </a:solidFill>
+                      </a:endParaRPr>
+                    </a:p>
+                  </a:txBody>
+                  <a:tcPr/>
+                </a:tc>
+                <a:tc>
+                  <a:txBody>
+                    <a:bodyPr/>
+                    <a:lstStyle/>
+                    <a:p>
+                      <a:r>
+                        <a:rPr lang="pt-BR" sz="1400" dirty="0" smtClean="0"/>
+                        <a:t>The </a:t>
+                      </a:r>
+                      <a:r>
+                        <a:rPr lang="pt-BR" sz="1400" dirty="0" err="1" smtClean="0"/>
+                        <a:t>Strategic</a:t>
+                      </a:r>
+                      <a:r>
+                        <a:rPr lang="pt-BR" sz="1400" dirty="0" smtClean="0"/>
+                        <a:t> </a:t>
+                      </a:r>
+                      <a:r>
+                        <a:rPr lang="pt-BR" sz="1400" dirty="0" err="1" smtClean="0"/>
+                        <a:t>Investments</a:t>
+                      </a:r>
+                      <a:r>
+                        <a:rPr lang="pt-BR" sz="1400" dirty="0" smtClean="0"/>
+                        <a:t> </a:t>
+                      </a:r>
+                      <a:r>
+                        <a:rPr lang="pt-BR" sz="1400" dirty="0" err="1" smtClean="0"/>
+                        <a:t>have</a:t>
+                      </a:r>
+                      <a:r>
+                        <a:rPr lang="pt-BR" sz="1400" dirty="0" smtClean="0"/>
+                        <a:t> Business Cases </a:t>
+                      </a:r>
+                      <a:r>
+                        <a:rPr lang="pt-BR" sz="1400" dirty="0" err="1" smtClean="0"/>
+                        <a:t>assessing</a:t>
+                      </a:r>
+                      <a:r>
+                        <a:rPr lang="pt-BR" sz="1400" dirty="0" smtClean="0"/>
+                        <a:t> </a:t>
+                      </a:r>
+                      <a:r>
+                        <a:rPr lang="pt-BR" sz="1400" dirty="0" err="1" smtClean="0"/>
+                        <a:t>them</a:t>
+                      </a:r>
+                      <a:r>
+                        <a:rPr lang="pt-BR" sz="1400" dirty="0" smtClean="0"/>
+                        <a:t> </a:t>
+                      </a:r>
+                      <a:r>
+                        <a:rPr lang="pt-BR" sz="1400" dirty="0" err="1" smtClean="0"/>
+                        <a:t>against</a:t>
+                      </a:r>
+                      <a:r>
+                        <a:rPr lang="pt-BR" sz="1400" dirty="0" smtClean="0"/>
+                        <a:t> </a:t>
+                      </a:r>
+                      <a:r>
+                        <a:rPr lang="pt-BR" sz="1400" dirty="0" err="1" smtClean="0"/>
+                        <a:t>the</a:t>
+                      </a:r>
+                      <a:r>
+                        <a:rPr lang="pt-BR" sz="1400" dirty="0" smtClean="0"/>
+                        <a:t> </a:t>
+                      </a:r>
+                      <a:r>
+                        <a:rPr lang="pt-BR" sz="1400" dirty="0" err="1" smtClean="0"/>
+                        <a:t>Metrics</a:t>
+                      </a:r>
+                      <a:r>
+                        <a:rPr lang="pt-BR" sz="1400" dirty="0" smtClean="0"/>
+                        <a:t> </a:t>
+                      </a:r>
+                      <a:r>
+                        <a:rPr lang="pt-BR" sz="1400" dirty="0" err="1" smtClean="0"/>
+                        <a:t>of</a:t>
+                      </a:r>
+                      <a:r>
+                        <a:rPr lang="pt-BR" sz="1400" dirty="0" smtClean="0"/>
+                        <a:t> </a:t>
+                      </a:r>
+                      <a:r>
+                        <a:rPr lang="pt-BR" sz="1400" dirty="0" err="1" smtClean="0"/>
+                        <a:t>the</a:t>
+                      </a:r>
+                      <a:r>
+                        <a:rPr lang="pt-BR" sz="1400" dirty="0" smtClean="0"/>
+                        <a:t> </a:t>
+                      </a:r>
+                      <a:r>
+                        <a:rPr lang="pt-BR" sz="1400" dirty="0" err="1" smtClean="0"/>
+                        <a:t>Strategic</a:t>
+                      </a:r>
+                      <a:r>
+                        <a:rPr lang="pt-BR" sz="1400" dirty="0" smtClean="0"/>
+                        <a:t> Plans</a:t>
+                      </a:r>
+                      <a:endParaRPr lang="en-US" sz="1400" dirty="0"/>
+                    </a:p>
+                  </a:txBody>
+                  <a:tcPr/>
+                </a:tc>
+              </a:tr>
+              <a:tr h="529442">
+                <a:tc>
+                  <a:txBody>
+                    <a:bodyPr/>
+                    <a:lstStyle/>
+                    <a:p>
+                      <a:endParaRPr lang="en-US" dirty="0"/>
+                    </a:p>
+                  </a:txBody>
+                  <a:tcPr/>
+                </a:tc>
+                <a:tc>
+                  <a:txBody>
+                    <a:bodyPr/>
+                    <a:lstStyle/>
+                    <a:p>
+                      <a:pPr marL="0" marR="0" indent="0" algn="l" defTabSz="457200" rtl="0" eaLnBrk="1" fontAlgn="auto" latinLnBrk="0" hangingPunct="1">
+                        <a:lnSpc>
+                          <a:spcPct val="100000"/>
+                        </a:lnSpc>
+                        <a:spcBef>
+                          <a:spcPts val="0"/>
+                        </a:spcBef>
+                        <a:spcAft>
+                          <a:spcPts val="0"/>
+                        </a:spcAft>
+                        <a:buClrTx/>
+                        <a:buSzTx/>
+                        <a:buFontTx/>
+                        <a:buNone/>
+                        <a:tabLst/>
+                        <a:defRPr/>
+                      </a:pPr>
+                      <a:r>
+                        <a:rPr lang="pt-BR" sz="1400" dirty="0" smtClean="0"/>
+                        <a:t>A Portfolio Management </a:t>
+                      </a:r>
+                      <a:r>
+                        <a:rPr lang="pt-BR" sz="1400" dirty="0" err="1" smtClean="0"/>
+                        <a:t>Process</a:t>
+                      </a:r>
+                      <a:r>
+                        <a:rPr lang="pt-BR" sz="1400" dirty="0" smtClean="0"/>
+                        <a:t> </a:t>
+                      </a:r>
+                      <a:r>
+                        <a:rPr lang="pt-BR" sz="1400" dirty="0" err="1" smtClean="0"/>
+                        <a:t>is</a:t>
+                      </a:r>
+                      <a:r>
+                        <a:rPr lang="pt-BR" sz="1400" dirty="0" smtClean="0"/>
+                        <a:t> in </a:t>
+                      </a:r>
+                      <a:r>
+                        <a:rPr lang="pt-BR" sz="1400" dirty="0" err="1" smtClean="0"/>
+                        <a:t>place</a:t>
+                      </a:r>
+                      <a:r>
+                        <a:rPr lang="pt-BR" sz="1400" dirty="0" smtClean="0"/>
+                        <a:t>,</a:t>
+                      </a:r>
+                      <a:r>
+                        <a:rPr lang="pt-BR" sz="1400" baseline="0" dirty="0" smtClean="0"/>
+                        <a:t> </a:t>
+                      </a:r>
+                      <a:r>
+                        <a:rPr lang="pt-BR" sz="1400" baseline="0" dirty="0" err="1" smtClean="0"/>
+                        <a:t>using</a:t>
+                      </a:r>
+                      <a:r>
+                        <a:rPr lang="pt-BR" sz="1400" baseline="0" dirty="0" smtClean="0"/>
+                        <a:t> </a:t>
+                      </a:r>
+                      <a:r>
+                        <a:rPr lang="pt-BR" sz="1400" baseline="0" dirty="0" err="1" smtClean="0"/>
+                        <a:t>the</a:t>
+                      </a:r>
+                      <a:r>
+                        <a:rPr lang="pt-BR" sz="1400" baseline="0" dirty="0" smtClean="0"/>
+                        <a:t> </a:t>
+                      </a:r>
+                      <a:r>
+                        <a:rPr lang="pt-BR" sz="1400" baseline="0" dirty="0" err="1" smtClean="0"/>
+                        <a:t>Strategic</a:t>
+                      </a:r>
+                      <a:r>
+                        <a:rPr lang="pt-BR" sz="1400" baseline="0" dirty="0" smtClean="0"/>
+                        <a:t> </a:t>
+                      </a:r>
+                      <a:r>
+                        <a:rPr lang="pt-BR" sz="1400" baseline="0" dirty="0" err="1" smtClean="0"/>
+                        <a:t>Alignment</a:t>
+                      </a:r>
+                      <a:r>
+                        <a:rPr lang="pt-BR" sz="1400" baseline="0" dirty="0" smtClean="0"/>
+                        <a:t> as a </a:t>
+                      </a:r>
+                      <a:r>
+                        <a:rPr lang="pt-BR" sz="1400" baseline="0" dirty="0" err="1" smtClean="0"/>
+                        <a:t>decision-making</a:t>
+                      </a:r>
+                      <a:r>
+                        <a:rPr lang="pt-BR" sz="1400" baseline="0" dirty="0" smtClean="0"/>
+                        <a:t> </a:t>
+                      </a:r>
+                      <a:r>
+                        <a:rPr lang="pt-BR" sz="1400" baseline="0" dirty="0" err="1" smtClean="0"/>
+                        <a:t>variable</a:t>
+                      </a:r>
+                      <a:r>
+                        <a:rPr lang="pt-BR" sz="1400" baseline="0" dirty="0" smtClean="0"/>
+                        <a:t>.</a:t>
+                      </a:r>
+                      <a:endParaRPr lang="en-US" sz="1400" dirty="0" smtClean="0"/>
+                    </a:p>
+                  </a:txBody>
+                  <a:tcPr/>
+                </a:tc>
+              </a:tr>
+              <a:tr h="739768">
+                <a:tc>
+                  <a:txBody>
+                    <a:bodyPr/>
+                    <a:lstStyle/>
+                    <a:p>
+                      <a:endParaRPr lang="en-US" sz="1800" kern="1200" dirty="0">
+                        <a:solidFill>
+                          <a:srgbClr val="53BBD4"/>
+                        </a:solidFill>
+                        <a:latin typeface="+mn-lt"/>
+                        <a:ea typeface="+mn-ea"/>
+                        <a:cs typeface="+mn-cs"/>
+                      </a:endParaRPr>
+                    </a:p>
+                  </a:txBody>
+                  <a:tcPr/>
+                </a:tc>
+                <a:tc>
+                  <a:txBody>
+                    <a:bodyPr/>
+                    <a:lstStyle/>
+                    <a:p>
+                      <a:pPr marL="0" marR="0" indent="0" algn="l" defTabSz="457200" rtl="0" eaLnBrk="1" fontAlgn="auto" latinLnBrk="0" hangingPunct="1">
+                        <a:lnSpc>
+                          <a:spcPct val="100000"/>
+                        </a:lnSpc>
+                        <a:spcBef>
+                          <a:spcPts val="0"/>
+                        </a:spcBef>
+                        <a:spcAft>
+                          <a:spcPts val="0"/>
+                        </a:spcAft>
+                        <a:buClrTx/>
+                        <a:buSzTx/>
+                        <a:buFontTx/>
+                        <a:buNone/>
+                        <a:tabLst/>
+                        <a:defRPr/>
+                      </a:pPr>
+                      <a:r>
+                        <a:rPr lang="pt-BR" sz="1400" dirty="0" err="1" smtClean="0"/>
+                        <a:t>There</a:t>
+                      </a:r>
+                      <a:r>
+                        <a:rPr lang="pt-BR" sz="1400" dirty="0" smtClean="0"/>
+                        <a:t> </a:t>
+                      </a:r>
+                      <a:r>
+                        <a:rPr lang="pt-BR" sz="1400" dirty="0" err="1" smtClean="0"/>
+                        <a:t>is</a:t>
+                      </a:r>
+                      <a:r>
+                        <a:rPr lang="pt-BR" sz="1400" dirty="0" smtClean="0"/>
+                        <a:t> a </a:t>
+                      </a:r>
+                      <a:r>
+                        <a:rPr lang="pt-BR" sz="1400" dirty="0" err="1" smtClean="0"/>
+                        <a:t>process</a:t>
+                      </a:r>
+                      <a:r>
+                        <a:rPr lang="pt-BR" sz="1400" dirty="0" smtClean="0"/>
+                        <a:t> </a:t>
+                      </a:r>
+                      <a:r>
+                        <a:rPr lang="pt-BR" sz="1400" dirty="0" err="1" smtClean="0"/>
+                        <a:t>to</a:t>
+                      </a:r>
+                      <a:r>
+                        <a:rPr lang="pt-BR" sz="1400" dirty="0" smtClean="0"/>
+                        <a:t> </a:t>
+                      </a:r>
+                      <a:r>
+                        <a:rPr lang="pt-BR" sz="1400" dirty="0" err="1" smtClean="0"/>
+                        <a:t>assess</a:t>
+                      </a:r>
+                      <a:r>
+                        <a:rPr lang="pt-BR" sz="1400" baseline="0" dirty="0" smtClean="0"/>
+                        <a:t> </a:t>
+                      </a:r>
+                      <a:r>
+                        <a:rPr lang="pt-BR" sz="1400" baseline="0" dirty="0" err="1" smtClean="0"/>
+                        <a:t>and</a:t>
+                      </a:r>
+                      <a:r>
+                        <a:rPr lang="pt-BR" sz="1400" baseline="0" dirty="0" smtClean="0"/>
+                        <a:t> </a:t>
+                      </a:r>
+                      <a:r>
+                        <a:rPr lang="pt-BR" sz="1400" baseline="0" dirty="0" err="1" smtClean="0"/>
+                        <a:t>re-assess</a:t>
+                      </a:r>
+                      <a:r>
+                        <a:rPr lang="pt-BR" sz="1400" baseline="0" dirty="0" smtClean="0"/>
+                        <a:t> </a:t>
+                      </a:r>
+                      <a:r>
+                        <a:rPr lang="pt-BR" sz="1400" baseline="0" dirty="0" err="1" smtClean="0"/>
+                        <a:t>investments</a:t>
+                      </a:r>
+                      <a:r>
+                        <a:rPr lang="pt-BR" sz="1400" baseline="0" dirty="0" smtClean="0"/>
+                        <a:t> </a:t>
+                      </a:r>
+                      <a:r>
+                        <a:rPr lang="pt-BR" sz="1400" baseline="0" dirty="0" err="1" smtClean="0"/>
+                        <a:t>periodically</a:t>
+                      </a:r>
+                      <a:r>
+                        <a:rPr lang="pt-BR" sz="1400" baseline="0" dirty="0" smtClean="0"/>
+                        <a:t>.</a:t>
+                      </a:r>
+                      <a:endParaRPr lang="en-US" sz="1400" dirty="0" smtClean="0"/>
+                    </a:p>
+                  </a:txBody>
+                  <a:tcPr/>
+                </a:tc>
+              </a:tr>
+            </a:tbl>
+          </a:graphicData>
+        </a:graphic>
+      </p:graphicFrame>
+    </p:spTree>
+    <p:extLst>
+      <p:ext uri="{BB962C8B-B14F-4D97-AF65-F5344CB8AC3E}">
+        <p14:creationId xmlns:p14="http://schemas.microsoft.com/office/powerpoint/2010/main" val="1325803302"/>
+      </p:ext>
+    </p:extLst>
+  </p:cSld>
+  <p:clrMapOvr>
+    <a:masterClrMapping/>
+  </p:clrMapOvr>
+  <mc:AlternateContent xmlns:mc="http://schemas.openxmlformats.org/markup-compatibility/2006" xmlns:p14="http://schemas.microsoft.com/office/powerpoint/2010/main">
+    <mc:Choice Requires="p14">
+      <p:transition spd="slow" p14:dur="2000"/>
+    </mc:Choice>
+    <mc:Fallback xmlns="">
+      <p:transition spd="slow"/>
+    </mc:Fallback>
+  </mc:AlternateContent>
+  <p:timing>
+    <p:tnLst>
+      <p:par>
+        <p:cTn id="1" dur="indefinite" restart="never" nodeType="tmRoot"/>
+      </p:par>
+    </p:tnLst>
+  </p:timing>
+</p:sld>
+</file>
+
+<file path=ppt/slides/slide17.xml><?xml version="1.0" encoding="utf-8"?>
+<p:sld xmlns:a="http://schemas.openxmlformats.org/drawingml/2006/main" xmlns:r="http://schemas.openxmlformats.org/officeDocument/2006/relationships" xmlns:p="http://schemas.openxmlformats.org/presentationml/2006/main">
+  <p:cSld>
+    <p:spTree>
+      <p:nvGrpSpPr>
+        <p:cNvPr id="1" name=""/>
+        <p:cNvGrpSpPr/>
+        <p:nvPr/>
+      </p:nvGrpSpPr>
+      <p:grpSpPr>
+        <a:xfrm>
+          <a:off x="0" y="0"/>
+          <a:ext cx="0" cy="0"/>
+          <a:chOff x="0" y="0"/>
+          <a:chExt cx="0" cy="0"/>
+        </a:xfrm>
+      </p:grpSpPr>
+      <p:sp>
+        <p:nvSpPr>
+          <p:cNvPr id="2" name="Title 1"/>
+          <p:cNvSpPr>
+            <a:spLocks noGrp="1"/>
+          </p:cNvSpPr>
+          <p:nvPr>
+            <p:ph type="title"/>
+          </p:nvPr>
+        </p:nvSpPr>
+        <p:spPr/>
+        <p:txBody>
+          <a:bodyPr vert="horz" lIns="91440" tIns="45720" rIns="91440" bIns="45720" rtlCol="0" anchor="t">
+            <a:noAutofit/>
+          </a:bodyPr>
+          <a:lstStyle/>
+          <a:p>
+            <a:r>
+              <a:rPr lang="en-US" sz="2400" dirty="0" smtClean="0"/>
+              <a:t>CA PPM for Strategic Planning and Execution</a:t>
+            </a:r>
+            <a:br>
+              <a:rPr lang="en-US" sz="2400" dirty="0" smtClean="0"/>
+            </a:br>
+            <a:endParaRPr lang="en-US" sz="2400" dirty="0"/>
+          </a:p>
+        </p:txBody>
+      </p:sp>
+      <p:sp>
+        <p:nvSpPr>
+          <p:cNvPr id="15364" name="Content Placeholder 12"/>
+          <p:cNvSpPr>
+            <a:spLocks noGrp="1"/>
+          </p:cNvSpPr>
+          <p:nvPr>
+            <p:ph type="body" sz="quarter" idx="10"/>
+          </p:nvPr>
+        </p:nvSpPr>
+        <p:spPr/>
+        <p:txBody>
           <a:bodyPr vert="horz" lIns="91440" tIns="45720" rIns="91440" bIns="45720" rtlCol="0">
             <a:noAutofit/>
           </a:bodyPr>
@@ -22865,7 +22492,7 @@
 </p:sld>
 </file>
 
-<file path=ppt/slides/slide17.xml><?xml version="1.0" encoding="utf-8"?>
+<file path=ppt/slides/slide18.xml><?xml version="1.0" encoding="utf-8"?>
 <p:sld xmlns:a="http://schemas.openxmlformats.org/drawingml/2006/main" xmlns:r="http://schemas.openxmlformats.org/officeDocument/2006/relationships" xmlns:p="http://schemas.openxmlformats.org/presentationml/2006/main">
   <p:cSld>
     <p:spTree>
@@ -26000,6 +25627,215 @@
         </p:nvSpPr>
         <p:spPr/>
         <p:txBody>
+          <a:bodyPr/>
+          <a:lstStyle/>
+          <a:p>
+            <a:r>
+              <a:rPr lang="en-US" sz="2400" dirty="0" smtClean="0">
+                <a:latin typeface="+mn-lt"/>
+              </a:rPr>
+              <a:t>CA PPM for Strategic Planning and Execution</a:t>
+            </a:r>
+            <a:br>
+              <a:rPr lang="en-US" sz="2400" dirty="0" smtClean="0">
+                <a:latin typeface="+mn-lt"/>
+              </a:rPr>
+            </a:br>
+            <a:endParaRPr lang="en-US" sz="3600" dirty="0">
+              <a:latin typeface="+mn-lt"/>
+            </a:endParaRPr>
+          </a:p>
+        </p:txBody>
+      </p:sp>
+      <p:sp>
+        <p:nvSpPr>
+          <p:cNvPr id="14340" name="Content Placeholder 12"/>
+          <p:cNvSpPr>
+            <a:spLocks noGrp="1"/>
+          </p:cNvSpPr>
+          <p:nvPr>
+            <p:ph type="body" sz="quarter" idx="10"/>
+          </p:nvPr>
+        </p:nvSpPr>
+        <p:spPr/>
+        <p:txBody>
+          <a:bodyPr>
+            <a:normAutofit/>
+          </a:bodyPr>
+          <a:lstStyle/>
+          <a:p>
+            <a:pPr marL="0" indent="0" algn="just">
+              <a:spcBef>
+                <a:spcPts val="450"/>
+              </a:spcBef>
+              <a:buNone/>
+            </a:pPr>
+            <a:r>
+              <a:rPr lang="en-US" sz="1501" dirty="0" smtClean="0"/>
+              <a:t>In the next slides, we present you some illustrations taken from CA PPM, which was </a:t>
+            </a:r>
+            <a:r>
+              <a:rPr lang="en-US" sz="1501" b="1" i="1" dirty="0" smtClean="0">
+                <a:solidFill>
+                  <a:schemeClr val="accent1"/>
+                </a:solidFill>
+              </a:rPr>
+              <a:t>configured </a:t>
+            </a:r>
+            <a:r>
+              <a:rPr lang="en-US" sz="1501" dirty="0" smtClean="0"/>
+              <a:t>to provide specific features for </a:t>
+            </a:r>
+            <a:r>
+              <a:rPr lang="en-US" sz="1501" b="1" i="1" dirty="0" smtClean="0">
+                <a:solidFill>
+                  <a:schemeClr val="accent1"/>
+                </a:solidFill>
+              </a:rPr>
+              <a:t>planning</a:t>
+            </a:r>
+            <a:r>
+              <a:rPr lang="en-US" sz="1501" dirty="0" smtClean="0"/>
+              <a:t> and </a:t>
+            </a:r>
+            <a:r>
+              <a:rPr lang="en-US" sz="1501" b="1" i="1" dirty="0" smtClean="0">
+                <a:solidFill>
+                  <a:schemeClr val="accent1"/>
+                </a:solidFill>
+              </a:rPr>
+              <a:t>monitoring</a:t>
+            </a:r>
+            <a:r>
+              <a:rPr lang="en-US" sz="1501" dirty="0" smtClean="0"/>
+              <a:t> of the </a:t>
+            </a:r>
+            <a:r>
+              <a:rPr lang="en-US" sz="1501" b="1" i="1" dirty="0" smtClean="0">
+                <a:solidFill>
+                  <a:schemeClr val="accent1"/>
+                </a:solidFill>
+              </a:rPr>
+              <a:t>Strategic Execution</a:t>
+            </a:r>
+            <a:r>
+              <a:rPr lang="en-US" sz="1501" dirty="0" smtClean="0"/>
+              <a:t>. </a:t>
+            </a:r>
+          </a:p>
+          <a:p>
+            <a:pPr marL="0" indent="0" algn="just">
+              <a:spcBef>
+                <a:spcPts val="450"/>
+              </a:spcBef>
+              <a:buNone/>
+            </a:pPr>
+            <a:endParaRPr lang="en-US" sz="1126" dirty="0" smtClean="0"/>
+          </a:p>
+          <a:p>
+            <a:pPr marL="0" indent="0" algn="just">
+              <a:spcBef>
+                <a:spcPts val="450"/>
+              </a:spcBef>
+              <a:buNone/>
+            </a:pPr>
+            <a:r>
+              <a:rPr lang="en-US" sz="1126" dirty="0" smtClean="0"/>
+              <a:t>Note: the features you will see are not an integral part of the "Core" features of CA PPM but can be implemented through configured and customized components. Adjustments to adherence to the actual process of the organization are encouraged through the hiring of specialized services with CA Services or with one of our Qualified Partners.</a:t>
+            </a:r>
+            <a:endParaRPr lang="en-US" sz="1126" dirty="0"/>
+          </a:p>
+        </p:txBody>
+      </p:sp>
+      <p:sp>
+        <p:nvSpPr>
+          <p:cNvPr id="14339" name="Content Placeholder 12"/>
+          <p:cNvSpPr>
+            <a:spLocks noGrp="1"/>
+          </p:cNvSpPr>
+          <p:nvPr>
+            <p:ph sz="quarter" idx="11"/>
+          </p:nvPr>
+        </p:nvSpPr>
+        <p:spPr/>
+        <p:txBody>
+          <a:bodyPr/>
+          <a:lstStyle/>
+          <a:p>
+            <a:pPr marL="175186" indent="-175186">
+              <a:spcBef>
+                <a:spcPts val="450"/>
+              </a:spcBef>
+            </a:pPr>
+            <a:r>
+              <a:rPr lang="en-US" sz="1600" b="1" dirty="0">
+                <a:solidFill>
+                  <a:schemeClr val="tx2"/>
+                </a:solidFill>
+              </a:rPr>
+              <a:t>Overview of Strategic Planning and Execution Support with CA PPM</a:t>
+            </a:r>
+            <a:endParaRPr lang="en-US" sz="1600" dirty="0"/>
+          </a:p>
+        </p:txBody>
+      </p:sp>
+    </p:spTree>
+    <p:extLst>
+      <p:ext uri="{BB962C8B-B14F-4D97-AF65-F5344CB8AC3E}">
+        <p14:creationId xmlns:p14="http://schemas.microsoft.com/office/powerpoint/2010/main" val="397632103"/>
+      </p:ext>
+    </p:extLst>
+  </p:cSld>
+  <p:clrMapOvr>
+    <a:masterClrMapping/>
+  </p:clrMapOvr>
+  <mc:AlternateContent xmlns:mc="http://schemas.openxmlformats.org/markup-compatibility/2006" xmlns:p14="http://schemas.microsoft.com/office/powerpoint/2010/main">
+    <mc:Choice Requires="p14">
+      <p:transition spd="slow" p14:dur="2000"/>
+    </mc:Choice>
+    <mc:Fallback xmlns="">
+      <p:transition spd="slow"/>
+    </mc:Fallback>
+  </mc:AlternateContent>
+  <p:timing>
+    <p:tnLst>
+      <p:par>
+        <p:cTn id="1" dur="indefinite" restart="never" nodeType="tmRoot"/>
+      </p:par>
+    </p:tnLst>
+  </p:timing>
+</p:sld>
+</file>
+
+<file path=ppt/slides/slide7.xml><?xml version="1.0" encoding="utf-8"?>
+<p:sld xmlns:a="http://schemas.openxmlformats.org/drawingml/2006/main" xmlns:r="http://schemas.openxmlformats.org/officeDocument/2006/relationships" xmlns:p="http://schemas.openxmlformats.org/presentationml/2006/main">
+  <p:cSld>
+    <p:spTree>
+      <p:nvGrpSpPr>
+        <p:cNvPr id="1" name=""/>
+        <p:cNvGrpSpPr/>
+        <p:nvPr/>
+      </p:nvGrpSpPr>
+      <p:grpSpPr>
+        <a:xfrm>
+          <a:off x="0" y="0"/>
+          <a:ext cx="0" cy="0"/>
+          <a:chOff x="0" y="0"/>
+          <a:chExt cx="0" cy="0"/>
+        </a:xfrm>
+      </p:grpSpPr>
+      <p:sp>
+        <p:nvSpPr>
+          <p:cNvPr id="2" name="Title 1"/>
+          <p:cNvSpPr>
+            <a:spLocks noGrp="1"/>
+          </p:cNvSpPr>
+          <p:nvPr>
+            <p:ph type="title"/>
+          </p:nvPr>
+        </p:nvSpPr>
+        <p:spPr/>
+        <p:txBody>
           <a:bodyPr vert="horz" lIns="91440" tIns="45720" rIns="91440" bIns="45720" rtlCol="0" anchor="t">
             <a:noAutofit/>
           </a:bodyPr>
@@ -26211,7 +26047,7 @@
 </p:sld>
 </file>
 
-<file path=ppt/slides/slide7.xml><?xml version="1.0" encoding="utf-8"?>
+<file path=ppt/slides/slide8.xml><?xml version="1.0" encoding="utf-8"?>
 <p:sld xmlns:a="http://schemas.openxmlformats.org/drawingml/2006/main" xmlns:r="http://schemas.openxmlformats.org/officeDocument/2006/relationships" xmlns:p="http://schemas.openxmlformats.org/presentationml/2006/main">
   <p:cSld>
     <p:spTree>
@@ -26614,7 +26450,7 @@
 </p:sld>
 </file>
 
-<file path=ppt/slides/slide8.xml><?xml version="1.0" encoding="utf-8"?>
+<file path=ppt/slides/slide9.xml><?xml version="1.0" encoding="utf-8"?>
 <p:sld xmlns:a="http://schemas.openxmlformats.org/drawingml/2006/main" xmlns:r="http://schemas.openxmlformats.org/officeDocument/2006/relationships" xmlns:p="http://schemas.openxmlformats.org/presentationml/2006/main">
   <p:cSld>
     <p:spTree>
@@ -26888,455 +26724,6 @@
     <p:extLst>
       <p:ext uri="{BB962C8B-B14F-4D97-AF65-F5344CB8AC3E}">
         <p14:creationId xmlns:p14="http://schemas.microsoft.com/office/powerpoint/2010/main" val="736051060"/>
-      </p:ext>
-    </p:extLst>
-  </p:cSld>
-  <p:clrMapOvr>
-    <a:masterClrMapping/>
-  </p:clrMapOvr>
-  <mc:AlternateContent xmlns:mc="http://schemas.openxmlformats.org/markup-compatibility/2006" xmlns:p14="http://schemas.microsoft.com/office/powerpoint/2010/main">
-    <mc:Choice Requires="p14">
-      <p:transition spd="slow" p14:dur="2000"/>
-    </mc:Choice>
-    <mc:Fallback xmlns="">
-      <p:transition spd="slow"/>
-    </mc:Fallback>
-  </mc:AlternateContent>
-  <p:timing>
-    <p:tnLst>
-      <p:par>
-        <p:cTn id="1" dur="indefinite" restart="never" nodeType="tmRoot"/>
-      </p:par>
-    </p:tnLst>
-  </p:timing>
-</p:sld>
-</file>
-
-<file path=ppt/slides/slide9.xml><?xml version="1.0" encoding="utf-8"?>
-<p:sld xmlns:a="http://schemas.openxmlformats.org/drawingml/2006/main" xmlns:r="http://schemas.openxmlformats.org/officeDocument/2006/relationships" xmlns:p="http://schemas.openxmlformats.org/presentationml/2006/main">
-  <p:cSld>
-    <p:spTree>
-      <p:nvGrpSpPr>
-        <p:cNvPr id="1" name=""/>
-        <p:cNvGrpSpPr/>
-        <p:nvPr/>
-      </p:nvGrpSpPr>
-      <p:grpSpPr>
-        <a:xfrm>
-          <a:off x="0" y="0"/>
-          <a:ext cx="0" cy="0"/>
-          <a:chOff x="0" y="0"/>
-          <a:chExt cx="0" cy="0"/>
-        </a:xfrm>
-      </p:grpSpPr>
-      <p:sp>
-        <p:nvSpPr>
-          <p:cNvPr id="2" name="Title 1"/>
-          <p:cNvSpPr>
-            <a:spLocks noGrp="1"/>
-          </p:cNvSpPr>
-          <p:nvPr>
-            <p:ph type="title"/>
-          </p:nvPr>
-        </p:nvSpPr>
-        <p:spPr/>
-        <p:txBody>
-          <a:bodyPr vert="horz" lIns="91440" tIns="45720" rIns="91440" bIns="45720" rtlCol="0" anchor="t">
-            <a:noAutofit/>
-          </a:bodyPr>
-          <a:lstStyle/>
-          <a:p>
-            <a:r>
-              <a:rPr lang="en-US" sz="2400" dirty="0" smtClean="0"/>
-              <a:t>CA PPM for Strategic Planning and Execution</a:t>
-            </a:r>
-            <a:br>
-              <a:rPr lang="en-US" sz="2400" dirty="0" smtClean="0"/>
-            </a:br>
-            <a:endParaRPr lang="en-US" sz="2400" dirty="0"/>
-          </a:p>
-        </p:txBody>
-      </p:sp>
-      <p:pic>
-        <p:nvPicPr>
-          <p:cNvPr id="5" name="Content Placeholder 4"/>
-          <p:cNvPicPr>
-            <a:picLocks noGrp="1" noChangeAspect="1"/>
-          </p:cNvPicPr>
-          <p:nvPr>
-            <p:ph sz="half" idx="1"/>
-          </p:nvPr>
-        </p:nvPicPr>
-        <p:blipFill>
-          <a:blip r:embed="rId3"/>
-          <a:stretch>
-            <a:fillRect/>
-          </a:stretch>
-        </p:blipFill>
-        <p:spPr>
-          <a:xfrm>
-            <a:off x="379080" y="858045"/>
-            <a:ext cx="4038600" cy="2507976"/>
-          </a:xfrm>
-          <a:prstGeom prst="rect">
-            <a:avLst/>
-          </a:prstGeom>
-        </p:spPr>
-      </p:pic>
-      <p:sp>
-        <p:nvSpPr>
-          <p:cNvPr id="3" name="Text Placeholder 2"/>
-          <p:cNvSpPr>
-            <a:spLocks noGrp="1"/>
-          </p:cNvSpPr>
-          <p:nvPr>
-            <p:ph sz="half" idx="2"/>
-          </p:nvPr>
-        </p:nvSpPr>
-        <p:spPr/>
-        <p:txBody>
-          <a:bodyPr/>
-          <a:lstStyle/>
-          <a:p>
-            <a:pPr>
-              <a:lnSpc>
-                <a:spcPts val="1800"/>
-              </a:lnSpc>
-              <a:spcAft>
-                <a:spcPts val="300"/>
-              </a:spcAft>
-            </a:pPr>
-            <a:r>
-              <a:rPr lang="en-US" sz="1600" dirty="0" smtClean="0"/>
-              <a:t>Create </a:t>
-            </a:r>
-            <a:r>
-              <a:rPr lang="en-US" sz="1600" dirty="0">
-                <a:solidFill>
-                  <a:srgbClr val="53BBD4"/>
-                </a:solidFill>
-              </a:rPr>
-              <a:t>Strategic</a:t>
-            </a:r>
-            <a:r>
-              <a:rPr lang="en-US" sz="1600" dirty="0" smtClean="0"/>
-              <a:t> </a:t>
-            </a:r>
-            <a:r>
-              <a:rPr lang="en-US" sz="1600" dirty="0" smtClean="0">
-                <a:solidFill>
-                  <a:srgbClr val="53BBD4"/>
-                </a:solidFill>
-              </a:rPr>
-              <a:t>Indicators </a:t>
-            </a:r>
-            <a:r>
-              <a:rPr lang="en-US" sz="1600" dirty="0" smtClean="0"/>
-              <a:t>that will monitor the results of your strategies;</a:t>
-            </a:r>
-          </a:p>
-          <a:p>
-            <a:pPr>
-              <a:lnSpc>
-                <a:spcPts val="1800"/>
-              </a:lnSpc>
-              <a:spcAft>
-                <a:spcPts val="300"/>
-              </a:spcAft>
-            </a:pPr>
-            <a:r>
-              <a:rPr lang="pt-BR" sz="1600" dirty="0" smtClean="0"/>
-              <a:t>Set </a:t>
-            </a:r>
-            <a:r>
-              <a:rPr lang="pt-BR" sz="1600" dirty="0" err="1">
-                <a:solidFill>
-                  <a:srgbClr val="53BBD4"/>
-                </a:solidFill>
-              </a:rPr>
-              <a:t>Targets</a:t>
-            </a:r>
-            <a:r>
-              <a:rPr lang="pt-BR" sz="1600" dirty="0" smtClean="0"/>
-              <a:t> </a:t>
-            </a:r>
-            <a:r>
-              <a:rPr lang="pt-BR" sz="1600" dirty="0" err="1" smtClean="0"/>
-              <a:t>and</a:t>
-            </a:r>
-            <a:r>
-              <a:rPr lang="pt-BR" sz="1600" dirty="0" smtClean="0"/>
-              <a:t> </a:t>
-            </a:r>
-            <a:r>
-              <a:rPr lang="pt-BR" sz="1600" dirty="0" err="1" smtClean="0"/>
-              <a:t>collect</a:t>
-            </a:r>
-            <a:r>
-              <a:rPr lang="pt-BR" sz="1600" dirty="0" smtClean="0"/>
-              <a:t> </a:t>
-            </a:r>
-            <a:r>
-              <a:rPr lang="pt-BR" sz="1600" dirty="0" err="1" smtClean="0">
-                <a:solidFill>
-                  <a:srgbClr val="53BBD4"/>
-                </a:solidFill>
-              </a:rPr>
-              <a:t>Measurements</a:t>
-            </a:r>
-            <a:r>
-              <a:rPr lang="pt-BR" sz="1600" dirty="0" smtClean="0">
-                <a:solidFill>
-                  <a:srgbClr val="53BBD4"/>
-                </a:solidFill>
-              </a:rPr>
-              <a:t>;</a:t>
-            </a:r>
-            <a:endParaRPr lang="pt-BR" sz="1600" dirty="0">
-              <a:solidFill>
-                <a:srgbClr val="53BBD4"/>
-              </a:solidFill>
-            </a:endParaRPr>
-          </a:p>
-          <a:p>
-            <a:pPr>
-              <a:lnSpc>
-                <a:spcPts val="1800"/>
-              </a:lnSpc>
-              <a:spcAft>
-                <a:spcPts val="300"/>
-              </a:spcAft>
-            </a:pPr>
-            <a:r>
-              <a:rPr lang="pt-BR" sz="1600" dirty="0" err="1" smtClean="0"/>
-              <a:t>Calculate</a:t>
-            </a:r>
-            <a:r>
-              <a:rPr lang="pt-BR" sz="1600" dirty="0" smtClean="0"/>
-              <a:t> </a:t>
-            </a:r>
-            <a:r>
-              <a:rPr lang="pt-BR" sz="1600" dirty="0" err="1" smtClean="0"/>
-              <a:t>the</a:t>
-            </a:r>
-            <a:r>
-              <a:rPr lang="pt-BR" sz="1600" dirty="0" smtClean="0"/>
-              <a:t> </a:t>
-            </a:r>
-            <a:r>
-              <a:rPr lang="pt-BR" sz="1600" dirty="0" err="1" smtClean="0"/>
-              <a:t>resulting</a:t>
-            </a:r>
-            <a:r>
-              <a:rPr lang="pt-BR" sz="1600" dirty="0" smtClean="0"/>
-              <a:t> </a:t>
-            </a:r>
-            <a:r>
-              <a:rPr lang="pt-BR" sz="1600" dirty="0">
-                <a:solidFill>
-                  <a:srgbClr val="53BBD4"/>
-                </a:solidFill>
-              </a:rPr>
-              <a:t>Status</a:t>
-            </a:r>
-            <a:r>
-              <a:rPr lang="pt-BR" sz="1600" dirty="0" smtClean="0"/>
-              <a:t> </a:t>
-            </a:r>
-            <a:r>
-              <a:rPr lang="pt-BR" sz="1600" dirty="0" err="1" smtClean="0"/>
-              <a:t>and</a:t>
-            </a:r>
-            <a:r>
-              <a:rPr lang="pt-BR" sz="1600" dirty="0" smtClean="0"/>
-              <a:t> </a:t>
-            </a:r>
-            <a:r>
-              <a:rPr lang="pt-BR" sz="1600" dirty="0" err="1" smtClean="0"/>
-              <a:t>update</a:t>
-            </a:r>
-            <a:r>
-              <a:rPr lang="pt-BR" sz="1600" dirty="0" smtClean="0"/>
-              <a:t> </a:t>
-            </a:r>
-            <a:r>
-              <a:rPr lang="pt-BR" sz="1600" dirty="0" err="1" smtClean="0"/>
-              <a:t>Strategic</a:t>
-            </a:r>
-            <a:r>
-              <a:rPr lang="pt-BR" sz="1600" dirty="0" smtClean="0"/>
-              <a:t> Plans </a:t>
-            </a:r>
-            <a:r>
-              <a:rPr lang="pt-BR" sz="1600" dirty="0" err="1" smtClean="0"/>
-              <a:t>automatically</a:t>
-            </a:r>
-            <a:r>
-              <a:rPr lang="pt-BR" sz="1600" dirty="0" smtClean="0"/>
-              <a:t>;</a:t>
-            </a:r>
-          </a:p>
-          <a:p>
-            <a:pPr>
-              <a:lnSpc>
-                <a:spcPts val="1800"/>
-              </a:lnSpc>
-              <a:spcAft>
-                <a:spcPts val="300"/>
-              </a:spcAft>
-            </a:pPr>
-            <a:r>
-              <a:rPr lang="pt-BR" sz="1600" dirty="0" err="1" smtClean="0"/>
-              <a:t>Indicate</a:t>
-            </a:r>
-            <a:r>
-              <a:rPr lang="pt-BR" sz="1600" dirty="0" smtClean="0"/>
-              <a:t> Cause-</a:t>
-            </a:r>
-            <a:r>
-              <a:rPr lang="pt-BR" sz="1600" dirty="0" err="1" smtClean="0"/>
-              <a:t>Consequence</a:t>
-            </a:r>
-            <a:r>
-              <a:rPr lang="pt-BR" sz="1600" dirty="0" smtClean="0"/>
-              <a:t> </a:t>
-            </a:r>
-            <a:r>
-              <a:rPr lang="pt-BR" sz="1600" dirty="0" err="1" smtClean="0"/>
-              <a:t>relationships</a:t>
-            </a:r>
-            <a:r>
-              <a:rPr lang="pt-BR" sz="1600" dirty="0" smtClean="0"/>
-              <a:t> </a:t>
-            </a:r>
-            <a:r>
-              <a:rPr lang="pt-BR" sz="1600" dirty="0" err="1" smtClean="0"/>
-              <a:t>using</a:t>
-            </a:r>
-            <a:r>
-              <a:rPr lang="pt-BR" sz="1600" dirty="0" smtClean="0"/>
-              <a:t> </a:t>
-            </a:r>
-            <a:r>
-              <a:rPr lang="pt-BR" sz="1600" dirty="0" err="1">
-                <a:solidFill>
-                  <a:srgbClr val="53BBD4"/>
-                </a:solidFill>
-              </a:rPr>
-              <a:t>Indicator</a:t>
-            </a:r>
-            <a:r>
-              <a:rPr lang="pt-BR" sz="1600" dirty="0">
-                <a:solidFill>
-                  <a:srgbClr val="53BBD4"/>
-                </a:solidFill>
-              </a:rPr>
-              <a:t> </a:t>
-            </a:r>
-            <a:r>
-              <a:rPr lang="pt-BR" sz="1600" dirty="0" err="1">
-                <a:solidFill>
-                  <a:srgbClr val="53BBD4"/>
-                </a:solidFill>
-              </a:rPr>
-              <a:t>Hierarchies</a:t>
-            </a:r>
-            <a:r>
-              <a:rPr lang="pt-BR" sz="1600" dirty="0">
-                <a:solidFill>
-                  <a:srgbClr val="53BBD4"/>
-                </a:solidFill>
-              </a:rPr>
-              <a:t> </a:t>
-            </a:r>
-            <a:r>
-              <a:rPr lang="pt-BR" sz="1600" dirty="0" err="1" smtClean="0"/>
-              <a:t>and</a:t>
-            </a:r>
-            <a:r>
-              <a:rPr lang="pt-BR" sz="1600" dirty="0" smtClean="0"/>
-              <a:t> </a:t>
-            </a:r>
-            <a:r>
-              <a:rPr lang="pt-BR" sz="1600" dirty="0" err="1" smtClean="0"/>
-              <a:t>review</a:t>
-            </a:r>
-            <a:r>
-              <a:rPr lang="pt-BR" sz="1600" dirty="0" smtClean="0"/>
-              <a:t>  </a:t>
-            </a:r>
-            <a:r>
-              <a:rPr lang="pt-BR" sz="1600" dirty="0" err="1" smtClean="0"/>
-              <a:t>them</a:t>
-            </a:r>
-            <a:r>
-              <a:rPr lang="pt-BR" sz="1600" dirty="0" smtClean="0"/>
-              <a:t> </a:t>
-            </a:r>
-            <a:r>
-              <a:rPr lang="pt-BR" sz="1600" dirty="0" err="1" smtClean="0"/>
-              <a:t>graphically</a:t>
-            </a:r>
-            <a:r>
-              <a:rPr lang="pt-BR" sz="1600" dirty="0" smtClean="0"/>
-              <a:t>.</a:t>
-            </a:r>
-            <a:endParaRPr lang="en-US" sz="1600" dirty="0" smtClean="0"/>
-          </a:p>
-        </p:txBody>
-      </p:sp>
-      <p:pic>
-        <p:nvPicPr>
-          <p:cNvPr id="7" name="Picture 6"/>
-          <p:cNvPicPr>
-            <a:picLocks noChangeAspect="1"/>
-          </p:cNvPicPr>
-          <p:nvPr/>
-        </p:nvPicPr>
-        <p:blipFill>
-          <a:blip r:embed="rId4"/>
-          <a:stretch>
-            <a:fillRect/>
-          </a:stretch>
-        </p:blipFill>
-        <p:spPr>
-          <a:xfrm>
-            <a:off x="665094" y="2986471"/>
-            <a:ext cx="3466571" cy="2161792"/>
-          </a:xfrm>
-          <a:prstGeom prst="rect">
-            <a:avLst/>
-          </a:prstGeom>
-        </p:spPr>
-      </p:pic>
-      <p:pic>
-        <p:nvPicPr>
-          <p:cNvPr id="8" name="Picture 7"/>
-          <p:cNvPicPr>
-            <a:picLocks noChangeAspect="1"/>
-          </p:cNvPicPr>
-          <p:nvPr/>
-        </p:nvPicPr>
-        <p:blipFill>
-          <a:blip r:embed="rId5"/>
-          <a:stretch>
-            <a:fillRect/>
-          </a:stretch>
-        </p:blipFill>
-        <p:spPr>
-          <a:xfrm>
-            <a:off x="3553264" y="3483117"/>
-            <a:ext cx="3927915" cy="1439507"/>
-          </a:xfrm>
-          <a:prstGeom prst="rect">
-            <a:avLst/>
-          </a:prstGeom>
-        </p:spPr>
-      </p:pic>
-    </p:spTree>
-    <p:extLst>
-      <p:ext uri="{BB962C8B-B14F-4D97-AF65-F5344CB8AC3E}">
-        <p14:creationId xmlns:p14="http://schemas.microsoft.com/office/powerpoint/2010/main" val="2458384153"/>
       </p:ext>
     </p:extLst>
   </p:cSld>
@@ -29655,30 +29042,6 @@
 </file>
 
 <file path=customXml/item1.xml><?xml version="1.0" encoding="utf-8"?>
-<?mso-contentType ?>
-<FormTemplates xmlns="http://schemas.microsoft.com/sharepoint/v3/contenttype/forms">
-  <Display>DocumentLibraryForm</Display>
-  <Edit>DocumentLibraryForm</Edit>
-  <New>DocumentLibraryForm</New>
-</FormTemplates>
-</file>
-
-<file path=customXml/item2.xml><?xml version="1.0" encoding="utf-8"?>
-<p:properties xmlns:p="http://schemas.microsoft.com/office/2006/metadata/properties" xmlns:xsi="http://www.w3.org/2001/XMLSchema-instance">
-  <documentManagement>
-    <Font xmlns="dc8eff60-28dd-4404-9dba-e6ba6c545568" xsi:nil="true"/>
-    <RecordType_CA xmlns="dc8eff60-28dd-4404-9dba-e6ba6c545568">Secondary</RecordType_CA>
-    <Category xmlns="dc8eff60-28dd-4404-9dba-e6ba6c545568">Presentation</Category>
-    <PPT_x0020_Type xmlns="dc8eff60-28dd-4404-9dba-e6ba6c545568">Template</PPT_x0020_Type>
-    <PublishingExpirationDate xmlns="http://schemas.microsoft.com/sharepoint/v3" xsi:nil="true"/>
-    <PublishingStartDate xmlns="http://schemas.microsoft.com/sharepoint/v3" xsi:nil="true"/>
-    <Internal_x002f_External xmlns="dc8eff60-28dd-4404-9dba-e6ba6c545568">External</Internal_x002f_External>
-    <Template_x0020_Type xmlns="dc8eff60-28dd-4404-9dba-e6ba6c545568">Presentations</Template_x0020_Type>
-  </documentManagement>
-</p:properties>
-</file>
-
-<file path=customXml/item3.xml><?xml version="1.0" encoding="utf-8"?>
 <ct:contentTypeSchema xmlns:ct="http://schemas.microsoft.com/office/2006/metadata/contentType" xmlns:ma="http://schemas.microsoft.com/office/2006/metadata/properties/metaAttributes" ct:_="" ma:_="" ma:contentTypeName="Document" ma:contentTypeID="0x010100D60472418B783044BF2F590CB9E4516B" ma:contentTypeVersion="6" ma:contentTypeDescription="Create a new document." ma:contentTypeScope="" ma:versionID="5c6d91fd6684f55a4bed8b46f4e8fc47">
   <xsd:schema xmlns:xsd="http://www.w3.org/2001/XMLSchema" xmlns:p="http://schemas.microsoft.com/office/2006/metadata/properties" xmlns:ns1="http://schemas.microsoft.com/sharepoint/v3" xmlns:ns2="dc8eff60-28dd-4404-9dba-e6ba6c545568" targetNamespace="http://schemas.microsoft.com/office/2006/metadata/properties" ma:root="true" ma:fieldsID="6bab3289ae11c781e41a2c24b2cfd769" ns1:_="" ns2:_="">
     <xsd:import namespace="http://schemas.microsoft.com/sharepoint/v3"/>
@@ -29811,10 +29174,44 @@
 </ct:contentTypeSchema>
 </file>
 
+<file path=customXml/item2.xml><?xml version="1.0" encoding="utf-8"?>
+<p:properties xmlns:p="http://schemas.microsoft.com/office/2006/metadata/properties" xmlns:xsi="http://www.w3.org/2001/XMLSchema-instance">
+  <documentManagement>
+    <Font xmlns="dc8eff60-28dd-4404-9dba-e6ba6c545568" xsi:nil="true"/>
+    <RecordType_CA xmlns="dc8eff60-28dd-4404-9dba-e6ba6c545568">Secondary</RecordType_CA>
+    <Category xmlns="dc8eff60-28dd-4404-9dba-e6ba6c545568">Presentation</Category>
+    <PPT_x0020_Type xmlns="dc8eff60-28dd-4404-9dba-e6ba6c545568">Template</PPT_x0020_Type>
+    <PublishingExpirationDate xmlns="http://schemas.microsoft.com/sharepoint/v3" xsi:nil="true"/>
+    <PublishingStartDate xmlns="http://schemas.microsoft.com/sharepoint/v3" xsi:nil="true"/>
+    <Internal_x002f_External xmlns="dc8eff60-28dd-4404-9dba-e6ba6c545568">External</Internal_x002f_External>
+    <Template_x0020_Type xmlns="dc8eff60-28dd-4404-9dba-e6ba6c545568">Presentations</Template_x0020_Type>
+  </documentManagement>
+</p:properties>
+</file>
+
+<file path=customXml/item3.xml><?xml version="1.0" encoding="utf-8"?>
+<?mso-contentType ?>
+<FormTemplates xmlns="http://schemas.microsoft.com/sharepoint/v3/contenttype/forms">
+  <Display>DocumentLibraryForm</Display>
+  <Edit>DocumentLibraryForm</Edit>
+  <New>DocumentLibraryForm</New>
+</FormTemplates>
+</file>
+
 <file path=customXml/itemProps1.xml><?xml version="1.0" encoding="utf-8"?>
-<ds:datastoreItem xmlns:ds="http://schemas.openxmlformats.org/officeDocument/2006/customXml" ds:itemID="{3C7E8C9B-B55C-4026-A315-0168911168B6}">
+<ds:datastoreItem xmlns:ds="http://schemas.openxmlformats.org/officeDocument/2006/customXml" ds:itemID="{11384A13-723B-41CC-B63A-F28A48C40641}">
   <ds:schemaRefs>
-    <ds:schemaRef ds:uri="http://schemas.microsoft.com/sharepoint/v3/contenttype/forms"/>
+    <ds:schemaRef ds:uri="http://schemas.microsoft.com/office/2006/metadata/contentType"/>
+    <ds:schemaRef ds:uri="http://schemas.microsoft.com/office/2006/metadata/properties/metaAttributes"/>
+    <ds:schemaRef ds:uri="http://www.w3.org/2001/XMLSchema"/>
+    <ds:schemaRef ds:uri="http://schemas.microsoft.com/office/2006/metadata/properties"/>
+    <ds:schemaRef ds:uri="http://schemas.microsoft.com/sharepoint/v3"/>
+    <ds:schemaRef ds:uri="dc8eff60-28dd-4404-9dba-e6ba6c545568"/>
+    <ds:schemaRef ds:uri="http://schemas.microsoft.com/office/2006/documentManagement/types"/>
+    <ds:schemaRef ds:uri="http://schemas.openxmlformats.org/package/2006/metadata/core-properties"/>
+    <ds:schemaRef ds:uri="http://purl.org/dc/elements/1.1/"/>
+    <ds:schemaRef ds:uri="http://purl.org/dc/terms/"/>
+    <ds:schemaRef ds:uri="http://schemas.microsoft.com/office/internal/2005/internalDocumentation"/>
   </ds:schemaRefs>
 </ds:datastoreItem>
 </file>
@@ -29836,19 +29233,9 @@
 </file>
 
 <file path=customXml/itemProps3.xml><?xml version="1.0" encoding="utf-8"?>
-<ds:datastoreItem xmlns:ds="http://schemas.openxmlformats.org/officeDocument/2006/customXml" ds:itemID="{11384A13-723B-41CC-B63A-F28A48C40641}">
+<ds:datastoreItem xmlns:ds="http://schemas.openxmlformats.org/officeDocument/2006/customXml" ds:itemID="{3C7E8C9B-B55C-4026-A315-0168911168B6}">
   <ds:schemaRefs>
-    <ds:schemaRef ds:uri="http://schemas.microsoft.com/office/2006/metadata/contentType"/>
-    <ds:schemaRef ds:uri="http://schemas.microsoft.com/office/2006/metadata/properties/metaAttributes"/>
-    <ds:schemaRef ds:uri="http://www.w3.org/2001/XMLSchema"/>
-    <ds:schemaRef ds:uri="http://schemas.microsoft.com/office/2006/metadata/properties"/>
-    <ds:schemaRef ds:uri="http://schemas.microsoft.com/sharepoint/v3"/>
-    <ds:schemaRef ds:uri="dc8eff60-28dd-4404-9dba-e6ba6c545568"/>
-    <ds:schemaRef ds:uri="http://schemas.microsoft.com/office/2006/documentManagement/types"/>
-    <ds:schemaRef ds:uri="http://schemas.openxmlformats.org/package/2006/metadata/core-properties"/>
-    <ds:schemaRef ds:uri="http://purl.org/dc/elements/1.1/"/>
-    <ds:schemaRef ds:uri="http://purl.org/dc/terms/"/>
-    <ds:schemaRef ds:uri="http://schemas.microsoft.com/office/internal/2005/internalDocumentation"/>
+    <ds:schemaRef ds:uri="http://schemas.microsoft.com/sharepoint/v3/contenttype/forms"/>
   </ds:schemaRefs>
 </ds:datastoreItem>
 </file>
</xml_diff>